<commit_message>
Updated instructions for deploy commands
</commit_message>
<xml_diff>
--- a/Ant-Build-Script/WebWorksBuildScript.pptx
+++ b/Ant-Build-Script/WebWorksBuildScript.pptx
@@ -247,7 +247,7 @@
               <a:pPr>
                 <a:defRPr/>
               </a:pPr>
-              <a:t>11/4/2012</a:t>
+              <a:t>11/15/2012</a:t>
             </a:fld>
             <a:endParaRPr lang="en-US"/>
           </a:p>
@@ -1037,7 +1037,7 @@
               <a:pPr>
                 <a:defRPr/>
               </a:pPr>
-              <a:t>November 4, 2012</a:t>
+              <a:t>November 15, 2012</a:t>
             </a:fld>
             <a:endParaRPr lang="en-US" dirty="0"/>
           </a:p>
@@ -1247,7 +1247,7 @@
               <a:pPr>
                 <a:defRPr/>
               </a:pPr>
-              <a:t>November 4, 2012</a:t>
+              <a:t>November 15, 2012</a:t>
             </a:fld>
             <a:endParaRPr lang="en-US"/>
           </a:p>
@@ -1466,7 +1466,7 @@
               <a:pPr>
                 <a:defRPr/>
               </a:pPr>
-              <a:t>November 4, 2012</a:t>
+              <a:t>November 15, 2012</a:t>
             </a:fld>
             <a:endParaRPr lang="en-US"/>
           </a:p>
@@ -1690,7 +1690,7 @@
               <a:pPr>
                 <a:defRPr/>
               </a:pPr>
-              <a:t>November 4, 2012</a:t>
+              <a:t>November 15, 2012</a:t>
             </a:fld>
             <a:endParaRPr lang="en-US"/>
           </a:p>
@@ -1892,7 +1892,7 @@
               <a:pPr>
                 <a:defRPr/>
               </a:pPr>
-              <a:t>November 4, 2012</a:t>
+              <a:t>November 15, 2012</a:t>
             </a:fld>
             <a:endParaRPr lang="en-US"/>
           </a:p>
@@ -2094,7 +2094,7 @@
               <a:pPr>
                 <a:defRPr/>
               </a:pPr>
-              <a:t>November 4, 2012</a:t>
+              <a:t>November 15, 2012</a:t>
             </a:fld>
             <a:endParaRPr lang="en-US"/>
           </a:p>
@@ -2332,7 +2332,7 @@
               <a:pPr>
                 <a:defRPr/>
               </a:pPr>
-              <a:t>November 4, 2012</a:t>
+              <a:t>November 15, 2012</a:t>
             </a:fld>
             <a:endParaRPr lang="en-US"/>
           </a:p>
@@ -2514,7 +2514,7 @@
               <a:pPr>
                 <a:defRPr/>
               </a:pPr>
-              <a:t>November 4, 2012</a:t>
+              <a:t>November 15, 2012</a:t>
             </a:fld>
             <a:endParaRPr lang="en-US"/>
           </a:p>
@@ -2746,7 +2746,7 @@
               <a:pPr>
                 <a:defRPr/>
               </a:pPr>
-              <a:t>November 4, 2012</a:t>
+              <a:t>November 15, 2012</a:t>
             </a:fld>
             <a:endParaRPr lang="en-US"/>
           </a:p>
@@ -3153,7 +3153,7 @@
               <a:pPr>
                 <a:defRPr/>
               </a:pPr>
-              <a:t>November 4, 2012</a:t>
+              <a:t>November 15, 2012</a:t>
             </a:fld>
             <a:endParaRPr lang="en-US"/>
           </a:p>
@@ -3376,7 +3376,7 @@
               <a:pPr>
                 <a:defRPr/>
               </a:pPr>
-              <a:t>November 4, 2012</a:t>
+              <a:t>November 15, 2012</a:t>
             </a:fld>
             <a:endParaRPr lang="en-US" dirty="0"/>
           </a:p>
@@ -3573,7 +3573,7 @@
               <a:pPr>
                 <a:defRPr/>
               </a:pPr>
-              <a:t>November 4, 2012</a:t>
+              <a:t>November 15, 2012</a:t>
             </a:fld>
             <a:endParaRPr lang="en-US"/>
           </a:p>
@@ -3770,7 +3770,7 @@
               <a:pPr>
                 <a:defRPr/>
               </a:pPr>
-              <a:t>November 4, 2012</a:t>
+              <a:t>November 15, 2012</a:t>
             </a:fld>
             <a:endParaRPr lang="en-US"/>
           </a:p>
@@ -3997,7 +3997,7 @@
               <a:pPr>
                 <a:defRPr/>
               </a:pPr>
-              <a:t>November 4, 2012</a:t>
+              <a:t>November 15, 2012</a:t>
             </a:fld>
             <a:endParaRPr lang="en-US" dirty="0"/>
           </a:p>
@@ -4649,7 +4649,7 @@
                 <a:ea typeface="ＭＳ Ｐゴシック" pitchFamily="34" charset="-128"/>
               </a:rPr>
               <a:pPr/>
-              <a:t>November 4, 2012</a:t>
+              <a:t>November 15, 2012</a:t>
             </a:fld>
             <a:endParaRPr lang="en-US" dirty="0" smtClean="0">
               <a:solidFill>
@@ -4780,7 +4780,7 @@
                 <a:ea typeface="ＭＳ Ｐゴシック" pitchFamily="34" charset="-128"/>
               </a:rPr>
               <a:pPr/>
-              <a:t>November 4, 2012</a:t>
+              <a:t>November 15, 2012</a:t>
             </a:fld>
             <a:endParaRPr lang="en-US" smtClean="0">
               <a:latin typeface="Trade Gothic Next LT Pro Lt" pitchFamily="34" charset="0"/>
@@ -5072,7 +5072,7 @@
                 <a:ea typeface="ＭＳ Ｐゴシック" pitchFamily="34" charset="-128"/>
               </a:rPr>
               <a:pPr/>
-              <a:t>November 4, 2012</a:t>
+              <a:t>November 15, 2012</a:t>
             </a:fld>
             <a:endParaRPr lang="en-US" smtClean="0">
               <a:latin typeface="Trade Gothic Next LT Pro Lt" pitchFamily="34" charset="0"/>
@@ -5933,7 +5933,7 @@
                 <a:ea typeface="ＭＳ Ｐゴシック" pitchFamily="34" charset="-128"/>
               </a:rPr>
               <a:pPr/>
-              <a:t>November 4, 2012</a:t>
+              <a:t>November 15, 2012</a:t>
             </a:fld>
             <a:endParaRPr lang="en-US" smtClean="0">
               <a:latin typeface="Trade Gothic Next LT Pro Lt" pitchFamily="34" charset="0"/>
@@ -6027,11 +6027,7 @@
             <a:pPr eaLnBrk="1" hangingPunct="1"/>
             <a:r>
               <a:rPr lang="en-US" dirty="0" smtClean="0"/>
-              <a:t>Deploy </a:t>
-            </a:r>
-            <a:r>
-              <a:rPr lang="en-US" dirty="0" smtClean="0"/>
-              <a:t>Targets</a:t>
+              <a:t>Deploy Targets</a:t>
             </a:r>
           </a:p>
         </p:txBody>
@@ -6054,7 +6050,7 @@
         </p:spPr>
         <p:txBody>
           <a:bodyPr numCol="1">
-            <a:normAutofit fontScale="77500" lnSpcReduction="20000"/>
+            <a:normAutofit fontScale="85000" lnSpcReduction="20000"/>
           </a:bodyPr>
           <a:lstStyle/>
           <a:p>
@@ -6237,7 +6233,7 @@
                 </a:solidFill>
                 <a:cs typeface="+mn-cs"/>
               </a:rPr>
-              <a:t>signed</a:t>
+              <a:t>test</a:t>
             </a:r>
             <a:r>
               <a:rPr lang="en-US" dirty="0" smtClean="0">
@@ -6258,7 +6254,25 @@
                 </a:solidFill>
                 <a:cs typeface="+mn-cs"/>
               </a:rPr>
-              <a:t> debug</a:t>
+              <a:t> prod</a:t>
+            </a:r>
+            <a:r>
+              <a:rPr lang="en-US" dirty="0" smtClean="0">
+                <a:solidFill>
+                  <a:srgbClr val="989A9B"/>
+                </a:solidFill>
+                <a:cs typeface="+mn-cs"/>
+              </a:rPr>
+              <a:t>, </a:t>
+            </a:r>
+            <a:r>
+              <a:rPr lang="en-US" b="1" dirty="0" smtClean="0">
+                <a:solidFill>
+                  <a:srgbClr val="00A8DF"/>
+                </a:solidFill>
+                <a:cs typeface="+mn-cs"/>
+              </a:rPr>
+              <a:t>beta</a:t>
             </a:r>
             <a:r>
               <a:rPr lang="en-US" dirty="0" smtClean="0">
@@ -6327,54 +6341,34 @@
               <a:rPr lang="en-US" dirty="0" smtClean="0">
                 <a:cs typeface="+mn-cs"/>
               </a:rPr>
-              <a:t>	- native for BlackBerry </a:t>
-            </a:r>
+              <a:t>	- native for BlackBerry 10 also requires defining simulator build or device</a:t>
+            </a:r>
+          </a:p>
+          <a:p>
+            <a:pPr eaLnBrk="1" hangingPunct="1">
+              <a:defRPr/>
+            </a:pPr>
             <a:r>
               <a:rPr lang="en-US" dirty="0" smtClean="0">
                 <a:cs typeface="+mn-cs"/>
               </a:rPr>
-              <a:t>10 also requires defining simulator build or device</a:t>
+              <a:t>	- </a:t>
+            </a:r>
+            <a:r>
+              <a:rPr lang="en-US" dirty="0" smtClean="0">
+                <a:cs typeface="+mn-cs"/>
+              </a:rPr>
+              <a:t>test, prod, beta to </a:t>
+            </a:r>
+            <a:r>
+              <a:rPr lang="en-US" dirty="0" smtClean="0">
+                <a:cs typeface="+mn-cs"/>
+              </a:rPr>
+              <a:t>load the matched build (from the build commands)</a:t>
             </a:r>
             <a:endParaRPr lang="en-US" dirty="0" smtClean="0">
               <a:cs typeface="+mn-cs"/>
             </a:endParaRPr>
-          </a:p>
-          <a:p>
-            <a:pPr eaLnBrk="1" hangingPunct="1">
-              <a:defRPr/>
-            </a:pPr>
-            <a:r>
-              <a:rPr lang="en-US" dirty="0" smtClean="0">
-                <a:cs typeface="+mn-cs"/>
-              </a:rPr>
-              <a:t>	- </a:t>
-            </a:r>
-            <a:r>
-              <a:rPr lang="en-US" dirty="0" smtClean="0">
-                <a:cs typeface="+mn-cs"/>
-              </a:rPr>
-              <a:t>signed for the beta or production builds, which are signed</a:t>
-            </a:r>
-            <a:endParaRPr lang="en-US" dirty="0" smtClean="0">
-              <a:cs typeface="+mn-cs"/>
-            </a:endParaRPr>
-          </a:p>
-          <a:p>
-            <a:pPr eaLnBrk="1" hangingPunct="1">
-              <a:defRPr/>
-            </a:pPr>
-            <a:r>
-              <a:rPr lang="en-US" dirty="0" smtClean="0">
-                <a:cs typeface="+mn-cs"/>
-              </a:rPr>
-              <a:t>	- </a:t>
-            </a:r>
-            <a:r>
-              <a:rPr lang="en-US" dirty="0" smtClean="0">
-                <a:cs typeface="+mn-cs"/>
-              </a:rPr>
-              <a:t>debug for the unsigned debug token builds</a:t>
-            </a:r>
           </a:p>
           <a:p>
             <a:pPr eaLnBrk="1" hangingPunct="1">
@@ -6433,40 +6427,31 @@
               <a:rPr lang="en-US" dirty="0" smtClean="0">
                 <a:cs typeface="+mn-cs"/>
               </a:rPr>
-              <a:t>	&lt;</a:t>
+              <a:t>	&lt;property name="</a:t>
+            </a:r>
+            <a:r>
+              <a:rPr lang="en-US" dirty="0" err="1" smtClean="0">
+                <a:cs typeface="+mn-cs"/>
+              </a:rPr>
+              <a:t>device.ip</a:t>
             </a:r>
             <a:r>
               <a:rPr lang="en-US" dirty="0" smtClean="0">
                 <a:cs typeface="+mn-cs"/>
               </a:rPr>
-              <a:t>property name="</a:t>
-            </a:r>
-            <a:r>
-              <a:rPr lang="en-US" dirty="0" err="1" smtClean="0">
-                <a:cs typeface="+mn-cs"/>
-              </a:rPr>
-              <a:t>device.ip</a:t>
-            </a:r>
+              <a:t>" value="192.168.0.134"/&gt;</a:t>
+            </a:r>
+          </a:p>
+          <a:p>
+            <a:pPr eaLnBrk="1" hangingPunct="1">
+              <a:defRPr/>
+            </a:pPr>
             <a:r>
               <a:rPr lang="en-US" dirty="0" smtClean="0">
                 <a:cs typeface="+mn-cs"/>
               </a:rPr>
-              <a:t>" value="192.168.0.134"/&gt;</a:t>
-            </a:r>
-          </a:p>
-          <a:p>
-            <a:pPr eaLnBrk="1" hangingPunct="1">
-              <a:defRPr/>
-            </a:pPr>
-            <a:r>
-              <a:rPr lang="en-US" dirty="0" smtClean="0">
-                <a:cs typeface="+mn-cs"/>
-              </a:rPr>
               <a:t>	&lt;property name="device.pw" value="" /&gt;</a:t>
             </a:r>
-            <a:endParaRPr lang="en-US" dirty="0" smtClean="0">
-              <a:cs typeface="+mn-cs"/>
-            </a:endParaRPr>
           </a:p>
           <a:p>
             <a:pPr eaLnBrk="1" hangingPunct="1">
@@ -6517,7 +6502,7 @@
                 <a:ea typeface="ＭＳ Ｐゴシック" pitchFamily="34" charset="-128"/>
               </a:rPr>
               <a:pPr/>
-              <a:t>November 4, 2012</a:t>
+              <a:t>November 15, 2012</a:t>
             </a:fld>
             <a:endParaRPr lang="en-US" smtClean="0">
               <a:latin typeface="Trade Gothic Next LT Pro Lt" pitchFamily="34" charset="0"/>
@@ -6644,7 +6629,7 @@
                 <a:ea typeface="ＭＳ Ｐゴシック" pitchFamily="34" charset="-128"/>
               </a:rPr>
               <a:pPr/>
-              <a:t>November 4, 2012</a:t>
+              <a:t>November 15, 2012</a:t>
             </a:fld>
             <a:endParaRPr lang="en-US" smtClean="0">
               <a:latin typeface="Trade Gothic Next LT Pro Lt" pitchFamily="34" charset="0"/>

</xml_diff>

<commit_message>
Added ability to deploy to one device per SDK with different IPs/PWs
</commit_message>
<xml_diff>
--- a/Ant-Build-Script/WebWorksBuildScript.pptx
+++ b/Ant-Build-Script/WebWorksBuildScript.pptx
@@ -247,7 +247,7 @@
               <a:pPr>
                 <a:defRPr/>
               </a:pPr>
-              <a:t>11/15/2012</a:t>
+              <a:t>11/16/2012</a:t>
             </a:fld>
             <a:endParaRPr lang="en-US"/>
           </a:p>
@@ -1037,7 +1037,7 @@
               <a:pPr>
                 <a:defRPr/>
               </a:pPr>
-              <a:t>November 15, 2012</a:t>
+              <a:t>November 16, 2012</a:t>
             </a:fld>
             <a:endParaRPr lang="en-US" dirty="0"/>
           </a:p>
@@ -1247,7 +1247,7 @@
               <a:pPr>
                 <a:defRPr/>
               </a:pPr>
-              <a:t>November 15, 2012</a:t>
+              <a:t>November 16, 2012</a:t>
             </a:fld>
             <a:endParaRPr lang="en-US"/>
           </a:p>
@@ -1466,7 +1466,7 @@
               <a:pPr>
                 <a:defRPr/>
               </a:pPr>
-              <a:t>November 15, 2012</a:t>
+              <a:t>November 16, 2012</a:t>
             </a:fld>
             <a:endParaRPr lang="en-US"/>
           </a:p>
@@ -1690,7 +1690,7 @@
               <a:pPr>
                 <a:defRPr/>
               </a:pPr>
-              <a:t>November 15, 2012</a:t>
+              <a:t>November 16, 2012</a:t>
             </a:fld>
             <a:endParaRPr lang="en-US"/>
           </a:p>
@@ -1892,7 +1892,7 @@
               <a:pPr>
                 <a:defRPr/>
               </a:pPr>
-              <a:t>November 15, 2012</a:t>
+              <a:t>November 16, 2012</a:t>
             </a:fld>
             <a:endParaRPr lang="en-US"/>
           </a:p>
@@ -2094,7 +2094,7 @@
               <a:pPr>
                 <a:defRPr/>
               </a:pPr>
-              <a:t>November 15, 2012</a:t>
+              <a:t>November 16, 2012</a:t>
             </a:fld>
             <a:endParaRPr lang="en-US"/>
           </a:p>
@@ -2332,7 +2332,7 @@
               <a:pPr>
                 <a:defRPr/>
               </a:pPr>
-              <a:t>November 15, 2012</a:t>
+              <a:t>November 16, 2012</a:t>
             </a:fld>
             <a:endParaRPr lang="en-US"/>
           </a:p>
@@ -2514,7 +2514,7 @@
               <a:pPr>
                 <a:defRPr/>
               </a:pPr>
-              <a:t>November 15, 2012</a:t>
+              <a:t>November 16, 2012</a:t>
             </a:fld>
             <a:endParaRPr lang="en-US"/>
           </a:p>
@@ -2746,7 +2746,7 @@
               <a:pPr>
                 <a:defRPr/>
               </a:pPr>
-              <a:t>November 15, 2012</a:t>
+              <a:t>November 16, 2012</a:t>
             </a:fld>
             <a:endParaRPr lang="en-US"/>
           </a:p>
@@ -3153,7 +3153,7 @@
               <a:pPr>
                 <a:defRPr/>
               </a:pPr>
-              <a:t>November 15, 2012</a:t>
+              <a:t>November 16, 2012</a:t>
             </a:fld>
             <a:endParaRPr lang="en-US"/>
           </a:p>
@@ -3376,7 +3376,7 @@
               <a:pPr>
                 <a:defRPr/>
               </a:pPr>
-              <a:t>November 15, 2012</a:t>
+              <a:t>November 16, 2012</a:t>
             </a:fld>
             <a:endParaRPr lang="en-US" dirty="0"/>
           </a:p>
@@ -3573,7 +3573,7 @@
               <a:pPr>
                 <a:defRPr/>
               </a:pPr>
-              <a:t>November 15, 2012</a:t>
+              <a:t>November 16, 2012</a:t>
             </a:fld>
             <a:endParaRPr lang="en-US"/>
           </a:p>
@@ -3770,7 +3770,7 @@
               <a:pPr>
                 <a:defRPr/>
               </a:pPr>
-              <a:t>November 15, 2012</a:t>
+              <a:t>November 16, 2012</a:t>
             </a:fld>
             <a:endParaRPr lang="en-US"/>
           </a:p>
@@ -3997,7 +3997,7 @@
               <a:pPr>
                 <a:defRPr/>
               </a:pPr>
-              <a:t>November 15, 2012</a:t>
+              <a:t>November 16, 2012</a:t>
             </a:fld>
             <a:endParaRPr lang="en-US" dirty="0"/>
           </a:p>
@@ -4649,7 +4649,7 @@
                 <a:ea typeface="ＭＳ Ｐゴシック" pitchFamily="34" charset="-128"/>
               </a:rPr>
               <a:pPr/>
-              <a:t>November 15, 2012</a:t>
+              <a:t>November 16, 2012</a:t>
             </a:fld>
             <a:endParaRPr lang="en-US" dirty="0" smtClean="0">
               <a:solidFill>
@@ -4780,7 +4780,7 @@
                 <a:ea typeface="ＭＳ Ｐゴシック" pitchFamily="34" charset="-128"/>
               </a:rPr>
               <a:pPr/>
-              <a:t>November 15, 2012</a:t>
+              <a:t>November 16, 2012</a:t>
             </a:fld>
             <a:endParaRPr lang="en-US" smtClean="0">
               <a:latin typeface="Trade Gothic Next LT Pro Lt" pitchFamily="34" charset="0"/>
@@ -5072,7 +5072,7 @@
                 <a:ea typeface="ＭＳ Ｐゴシック" pitchFamily="34" charset="-128"/>
               </a:rPr>
               <a:pPr/>
-              <a:t>November 15, 2012</a:t>
+              <a:t>November 16, 2012</a:t>
             </a:fld>
             <a:endParaRPr lang="en-US" smtClean="0">
               <a:latin typeface="Trade Gothic Next LT Pro Lt" pitchFamily="34" charset="0"/>
@@ -5933,7 +5933,7 @@
                 <a:ea typeface="ＭＳ Ｐゴシック" pitchFamily="34" charset="-128"/>
               </a:rPr>
               <a:pPr/>
-              <a:t>November 15, 2012</a:t>
+              <a:t>November 16, 2012</a:t>
             </a:fld>
             <a:endParaRPr lang="en-US" smtClean="0">
               <a:latin typeface="Trade Gothic Next LT Pro Lt" pitchFamily="34" charset="0"/>
@@ -6050,7 +6050,7 @@
         </p:spPr>
         <p:txBody>
           <a:bodyPr numCol="1">
-            <a:normAutofit fontScale="85000" lnSpcReduction="20000"/>
+            <a:normAutofit fontScale="85000" lnSpcReduction="10000"/>
           </a:bodyPr>
           <a:lstStyle/>
           <a:p>
@@ -6283,12 +6283,6 @@
               </a:rPr>
               <a:t>]</a:t>
             </a:r>
-            <a:endParaRPr lang="en-US" dirty="0" smtClean="0">
-              <a:solidFill>
-                <a:srgbClr val="989A9B"/>
-              </a:solidFill>
-              <a:cs typeface="+mn-cs"/>
-            </a:endParaRPr>
           </a:p>
           <a:p>
             <a:pPr eaLnBrk="1" hangingPunct="1">
@@ -6352,20 +6346,13 @@
               <a:rPr lang="en-US" dirty="0" smtClean="0">
                 <a:cs typeface="+mn-cs"/>
               </a:rPr>
-              <a:t>	- </a:t>
-            </a:r>
-            <a:r>
-              <a:rPr lang="en-US" dirty="0" smtClean="0">
-                <a:cs typeface="+mn-cs"/>
-              </a:rPr>
-              <a:t>test, prod, beta to </a:t>
-            </a:r>
-            <a:r>
-              <a:rPr lang="en-US" dirty="0" smtClean="0">
-                <a:cs typeface="+mn-cs"/>
-              </a:rPr>
-              <a:t>load the matched build (from the build commands)</a:t>
-            </a:r>
+              <a:t>	- test, prod, beta to load the matched build (from the build commands)</a:t>
+            </a:r>
+          </a:p>
+          <a:p>
+            <a:pPr eaLnBrk="1" hangingPunct="1">
+              <a:defRPr/>
+            </a:pPr>
             <a:endParaRPr lang="en-US" dirty="0" smtClean="0">
               <a:cs typeface="+mn-cs"/>
             </a:endParaRPr>
@@ -6374,6 +6361,207 @@
             <a:pPr eaLnBrk="1" hangingPunct="1">
               <a:defRPr/>
             </a:pPr>
+            <a:r>
+              <a:rPr lang="en-US" dirty="0" smtClean="0">
+                <a:cs typeface="+mn-cs"/>
+              </a:rPr>
+              <a:t>Set </a:t>
+            </a:r>
+            <a:r>
+              <a:rPr lang="en-US" b="1" dirty="0" smtClean="0">
+                <a:solidFill>
+                  <a:srgbClr val="00A8DF"/>
+                </a:solidFill>
+                <a:cs typeface="+mn-cs"/>
+              </a:rPr>
+              <a:t>device</a:t>
+            </a:r>
+            <a:r>
+              <a:rPr lang="en-US" b="1" dirty="0" smtClean="0">
+                <a:solidFill>
+                  <a:srgbClr val="00A8DF"/>
+                </a:solidFill>
+                <a:cs typeface="+mn-cs"/>
+              </a:rPr>
+              <a:t>.</a:t>
+            </a:r>
+            <a:r>
+              <a:rPr lang="en-US" dirty="0" smtClean="0">
+                <a:solidFill>
+                  <a:srgbClr val="989A9B"/>
+                </a:solidFill>
+                <a:cs typeface="+mn-cs"/>
+              </a:rPr>
+              <a:t>[</a:t>
+            </a:r>
+            <a:r>
+              <a:rPr lang="en-US" b="1" dirty="0" smtClean="0">
+                <a:solidFill>
+                  <a:srgbClr val="00A8DF"/>
+                </a:solidFill>
+                <a:cs typeface="+mn-cs"/>
+              </a:rPr>
+              <a:t>native</a:t>
+            </a:r>
+            <a:r>
+              <a:rPr lang="en-US" dirty="0" smtClean="0">
+                <a:solidFill>
+                  <a:srgbClr val="989A9B"/>
+                </a:solidFill>
+                <a:cs typeface="+mn-cs"/>
+              </a:rPr>
+              <a:t>,</a:t>
+            </a:r>
+            <a:r>
+              <a:rPr lang="en-US" b="1" dirty="0" smtClean="0">
+                <a:solidFill>
+                  <a:srgbClr val="00A8DF"/>
+                </a:solidFill>
+                <a:cs typeface="+mn-cs"/>
+              </a:rPr>
+              <a:t> air</a:t>
+            </a:r>
+            <a:r>
+              <a:rPr lang="en-US" dirty="0" smtClean="0">
+                <a:solidFill>
+                  <a:srgbClr val="989A9B"/>
+                </a:solidFill>
+                <a:cs typeface="+mn-cs"/>
+              </a:rPr>
+              <a:t>]</a:t>
+            </a:r>
+            <a:r>
+              <a:rPr lang="en-US" b="1" dirty="0" smtClean="0">
+                <a:solidFill>
+                  <a:srgbClr val="00A8DF"/>
+                </a:solidFill>
+                <a:cs typeface="+mn-cs"/>
+              </a:rPr>
+              <a:t>.</a:t>
+            </a:r>
+            <a:r>
+              <a:rPr lang="en-US" b="1" dirty="0" err="1" smtClean="0">
+                <a:solidFill>
+                  <a:srgbClr val="00A8DF"/>
+                </a:solidFill>
+                <a:cs typeface="+mn-cs"/>
+              </a:rPr>
+              <a:t>ip</a:t>
+            </a:r>
+            <a:r>
+              <a:rPr lang="en-US" dirty="0" smtClean="0">
+                <a:cs typeface="+mn-cs"/>
+              </a:rPr>
+              <a:t> and/or </a:t>
+            </a:r>
+            <a:r>
+              <a:rPr lang="en-US" b="1" dirty="0" smtClean="0">
+                <a:solidFill>
+                  <a:srgbClr val="00A8DF"/>
+                </a:solidFill>
+                <a:cs typeface="+mn-cs"/>
+              </a:rPr>
+              <a:t>device</a:t>
+            </a:r>
+            <a:r>
+              <a:rPr lang="en-US" b="1" dirty="0" smtClean="0">
+                <a:solidFill>
+                  <a:srgbClr val="00A8DF"/>
+                </a:solidFill>
+                <a:cs typeface="+mn-cs"/>
+              </a:rPr>
+              <a:t>.</a:t>
+            </a:r>
+            <a:r>
+              <a:rPr lang="en-US" dirty="0" smtClean="0">
+                <a:solidFill>
+                  <a:srgbClr val="989A9B"/>
+                </a:solidFill>
+                <a:cs typeface="+mn-cs"/>
+              </a:rPr>
+              <a:t>[</a:t>
+            </a:r>
+            <a:r>
+              <a:rPr lang="en-US" b="1" dirty="0" smtClean="0">
+                <a:solidFill>
+                  <a:srgbClr val="00A8DF"/>
+                </a:solidFill>
+                <a:cs typeface="+mn-cs"/>
+              </a:rPr>
+              <a:t>native</a:t>
+            </a:r>
+            <a:r>
+              <a:rPr lang="en-US" dirty="0" smtClean="0">
+                <a:solidFill>
+                  <a:srgbClr val="989A9B"/>
+                </a:solidFill>
+                <a:cs typeface="+mn-cs"/>
+              </a:rPr>
+              <a:t>,</a:t>
+            </a:r>
+            <a:r>
+              <a:rPr lang="en-US" b="1" dirty="0" smtClean="0">
+                <a:solidFill>
+                  <a:srgbClr val="00A8DF"/>
+                </a:solidFill>
+                <a:cs typeface="+mn-cs"/>
+              </a:rPr>
+              <a:t> air</a:t>
+            </a:r>
+            <a:r>
+              <a:rPr lang="en-US" dirty="0" smtClean="0">
+                <a:solidFill>
+                  <a:srgbClr val="989A9B"/>
+                </a:solidFill>
+                <a:cs typeface="+mn-cs"/>
+              </a:rPr>
+              <a:t>,</a:t>
+            </a:r>
+            <a:r>
+              <a:rPr lang="en-US" b="1" dirty="0" smtClean="0">
+                <a:solidFill>
+                  <a:srgbClr val="00A8DF"/>
+                </a:solidFill>
+                <a:cs typeface="+mn-cs"/>
+              </a:rPr>
+              <a:t> java</a:t>
+            </a:r>
+            <a:r>
+              <a:rPr lang="en-US" dirty="0" smtClean="0">
+                <a:solidFill>
+                  <a:srgbClr val="989A9B"/>
+                </a:solidFill>
+                <a:cs typeface="+mn-cs"/>
+              </a:rPr>
+              <a:t>]</a:t>
+            </a:r>
+            <a:r>
+              <a:rPr lang="en-US" b="1" dirty="0" smtClean="0">
+                <a:solidFill>
+                  <a:srgbClr val="00A8DF"/>
+                </a:solidFill>
+                <a:cs typeface="+mn-cs"/>
+              </a:rPr>
+              <a:t>.pw</a:t>
+            </a:r>
+            <a:r>
+              <a:rPr lang="en-US" dirty="0" smtClean="0">
+                <a:cs typeface="+mn-cs"/>
+              </a:rPr>
+              <a:t> </a:t>
+            </a:r>
+            <a:r>
+              <a:rPr lang="en-US" dirty="0" smtClean="0">
+                <a:cs typeface="+mn-cs"/>
+              </a:rPr>
+              <a:t>properties </a:t>
+            </a:r>
+            <a:r>
+              <a:rPr lang="en-US" dirty="0" smtClean="0">
+                <a:cs typeface="+mn-cs"/>
+              </a:rPr>
+              <a:t>when deploying</a:t>
+            </a:r>
             <a:endParaRPr lang="en-US" dirty="0" smtClean="0">
               <a:cs typeface="+mn-cs"/>
             </a:endParaRPr>
@@ -6386,37 +6574,19 @@
               <a:rPr lang="en-US" dirty="0" smtClean="0">
                 <a:cs typeface="+mn-cs"/>
               </a:rPr>
-              <a:t>Set </a:t>
-            </a:r>
-            <a:r>
-              <a:rPr lang="en-US" b="1" dirty="0" err="1" smtClean="0">
-                <a:solidFill>
-                  <a:srgbClr val="00A8DF"/>
-                </a:solidFill>
-                <a:cs typeface="+mn-cs"/>
-              </a:rPr>
-              <a:t>device.ip</a:t>
-            </a:r>
-            <a:r>
-              <a:rPr lang="en-US" dirty="0" smtClean="0">
-                <a:cs typeface="+mn-cs"/>
-              </a:rPr>
-              <a:t> and </a:t>
-            </a:r>
-            <a:r>
-              <a:rPr lang="en-US" b="1" dirty="0" smtClean="0">
-                <a:solidFill>
-                  <a:srgbClr val="00A8DF"/>
-                </a:solidFill>
-                <a:cs typeface="+mn-cs"/>
-              </a:rPr>
-              <a:t>device.pw</a:t>
-            </a:r>
-            <a:r>
-              <a:rPr lang="en-US" dirty="0" smtClean="0">
-                <a:cs typeface="+mn-cs"/>
-              </a:rPr>
-              <a:t> properties when building for Tablet (air) or BlackBerry 10 (native)</a:t>
+              <a:t>	&lt;property name="</a:t>
+            </a:r>
+            <a:r>
+              <a:rPr lang="en-US" dirty="0" err="1" smtClean="0">
+                <a:cs typeface="+mn-cs"/>
+              </a:rPr>
+              <a:t>device.native.ip</a:t>
+            </a:r>
+            <a:r>
+              <a:rPr lang="en-US" dirty="0" smtClean="0">
+                <a:cs typeface="+mn-cs"/>
+              </a:rPr>
+              <a:t>" value="192.168.0.134"/&gt;</a:t>
             </a:r>
           </a:p>
           <a:p>
@@ -6430,27 +6600,16 @@
               <a:t>	&lt;property name="</a:t>
             </a:r>
             <a:r>
-              <a:rPr lang="en-US" dirty="0" err="1" smtClean="0">
-                <a:cs typeface="+mn-cs"/>
-              </a:rPr>
-              <a:t>device.ip</a:t>
-            </a:r>
-            <a:r>
-              <a:rPr lang="en-US" dirty="0" smtClean="0">
-                <a:cs typeface="+mn-cs"/>
-              </a:rPr>
-              <a:t>" value="192.168.0.134"/&gt;</a:t>
-            </a:r>
-          </a:p>
-          <a:p>
-            <a:pPr eaLnBrk="1" hangingPunct="1">
-              <a:defRPr/>
-            </a:pPr>
-            <a:r>
-              <a:rPr lang="en-US" dirty="0" smtClean="0">
-                <a:cs typeface="+mn-cs"/>
-              </a:rPr>
-              <a:t>	&lt;property name="device.pw" value="" /&gt;</a:t>
+              <a:rPr lang="en-US" dirty="0" smtClean="0">
+                <a:cs typeface="+mn-cs"/>
+              </a:rPr>
+              <a:t>device.native.pw</a:t>
+            </a:r>
+            <a:r>
+              <a:rPr lang="en-US" dirty="0" smtClean="0">
+                <a:cs typeface="+mn-cs"/>
+              </a:rPr>
+              <a:t>" value="" /&gt;</a:t>
             </a:r>
           </a:p>
           <a:p>
@@ -6502,7 +6661,7 @@
                 <a:ea typeface="ＭＳ Ｐゴシック" pitchFamily="34" charset="-128"/>
               </a:rPr>
               <a:pPr/>
-              <a:t>November 15, 2012</a:t>
+              <a:t>November 16, 2012</a:t>
             </a:fld>
             <a:endParaRPr lang="en-US" smtClean="0">
               <a:latin typeface="Trade Gothic Next LT Pro Lt" pitchFamily="34" charset="0"/>
@@ -6629,7 +6788,7 @@
                 <a:ea typeface="ＭＳ Ｐゴシック" pitchFamily="34" charset="-128"/>
               </a:rPr>
               <a:pPr/>
-              <a:t>November 15, 2012</a:t>
+              <a:t>November 16, 2012</a:t>
             </a:fld>
             <a:endParaRPr lang="en-US" smtClean="0">
               <a:latin typeface="Trade Gothic Next LT Pro Lt" pitchFamily="34" charset="0"/>

</xml_diff>

<commit_message>
Updated link to repository
</commit_message>
<xml_diff>
--- a/Ant-Build-Script/WebWorksBuildScript.pptx
+++ b/Ant-Build-Script/WebWorksBuildScript.pptx
@@ -247,7 +247,7 @@
               <a:pPr>
                 <a:defRPr/>
               </a:pPr>
-              <a:t>11/16/2012</a:t>
+              <a:t>11/21/2012</a:t>
             </a:fld>
             <a:endParaRPr lang="en-US"/>
           </a:p>
@@ -1037,7 +1037,7 @@
               <a:pPr>
                 <a:defRPr/>
               </a:pPr>
-              <a:t>November 16, 2012</a:t>
+              <a:t>November 21, 2012</a:t>
             </a:fld>
             <a:endParaRPr lang="en-US" dirty="0"/>
           </a:p>
@@ -1247,7 +1247,7 @@
               <a:pPr>
                 <a:defRPr/>
               </a:pPr>
-              <a:t>November 16, 2012</a:t>
+              <a:t>November 21, 2012</a:t>
             </a:fld>
             <a:endParaRPr lang="en-US"/>
           </a:p>
@@ -1466,7 +1466,7 @@
               <a:pPr>
                 <a:defRPr/>
               </a:pPr>
-              <a:t>November 16, 2012</a:t>
+              <a:t>November 21, 2012</a:t>
             </a:fld>
             <a:endParaRPr lang="en-US"/>
           </a:p>
@@ -1690,7 +1690,7 @@
               <a:pPr>
                 <a:defRPr/>
               </a:pPr>
-              <a:t>November 16, 2012</a:t>
+              <a:t>November 21, 2012</a:t>
             </a:fld>
             <a:endParaRPr lang="en-US"/>
           </a:p>
@@ -1892,7 +1892,7 @@
               <a:pPr>
                 <a:defRPr/>
               </a:pPr>
-              <a:t>November 16, 2012</a:t>
+              <a:t>November 21, 2012</a:t>
             </a:fld>
             <a:endParaRPr lang="en-US"/>
           </a:p>
@@ -2094,7 +2094,7 @@
               <a:pPr>
                 <a:defRPr/>
               </a:pPr>
-              <a:t>November 16, 2012</a:t>
+              <a:t>November 21, 2012</a:t>
             </a:fld>
             <a:endParaRPr lang="en-US"/>
           </a:p>
@@ -2332,7 +2332,7 @@
               <a:pPr>
                 <a:defRPr/>
               </a:pPr>
-              <a:t>November 16, 2012</a:t>
+              <a:t>November 21, 2012</a:t>
             </a:fld>
             <a:endParaRPr lang="en-US"/>
           </a:p>
@@ -2514,7 +2514,7 @@
               <a:pPr>
                 <a:defRPr/>
               </a:pPr>
-              <a:t>November 16, 2012</a:t>
+              <a:t>November 21, 2012</a:t>
             </a:fld>
             <a:endParaRPr lang="en-US"/>
           </a:p>
@@ -2746,7 +2746,7 @@
               <a:pPr>
                 <a:defRPr/>
               </a:pPr>
-              <a:t>November 16, 2012</a:t>
+              <a:t>November 21, 2012</a:t>
             </a:fld>
             <a:endParaRPr lang="en-US"/>
           </a:p>
@@ -3153,7 +3153,7 @@
               <a:pPr>
                 <a:defRPr/>
               </a:pPr>
-              <a:t>November 16, 2012</a:t>
+              <a:t>November 21, 2012</a:t>
             </a:fld>
             <a:endParaRPr lang="en-US"/>
           </a:p>
@@ -3376,7 +3376,7 @@
               <a:pPr>
                 <a:defRPr/>
               </a:pPr>
-              <a:t>November 16, 2012</a:t>
+              <a:t>November 21, 2012</a:t>
             </a:fld>
             <a:endParaRPr lang="en-US" dirty="0"/>
           </a:p>
@@ -3573,7 +3573,7 @@
               <a:pPr>
                 <a:defRPr/>
               </a:pPr>
-              <a:t>November 16, 2012</a:t>
+              <a:t>November 21, 2012</a:t>
             </a:fld>
             <a:endParaRPr lang="en-US"/>
           </a:p>
@@ -3770,7 +3770,7 @@
               <a:pPr>
                 <a:defRPr/>
               </a:pPr>
-              <a:t>November 16, 2012</a:t>
+              <a:t>November 21, 2012</a:t>
             </a:fld>
             <a:endParaRPr lang="en-US"/>
           </a:p>
@@ -3997,7 +3997,7 @@
               <a:pPr>
                 <a:defRPr/>
               </a:pPr>
-              <a:t>November 16, 2012</a:t>
+              <a:t>November 21, 2012</a:t>
             </a:fld>
             <a:endParaRPr lang="en-US" dirty="0"/>
           </a:p>
@@ -4649,7 +4649,7 @@
                 <a:ea typeface="ＭＳ Ｐゴシック" pitchFamily="34" charset="-128"/>
               </a:rPr>
               <a:pPr/>
-              <a:t>November 16, 2012</a:t>
+              <a:t>November 21, 2012</a:t>
             </a:fld>
             <a:endParaRPr lang="en-US" dirty="0" smtClean="0">
               <a:solidFill>
@@ -4780,7 +4780,7 @@
                 <a:ea typeface="ＭＳ Ｐゴシック" pitchFamily="34" charset="-128"/>
               </a:rPr>
               <a:pPr/>
-              <a:t>November 16, 2012</a:t>
+              <a:t>November 21, 2012</a:t>
             </a:fld>
             <a:endParaRPr lang="en-US" smtClean="0">
               <a:latin typeface="Trade Gothic Next LT Pro Lt" pitchFamily="34" charset="0"/>
@@ -5072,7 +5072,7 @@
                 <a:ea typeface="ＭＳ Ｐゴシック" pitchFamily="34" charset="-128"/>
               </a:rPr>
               <a:pPr/>
-              <a:t>November 16, 2012</a:t>
+              <a:t>November 21, 2012</a:t>
             </a:fld>
             <a:endParaRPr lang="en-US" smtClean="0">
               <a:latin typeface="Trade Gothic Next LT Pro Lt" pitchFamily="34" charset="0"/>
@@ -5933,7 +5933,7 @@
                 <a:ea typeface="ＭＳ Ｐゴシック" pitchFamily="34" charset="-128"/>
               </a:rPr>
               <a:pPr/>
-              <a:t>November 16, 2012</a:t>
+              <a:t>November 21, 2012</a:t>
             </a:fld>
             <a:endParaRPr lang="en-US" smtClean="0">
               <a:latin typeface="Trade Gothic Next LT Pro Lt" pitchFamily="34" charset="0"/>
@@ -6374,7 +6374,16 @@
                 </a:solidFill>
                 <a:cs typeface="+mn-cs"/>
               </a:rPr>
-              <a:t>device</a:t>
+              <a:t>device.</a:t>
+            </a:r>
+            <a:r>
+              <a:rPr lang="en-US" dirty="0" smtClean="0">
+                <a:solidFill>
+                  <a:srgbClr val="989A9B"/>
+                </a:solidFill>
+                <a:cs typeface="+mn-cs"/>
+              </a:rPr>
+              <a:t>[</a:t>
             </a:r>
             <a:r>
               <a:rPr lang="en-US" b="1" dirty="0" smtClean="0">
@@ -6383,10 +6392,70 @@
                 </a:solidFill>
                 <a:cs typeface="+mn-cs"/>
               </a:rPr>
+              <a:t>native</a:t>
+            </a:r>
+            <a:r>
+              <a:rPr lang="en-US" dirty="0" smtClean="0">
+                <a:solidFill>
+                  <a:srgbClr val="989A9B"/>
+                </a:solidFill>
+                <a:cs typeface="+mn-cs"/>
+              </a:rPr>
+              <a:t>,</a:t>
+            </a:r>
+            <a:r>
+              <a:rPr lang="en-US" b="1" dirty="0" smtClean="0">
+                <a:solidFill>
+                  <a:srgbClr val="00A8DF"/>
+                </a:solidFill>
+                <a:cs typeface="+mn-cs"/>
+              </a:rPr>
+              <a:t> air</a:t>
+            </a:r>
+            <a:r>
+              <a:rPr lang="en-US" dirty="0" smtClean="0">
+                <a:solidFill>
+                  <a:srgbClr val="989A9B"/>
+                </a:solidFill>
+                <a:cs typeface="+mn-cs"/>
+              </a:rPr>
+              <a:t>]</a:t>
+            </a:r>
+            <a:r>
+              <a:rPr lang="en-US" b="1" dirty="0" smtClean="0">
+                <a:solidFill>
+                  <a:srgbClr val="00A8DF"/>
+                </a:solidFill>
+                <a:cs typeface="+mn-cs"/>
+              </a:rPr>
               <a:t>.</a:t>
             </a:r>
             <a:r>
+              <a:rPr lang="en-US" b="1" dirty="0" err="1" smtClean="0">
+                <a:solidFill>
+                  <a:srgbClr val="00A8DF"/>
+                </a:solidFill>
+                <a:cs typeface="+mn-cs"/>
+              </a:rPr>
+              <a:t>ip</a:t>
+            </a:r>
+            <a:r>
               <a:rPr lang="en-US" dirty="0" smtClean="0">
+                <a:cs typeface="+mn-cs"/>
+              </a:rPr>
+              <a:t> and/or </a:t>
+            </a:r>
+            <a:r>
+              <a:rPr lang="en-US" b="1" dirty="0" smtClean="0">
+                <a:solidFill>
+                  <a:srgbClr val="00A8DF"/>
+                </a:solidFill>
+                <a:cs typeface="+mn-cs"/>
+              </a:rPr>
+              <a:t>device.</a:t>
+            </a:r>
+            <a:r>
+              <a:rPr lang="en-US" dirty="0" smtClean="0">
                 <a:solidFill>
                   <a:srgbClr val="989A9B"/>
                 </a:solidFill>
@@ -6428,6 +6497,24 @@
                 </a:solidFill>
                 <a:cs typeface="+mn-cs"/>
               </a:rPr>
+              <a:t>,</a:t>
+            </a:r>
+            <a:r>
+              <a:rPr lang="en-US" b="1" dirty="0" smtClean="0">
+                <a:solidFill>
+                  <a:srgbClr val="00A8DF"/>
+                </a:solidFill>
+                <a:cs typeface="+mn-cs"/>
+              </a:rPr>
+              <a:t> java</a:t>
+            </a:r>
+            <a:r>
+              <a:rPr lang="en-US" dirty="0" smtClean="0">
+                <a:solidFill>
+                  <a:srgbClr val="989A9B"/>
+                </a:solidFill>
+                <a:cs typeface="+mn-cs"/>
+              </a:rPr>
               <a:t>]</a:t>
             </a:r>
             <a:r>
@@ -6437,179 +6524,47 @@
                 </a:solidFill>
                 <a:cs typeface="+mn-cs"/>
               </a:rPr>
-              <a:t>.</a:t>
-            </a:r>
-            <a:r>
-              <a:rPr lang="en-US" b="1" dirty="0" err="1" smtClean="0">
-                <a:solidFill>
-                  <a:srgbClr val="00A8DF"/>
-                </a:solidFill>
-                <a:cs typeface="+mn-cs"/>
-              </a:rPr>
-              <a:t>ip</a:t>
+              <a:t>.pw</a:t>
             </a:r>
             <a:r>
               <a:rPr lang="en-US" dirty="0" smtClean="0">
                 <a:cs typeface="+mn-cs"/>
               </a:rPr>
-              <a:t> and/or </a:t>
-            </a:r>
-            <a:r>
-              <a:rPr lang="en-US" b="1" dirty="0" smtClean="0">
-                <a:solidFill>
-                  <a:srgbClr val="00A8DF"/>
-                </a:solidFill>
-                <a:cs typeface="+mn-cs"/>
-              </a:rPr>
-              <a:t>device</a:t>
-            </a:r>
-            <a:r>
-              <a:rPr lang="en-US" b="1" dirty="0" smtClean="0">
-                <a:solidFill>
-                  <a:srgbClr val="00A8DF"/>
-                </a:solidFill>
-                <a:cs typeface="+mn-cs"/>
-              </a:rPr>
-              <a:t>.</a:t>
-            </a:r>
+              <a:t> properties when deploying</a:t>
+            </a:r>
+          </a:p>
+          <a:p>
+            <a:pPr eaLnBrk="1" hangingPunct="1">
+              <a:defRPr/>
+            </a:pPr>
             <a:r>
               <a:rPr lang="en-US" dirty="0" smtClean="0">
-                <a:solidFill>
-                  <a:srgbClr val="989A9B"/>
-                </a:solidFill>
-                <a:cs typeface="+mn-cs"/>
-              </a:rPr>
-              <a:t>[</a:t>
-            </a:r>
-            <a:r>
-              <a:rPr lang="en-US" b="1" dirty="0" smtClean="0">
-                <a:solidFill>
-                  <a:srgbClr val="00A8DF"/>
-                </a:solidFill>
-                <a:cs typeface="+mn-cs"/>
-              </a:rPr>
-              <a:t>native</a:t>
+                <a:cs typeface="+mn-cs"/>
+              </a:rPr>
+              <a:t>	&lt;property name="</a:t>
+            </a:r>
+            <a:r>
+              <a:rPr lang="en-US" dirty="0" err="1" smtClean="0">
+                <a:cs typeface="+mn-cs"/>
+              </a:rPr>
+              <a:t>device.native.ip</a:t>
             </a:r>
             <a:r>
               <a:rPr lang="en-US" dirty="0" smtClean="0">
-                <a:solidFill>
-                  <a:srgbClr val="989A9B"/>
-                </a:solidFill>
-                <a:cs typeface="+mn-cs"/>
-              </a:rPr>
-              <a:t>,</a:t>
-            </a:r>
-            <a:r>
-              <a:rPr lang="en-US" b="1" dirty="0" smtClean="0">
-                <a:solidFill>
-                  <a:srgbClr val="00A8DF"/>
-                </a:solidFill>
-                <a:cs typeface="+mn-cs"/>
-              </a:rPr>
-              <a:t> air</a:t>
-            </a:r>
+                <a:cs typeface="+mn-cs"/>
+              </a:rPr>
+              <a:t>" value="192.168.0.134"/&gt;</a:t>
+            </a:r>
+          </a:p>
+          <a:p>
+            <a:pPr eaLnBrk="1" hangingPunct="1">
+              <a:defRPr/>
+            </a:pPr>
             <a:r>
               <a:rPr lang="en-US" dirty="0" smtClean="0">
-                <a:solidFill>
-                  <a:srgbClr val="989A9B"/>
-                </a:solidFill>
-                <a:cs typeface="+mn-cs"/>
-              </a:rPr>
-              <a:t>,</a:t>
-            </a:r>
-            <a:r>
-              <a:rPr lang="en-US" b="1" dirty="0" smtClean="0">
-                <a:solidFill>
-                  <a:srgbClr val="00A8DF"/>
-                </a:solidFill>
-                <a:cs typeface="+mn-cs"/>
-              </a:rPr>
-              <a:t> java</a:t>
-            </a:r>
-            <a:r>
-              <a:rPr lang="en-US" dirty="0" smtClean="0">
-                <a:solidFill>
-                  <a:srgbClr val="989A9B"/>
-                </a:solidFill>
-                <a:cs typeface="+mn-cs"/>
-              </a:rPr>
-              <a:t>]</a:t>
-            </a:r>
-            <a:r>
-              <a:rPr lang="en-US" b="1" dirty="0" smtClean="0">
-                <a:solidFill>
-                  <a:srgbClr val="00A8DF"/>
-                </a:solidFill>
-                <a:cs typeface="+mn-cs"/>
-              </a:rPr>
-              <a:t>.pw</a:t>
-            </a:r>
-            <a:r>
-              <a:rPr lang="en-US" dirty="0" smtClean="0">
-                <a:cs typeface="+mn-cs"/>
-              </a:rPr>
-              <a:t> </a:t>
-            </a:r>
-            <a:r>
-              <a:rPr lang="en-US" dirty="0" smtClean="0">
-                <a:cs typeface="+mn-cs"/>
-              </a:rPr>
-              <a:t>properties </a:t>
-            </a:r>
-            <a:r>
-              <a:rPr lang="en-US" dirty="0" smtClean="0">
-                <a:cs typeface="+mn-cs"/>
-              </a:rPr>
-              <a:t>when deploying</a:t>
-            </a:r>
-            <a:endParaRPr lang="en-US" dirty="0" smtClean="0">
-              <a:cs typeface="+mn-cs"/>
-            </a:endParaRPr>
-          </a:p>
-          <a:p>
-            <a:pPr eaLnBrk="1" hangingPunct="1">
-              <a:defRPr/>
-            </a:pPr>
-            <a:r>
-              <a:rPr lang="en-US" dirty="0" smtClean="0">
-                <a:cs typeface="+mn-cs"/>
-              </a:rPr>
-              <a:t>	&lt;property name="</a:t>
-            </a:r>
-            <a:r>
-              <a:rPr lang="en-US" dirty="0" err="1" smtClean="0">
-                <a:cs typeface="+mn-cs"/>
-              </a:rPr>
-              <a:t>device.native.ip</a:t>
-            </a:r>
-            <a:r>
-              <a:rPr lang="en-US" dirty="0" smtClean="0">
-                <a:cs typeface="+mn-cs"/>
-              </a:rPr>
-              <a:t>" value="192.168.0.134"/&gt;</a:t>
-            </a:r>
-          </a:p>
-          <a:p>
-            <a:pPr eaLnBrk="1" hangingPunct="1">
-              <a:defRPr/>
-            </a:pPr>
-            <a:r>
-              <a:rPr lang="en-US" dirty="0" smtClean="0">
-                <a:cs typeface="+mn-cs"/>
-              </a:rPr>
-              <a:t>	&lt;property name="</a:t>
-            </a:r>
-            <a:r>
-              <a:rPr lang="en-US" dirty="0" smtClean="0">
-                <a:cs typeface="+mn-cs"/>
-              </a:rPr>
-              <a:t>device.native.pw</a:t>
-            </a:r>
-            <a:r>
-              <a:rPr lang="en-US" dirty="0" smtClean="0">
-                <a:cs typeface="+mn-cs"/>
-              </a:rPr>
-              <a:t>" value="" /&gt;</a:t>
+                <a:cs typeface="+mn-cs"/>
+              </a:rPr>
+              <a:t>	&lt;property name="device.native.pw" value="" /&gt;</a:t>
             </a:r>
           </a:p>
           <a:p>
@@ -6661,7 +6616,7 @@
                 <a:ea typeface="ＭＳ Ｐゴシック" pitchFamily="34" charset="-128"/>
               </a:rPr>
               <a:pPr/>
-              <a:t>November 16, 2012</a:t>
+              <a:t>November 21, 2012</a:t>
             </a:fld>
             <a:endParaRPr lang="en-US" smtClean="0">
               <a:latin typeface="Trade Gothic Next LT Pro Lt" pitchFamily="34" charset="0"/>
@@ -6788,7 +6743,7 @@
                 <a:ea typeface="ＭＳ Ｐゴシック" pitchFamily="34" charset="-128"/>
               </a:rPr>
               <a:pPr/>
-              <a:t>November 16, 2012</a:t>
+              <a:t>November 21, 2012</a:t>
             </a:fld>
             <a:endParaRPr lang="en-US" smtClean="0">
               <a:latin typeface="Trade Gothic Next LT Pro Lt" pitchFamily="34" charset="0"/>
@@ -6910,55 +6865,6 @@
             </a:r>
             <a:endParaRPr lang="en-US" dirty="0">
               <a:cs typeface="+mn-cs"/>
-            </a:endParaRPr>
-          </a:p>
-        </p:txBody>
-      </p:sp>
-      <p:sp>
-        <p:nvSpPr>
-          <p:cNvPr id="8" name="TextBox 7"/>
-          <p:cNvSpPr txBox="1"/>
-          <p:nvPr/>
-        </p:nvSpPr>
-        <p:spPr>
-          <a:xfrm>
-            <a:off x="3332533" y="3787260"/>
-            <a:ext cx="10445616" cy="461665"/>
-          </a:xfrm>
-          <a:prstGeom prst="rect">
-            <a:avLst/>
-          </a:prstGeom>
-          <a:noFill/>
-        </p:spPr>
-        <p:txBody>
-          <a:bodyPr wrap="none" rtlCol="0">
-            <a:spAutoFit/>
-          </a:bodyPr>
-          <a:lstStyle/>
-          <a:p>
-            <a:r>
-              <a:rPr lang="en-US" dirty="0" smtClean="0">
-                <a:solidFill>
-                  <a:schemeClr val="accent1">
-                    <a:lumMod val="60000"/>
-                    <a:lumOff val="40000"/>
-                  </a:schemeClr>
-                </a:solidFill>
-              </a:rPr>
-              <a:t>→ </a:t>
-            </a:r>
-            <a:r>
-              <a:rPr lang="en-US" dirty="0" smtClean="0">
-                <a:solidFill>
-                  <a:srgbClr val="00A8DF"/>
-                </a:solidFill>
-              </a:rPr>
-              <a:t>https://github.com/blackberry/WebWorks-Samples/WebWorksBuildScript</a:t>
-            </a:r>
-            <a:endParaRPr lang="en-US" dirty="0">
-              <a:solidFill>
-                <a:srgbClr val="00A8DF"/>
-              </a:solidFill>
             </a:endParaRPr>
           </a:p>
         </p:txBody>
@@ -7002,6 +6908,55 @@
                 </a:solidFill>
               </a:rPr>
               <a:t>→ %PATH% = %PATH%;%ANT_HOME%\bin</a:t>
+            </a:r>
+            <a:endParaRPr lang="en-US" dirty="0">
+              <a:solidFill>
+                <a:srgbClr val="00A8DF"/>
+              </a:solidFill>
+            </a:endParaRPr>
+          </a:p>
+        </p:txBody>
+      </p:sp>
+      <p:sp>
+        <p:nvSpPr>
+          <p:cNvPr id="10" name="TextBox 9"/>
+          <p:cNvSpPr txBox="1"/>
+          <p:nvPr/>
+        </p:nvSpPr>
+        <p:spPr>
+          <a:xfrm>
+            <a:off x="853808" y="3787260"/>
+            <a:ext cx="13776592" cy="461665"/>
+          </a:xfrm>
+          <a:prstGeom prst="rect">
+            <a:avLst/>
+          </a:prstGeom>
+          <a:noFill/>
+        </p:spPr>
+        <p:txBody>
+          <a:bodyPr wrap="none" rtlCol="0">
+            <a:spAutoFit/>
+          </a:bodyPr>
+          <a:lstStyle/>
+          <a:p>
+            <a:r>
+              <a:rPr lang="en-US" dirty="0" smtClean="0">
+                <a:solidFill>
+                  <a:schemeClr val="accent1">
+                    <a:lumMod val="60000"/>
+                    <a:lumOff val="40000"/>
+                  </a:schemeClr>
+                </a:solidFill>
+              </a:rPr>
+              <a:t>→ </a:t>
+            </a:r>
+            <a:r>
+              <a:rPr lang="en-US" dirty="0" smtClean="0">
+                <a:solidFill>
+                  <a:srgbClr val="00A8DF"/>
+                </a:solidFill>
+              </a:rPr>
+              <a:t>https://github.com/blackberry/BB10-WebWorks-Community-Samples/tree/master/Ant-Build-Script</a:t>
             </a:r>
             <a:endParaRPr lang="en-US" dirty="0">
               <a:solidFill>

</xml_diff>

<commit_message>
Java.test build now doesn't sign, and won't use a password for deployment - it is for simulator only.
</commit_message>
<xml_diff>
--- a/Ant-Build-Script/WebWorksBuildScript.pptx
+++ b/Ant-Build-Script/WebWorksBuildScript.pptx
@@ -247,7 +247,7 @@
               <a:pPr>
                 <a:defRPr/>
               </a:pPr>
-              <a:t>11/21/2012</a:t>
+              <a:t>11/28/2012</a:t>
             </a:fld>
             <a:endParaRPr lang="en-US"/>
           </a:p>
@@ -1037,7 +1037,7 @@
               <a:pPr>
                 <a:defRPr/>
               </a:pPr>
-              <a:t>November 21, 2012</a:t>
+              <a:t>November 28, 2012</a:t>
             </a:fld>
             <a:endParaRPr lang="en-US" dirty="0"/>
           </a:p>
@@ -1247,7 +1247,7 @@
               <a:pPr>
                 <a:defRPr/>
               </a:pPr>
-              <a:t>November 21, 2012</a:t>
+              <a:t>November 28, 2012</a:t>
             </a:fld>
             <a:endParaRPr lang="en-US"/>
           </a:p>
@@ -1466,7 +1466,7 @@
               <a:pPr>
                 <a:defRPr/>
               </a:pPr>
-              <a:t>November 21, 2012</a:t>
+              <a:t>November 28, 2012</a:t>
             </a:fld>
             <a:endParaRPr lang="en-US"/>
           </a:p>
@@ -1690,7 +1690,7 @@
               <a:pPr>
                 <a:defRPr/>
               </a:pPr>
-              <a:t>November 21, 2012</a:t>
+              <a:t>November 28, 2012</a:t>
             </a:fld>
             <a:endParaRPr lang="en-US"/>
           </a:p>
@@ -1892,7 +1892,7 @@
               <a:pPr>
                 <a:defRPr/>
               </a:pPr>
-              <a:t>November 21, 2012</a:t>
+              <a:t>November 28, 2012</a:t>
             </a:fld>
             <a:endParaRPr lang="en-US"/>
           </a:p>
@@ -2094,7 +2094,7 @@
               <a:pPr>
                 <a:defRPr/>
               </a:pPr>
-              <a:t>November 21, 2012</a:t>
+              <a:t>November 28, 2012</a:t>
             </a:fld>
             <a:endParaRPr lang="en-US"/>
           </a:p>
@@ -2332,7 +2332,7 @@
               <a:pPr>
                 <a:defRPr/>
               </a:pPr>
-              <a:t>November 21, 2012</a:t>
+              <a:t>November 28, 2012</a:t>
             </a:fld>
             <a:endParaRPr lang="en-US"/>
           </a:p>
@@ -2514,7 +2514,7 @@
               <a:pPr>
                 <a:defRPr/>
               </a:pPr>
-              <a:t>November 21, 2012</a:t>
+              <a:t>November 28, 2012</a:t>
             </a:fld>
             <a:endParaRPr lang="en-US"/>
           </a:p>
@@ -2746,7 +2746,7 @@
               <a:pPr>
                 <a:defRPr/>
               </a:pPr>
-              <a:t>November 21, 2012</a:t>
+              <a:t>November 28, 2012</a:t>
             </a:fld>
             <a:endParaRPr lang="en-US"/>
           </a:p>
@@ -3153,7 +3153,7 @@
               <a:pPr>
                 <a:defRPr/>
               </a:pPr>
-              <a:t>November 21, 2012</a:t>
+              <a:t>November 28, 2012</a:t>
             </a:fld>
             <a:endParaRPr lang="en-US"/>
           </a:p>
@@ -3376,7 +3376,7 @@
               <a:pPr>
                 <a:defRPr/>
               </a:pPr>
-              <a:t>November 21, 2012</a:t>
+              <a:t>November 28, 2012</a:t>
             </a:fld>
             <a:endParaRPr lang="en-US" dirty="0"/>
           </a:p>
@@ -3573,7 +3573,7 @@
               <a:pPr>
                 <a:defRPr/>
               </a:pPr>
-              <a:t>November 21, 2012</a:t>
+              <a:t>November 28, 2012</a:t>
             </a:fld>
             <a:endParaRPr lang="en-US"/>
           </a:p>
@@ -3770,7 +3770,7 @@
               <a:pPr>
                 <a:defRPr/>
               </a:pPr>
-              <a:t>November 21, 2012</a:t>
+              <a:t>November 28, 2012</a:t>
             </a:fld>
             <a:endParaRPr lang="en-US"/>
           </a:p>
@@ -3997,7 +3997,7 @@
               <a:pPr>
                 <a:defRPr/>
               </a:pPr>
-              <a:t>November 21, 2012</a:t>
+              <a:t>November 28, 2012</a:t>
             </a:fld>
             <a:endParaRPr lang="en-US" dirty="0"/>
           </a:p>
@@ -4649,7 +4649,7 @@
                 <a:ea typeface="ＭＳ Ｐゴシック" pitchFamily="34" charset="-128"/>
               </a:rPr>
               <a:pPr/>
-              <a:t>November 21, 2012</a:t>
+              <a:t>November 28, 2012</a:t>
             </a:fld>
             <a:endParaRPr lang="en-US" dirty="0" smtClean="0">
               <a:solidFill>
@@ -4780,7 +4780,7 @@
                 <a:ea typeface="ＭＳ Ｐゴシック" pitchFamily="34" charset="-128"/>
               </a:rPr>
               <a:pPr/>
-              <a:t>November 21, 2012</a:t>
+              <a:t>November 28, 2012</a:t>
             </a:fld>
             <a:endParaRPr lang="en-US" smtClean="0">
               <a:latin typeface="Trade Gothic Next LT Pro Lt" pitchFamily="34" charset="0"/>
@@ -5072,7 +5072,7 @@
                 <a:ea typeface="ＭＳ Ｐゴシック" pitchFamily="34" charset="-128"/>
               </a:rPr>
               <a:pPr/>
-              <a:t>November 21, 2012</a:t>
+              <a:t>November 28, 2012</a:t>
             </a:fld>
             <a:endParaRPr lang="en-US" smtClean="0">
               <a:latin typeface="Trade Gothic Next LT Pro Lt" pitchFamily="34" charset="0"/>
@@ -5746,20 +5746,17 @@
               <a:rPr lang="en-US" dirty="0" smtClean="0">
                 <a:cs typeface="+mn-cs"/>
               </a:rPr>
-              <a:t>, source output, and debug tokens. Will still sign the app for Java </a:t>
-            </a:r>
-            <a:r>
-              <a:rPr lang="en-US" dirty="0" err="1" smtClean="0">
-                <a:cs typeface="+mn-cs"/>
-              </a:rPr>
-              <a:t>Smartphones</a:t>
+              <a:t>, source output, and debug tokens. </a:t>
             </a:r>
             <a:r>
               <a:rPr lang="en-US" dirty="0" smtClean="0">
                 <a:cs typeface="+mn-cs"/>
               </a:rPr>
-              <a:t>.</a:t>
-            </a:r>
+              <a:t>Java builds will only run on simulators.</a:t>
+            </a:r>
+            <a:endParaRPr lang="en-US" dirty="0" smtClean="0">
+              <a:cs typeface="+mn-cs"/>
+            </a:endParaRPr>
           </a:p>
           <a:p>
             <a:pPr eaLnBrk="1" hangingPunct="1">
@@ -5933,7 +5930,7 @@
                 <a:ea typeface="ＭＳ Ｐゴシック" pitchFamily="34" charset="-128"/>
               </a:rPr>
               <a:pPr/>
-              <a:t>November 21, 2012</a:t>
+              <a:t>November 28, 2012</a:t>
             </a:fld>
             <a:endParaRPr lang="en-US" smtClean="0">
               <a:latin typeface="Trade Gothic Next LT Pro Lt" pitchFamily="34" charset="0"/>
@@ -6616,7 +6613,7 @@
                 <a:ea typeface="ＭＳ Ｐゴシック" pitchFamily="34" charset="-128"/>
               </a:rPr>
               <a:pPr/>
-              <a:t>November 21, 2012</a:t>
+              <a:t>November 28, 2012</a:t>
             </a:fld>
             <a:endParaRPr lang="en-US" smtClean="0">
               <a:latin typeface="Trade Gothic Next LT Pro Lt" pitchFamily="34" charset="0"/>
@@ -6743,7 +6740,7 @@
                 <a:ea typeface="ＭＳ Ｐゴシック" pitchFamily="34" charset="-128"/>
               </a:rPr>
               <a:pPr/>
-              <a:t>November 21, 2012</a:t>
+              <a:t>November 28, 2012</a:t>
             </a:fld>
             <a:endParaRPr lang="en-US" smtClean="0">
               <a:latin typeface="Trade Gothic Next LT Pro Lt" pitchFamily="34" charset="0"/>

</xml_diff>

<commit_message>
Updated documentation on target name changes
</commit_message>
<xml_diff>
--- a/Ant-Build-Script/WebWorksBuildScript.pptx
+++ b/Ant-Build-Script/WebWorksBuildScript.pptx
@@ -247,7 +247,7 @@
               <a:pPr>
                 <a:defRPr/>
               </a:pPr>
-              <a:t>11/28/2012</a:t>
+              <a:t>1/24/2013</a:t>
             </a:fld>
             <a:endParaRPr lang="en-US"/>
           </a:p>
@@ -1037,7 +1037,7 @@
               <a:pPr>
                 <a:defRPr/>
               </a:pPr>
-              <a:t>November 28, 2012</a:t>
+              <a:t>January 24, 2013</a:t>
             </a:fld>
             <a:endParaRPr lang="en-US" dirty="0"/>
           </a:p>
@@ -1247,7 +1247,7 @@
               <a:pPr>
                 <a:defRPr/>
               </a:pPr>
-              <a:t>November 28, 2012</a:t>
+              <a:t>January 24, 2013</a:t>
             </a:fld>
             <a:endParaRPr lang="en-US"/>
           </a:p>
@@ -1466,7 +1466,7 @@
               <a:pPr>
                 <a:defRPr/>
               </a:pPr>
-              <a:t>November 28, 2012</a:t>
+              <a:t>January 24, 2013</a:t>
             </a:fld>
             <a:endParaRPr lang="en-US"/>
           </a:p>
@@ -1690,7 +1690,7 @@
               <a:pPr>
                 <a:defRPr/>
               </a:pPr>
-              <a:t>November 28, 2012</a:t>
+              <a:t>January 24, 2013</a:t>
             </a:fld>
             <a:endParaRPr lang="en-US"/>
           </a:p>
@@ -1892,7 +1892,7 @@
               <a:pPr>
                 <a:defRPr/>
               </a:pPr>
-              <a:t>November 28, 2012</a:t>
+              <a:t>January 24, 2013</a:t>
             </a:fld>
             <a:endParaRPr lang="en-US"/>
           </a:p>
@@ -2094,7 +2094,7 @@
               <a:pPr>
                 <a:defRPr/>
               </a:pPr>
-              <a:t>November 28, 2012</a:t>
+              <a:t>January 24, 2013</a:t>
             </a:fld>
             <a:endParaRPr lang="en-US"/>
           </a:p>
@@ -2332,7 +2332,7 @@
               <a:pPr>
                 <a:defRPr/>
               </a:pPr>
-              <a:t>November 28, 2012</a:t>
+              <a:t>January 24, 2013</a:t>
             </a:fld>
             <a:endParaRPr lang="en-US"/>
           </a:p>
@@ -2514,7 +2514,7 @@
               <a:pPr>
                 <a:defRPr/>
               </a:pPr>
-              <a:t>November 28, 2012</a:t>
+              <a:t>January 24, 2013</a:t>
             </a:fld>
             <a:endParaRPr lang="en-US"/>
           </a:p>
@@ -2746,7 +2746,7 @@
               <a:pPr>
                 <a:defRPr/>
               </a:pPr>
-              <a:t>November 28, 2012</a:t>
+              <a:t>January 24, 2013</a:t>
             </a:fld>
             <a:endParaRPr lang="en-US"/>
           </a:p>
@@ -3153,7 +3153,7 @@
               <a:pPr>
                 <a:defRPr/>
               </a:pPr>
-              <a:t>November 28, 2012</a:t>
+              <a:t>January 24, 2013</a:t>
             </a:fld>
             <a:endParaRPr lang="en-US"/>
           </a:p>
@@ -3376,7 +3376,7 @@
               <a:pPr>
                 <a:defRPr/>
               </a:pPr>
-              <a:t>November 28, 2012</a:t>
+              <a:t>January 24, 2013</a:t>
             </a:fld>
             <a:endParaRPr lang="en-US" dirty="0"/>
           </a:p>
@@ -3573,7 +3573,7 @@
               <a:pPr>
                 <a:defRPr/>
               </a:pPr>
-              <a:t>November 28, 2012</a:t>
+              <a:t>January 24, 2013</a:t>
             </a:fld>
             <a:endParaRPr lang="en-US"/>
           </a:p>
@@ -3770,7 +3770,7 @@
               <a:pPr>
                 <a:defRPr/>
               </a:pPr>
-              <a:t>November 28, 2012</a:t>
+              <a:t>January 24, 2013</a:t>
             </a:fld>
             <a:endParaRPr lang="en-US"/>
           </a:p>
@@ -3997,7 +3997,7 @@
               <a:pPr>
                 <a:defRPr/>
               </a:pPr>
-              <a:t>November 28, 2012</a:t>
+              <a:t>January 24, 2013</a:t>
             </a:fld>
             <a:endParaRPr lang="en-US" dirty="0"/>
           </a:p>
@@ -4649,7 +4649,7 @@
                 <a:ea typeface="ＭＳ Ｐゴシック" pitchFamily="34" charset="-128"/>
               </a:rPr>
               <a:pPr/>
-              <a:t>November 28, 2012</a:t>
+              <a:t>January 24, 2013</a:t>
             </a:fld>
             <a:endParaRPr lang="en-US" dirty="0" smtClean="0">
               <a:solidFill>
@@ -4780,7 +4780,7 @@
                 <a:ea typeface="ＭＳ Ｐゴシック" pitchFamily="34" charset="-128"/>
               </a:rPr>
               <a:pPr/>
-              <a:t>November 28, 2012</a:t>
+              <a:t>January 24, 2013</a:t>
             </a:fld>
             <a:endParaRPr lang="en-US" smtClean="0">
               <a:latin typeface="Trade Gothic Next LT Pro Lt" pitchFamily="34" charset="0"/>
@@ -5072,7 +5072,7 @@
                 <a:ea typeface="ＭＳ Ｐゴシック" pitchFamily="34" charset="-128"/>
               </a:rPr>
               <a:pPr/>
-              <a:t>November 28, 2012</a:t>
+              <a:t>January 24, 2013</a:t>
             </a:fld>
             <a:endParaRPr lang="en-US" smtClean="0">
               <a:latin typeface="Trade Gothic Next LT Pro Lt" pitchFamily="34" charset="0"/>
@@ -5515,16 +5515,7 @@
                 </a:solidFill>
                 <a:cs typeface="+mn-cs"/>
               </a:rPr>
-              <a:t>build.</a:t>
-            </a:r>
-            <a:r>
-              <a:rPr lang="en-US" dirty="0" smtClean="0">
-                <a:solidFill>
-                  <a:srgbClr val="989A9B"/>
-                </a:solidFill>
-                <a:cs typeface="+mn-cs"/>
-              </a:rPr>
-              <a:t>[</a:t>
+              <a:t>build</a:t>
             </a:r>
             <a:r>
               <a:rPr lang="en-US" b="1" dirty="0" smtClean="0">
@@ -5536,7 +5527,7 @@
                 </a:solidFill>
                 <a:cs typeface="+mn-cs"/>
               </a:rPr>
-              <a:t>java</a:t>
+              <a:t>.</a:t>
             </a:r>
             <a:r>
               <a:rPr lang="en-US" dirty="0" smtClean="0">
@@ -5545,10 +5536,10 @@
                 </a:solidFill>
                 <a:cs typeface="+mn-cs"/>
               </a:rPr>
-              <a:t>,</a:t>
-            </a:r>
-            <a:r>
-              <a:rPr lang="en-US" b="1" dirty="0" smtClean="0">
+              <a:t>[</a:t>
+            </a:r>
+            <a:r>
+              <a:rPr lang="en-US" b="1" dirty="0" err="1" smtClean="0">
                 <a:solidFill>
                   <a:schemeClr val="accent1">
                     <a:lumMod val="60000"/>
@@ -5557,7 +5548,7 @@
                 </a:solidFill>
                 <a:cs typeface="+mn-cs"/>
               </a:rPr>
-              <a:t> air</a:t>
+              <a:t>bbos</a:t>
             </a:r>
             <a:r>
               <a:rPr lang="en-US" dirty="0" smtClean="0">
@@ -5578,7 +5569,7 @@
                 </a:solidFill>
                 <a:cs typeface="+mn-cs"/>
               </a:rPr>
-              <a:t> native</a:t>
+              <a:t> tablet</a:t>
             </a:r>
             <a:r>
               <a:rPr lang="en-US" dirty="0" smtClean="0">
@@ -5587,7 +5578,7 @@
                 </a:solidFill>
                 <a:cs typeface="+mn-cs"/>
               </a:rPr>
-              <a:t>]</a:t>
+              <a:t>,</a:t>
             </a:r>
             <a:r>
               <a:rPr lang="en-US" b="1" dirty="0" smtClean="0">
@@ -5599,7 +5590,7 @@
                 </a:solidFill>
                 <a:cs typeface="+mn-cs"/>
               </a:rPr>
-              <a:t>.</a:t>
+              <a:t> bb10</a:t>
             </a:r>
             <a:r>
               <a:rPr lang="en-US" dirty="0" smtClean="0">
@@ -5608,7 +5599,7 @@
                 </a:solidFill>
                 <a:cs typeface="+mn-cs"/>
               </a:rPr>
-              <a:t>[</a:t>
+              <a:t>]</a:t>
             </a:r>
             <a:r>
               <a:rPr lang="en-US" b="1" dirty="0" smtClean="0">
@@ -5620,7 +5611,7 @@
                 </a:solidFill>
                 <a:cs typeface="+mn-cs"/>
               </a:rPr>
-              <a:t>test</a:t>
+              <a:t>.</a:t>
             </a:r>
             <a:r>
               <a:rPr lang="en-US" dirty="0" smtClean="0">
@@ -5629,7 +5620,7 @@
                 </a:solidFill>
                 <a:cs typeface="+mn-cs"/>
               </a:rPr>
-              <a:t>,</a:t>
+              <a:t>[</a:t>
             </a:r>
             <a:r>
               <a:rPr lang="en-US" b="1" dirty="0" smtClean="0">
@@ -5641,13 +5632,14 @@
                 </a:solidFill>
                 <a:cs typeface="+mn-cs"/>
               </a:rPr>
-              <a:t> prod</a:t>
+              <a:t>test</a:t>
             </a:r>
             <a:r>
               <a:rPr lang="en-US" dirty="0" smtClean="0">
                 <a:solidFill>
                   <a:srgbClr val="989A9B"/>
                 </a:solidFill>
+                <a:cs typeface="+mn-cs"/>
               </a:rPr>
               <a:t>,</a:t>
             </a:r>
@@ -5659,169 +5651,199 @@
                     <a:lumOff val="40000"/>
                   </a:schemeClr>
                 </a:solidFill>
-              </a:rPr>
-              <a:t> beta</a:t>
+                <a:cs typeface="+mn-cs"/>
+              </a:rPr>
+              <a:t> prod</a:t>
             </a:r>
             <a:r>
               <a:rPr lang="en-US" dirty="0" smtClean="0">
                 <a:solidFill>
                   <a:srgbClr val="989A9B"/>
                 </a:solidFill>
-                <a:cs typeface="+mn-cs"/>
-              </a:rPr>
-              <a:t>]</a:t>
-            </a:r>
-          </a:p>
-          <a:p>
-            <a:pPr eaLnBrk="1" hangingPunct="1">
-              <a:defRPr/>
-            </a:pPr>
-            <a:r>
-              <a:rPr lang="en-US" dirty="0" smtClean="0">
-                <a:cs typeface="+mn-cs"/>
-              </a:rPr>
-              <a:t>	- java for BlackBerry 5 through 7.x </a:t>
-            </a:r>
-            <a:r>
-              <a:rPr lang="en-US" dirty="0" err="1" smtClean="0">
-                <a:cs typeface="+mn-cs"/>
-              </a:rPr>
-              <a:t>smartphones</a:t>
-            </a:r>
-            <a:endParaRPr lang="en-US" dirty="0" smtClean="0">
-              <a:cs typeface="+mn-cs"/>
-            </a:endParaRPr>
-          </a:p>
-          <a:p>
-            <a:pPr eaLnBrk="1" hangingPunct="1">
-              <a:defRPr/>
-            </a:pPr>
-            <a:r>
-              <a:rPr lang="en-US" dirty="0" smtClean="0">
-                <a:cs typeface="+mn-cs"/>
-              </a:rPr>
-              <a:t>	- air for </a:t>
-            </a:r>
-            <a:r>
-              <a:rPr lang="en-US" dirty="0" err="1" smtClean="0">
-                <a:cs typeface="+mn-cs"/>
-              </a:rPr>
-              <a:t>PlayBook</a:t>
-            </a:r>
-            <a:r>
-              <a:rPr lang="en-US" dirty="0" smtClean="0">
-                <a:cs typeface="+mn-cs"/>
-              </a:rPr>
-              <a:t> 1.x through 2.x</a:t>
-            </a:r>
-          </a:p>
-          <a:p>
-            <a:pPr eaLnBrk="1" hangingPunct="1">
-              <a:defRPr/>
-            </a:pPr>
-            <a:r>
-              <a:rPr lang="en-US" dirty="0" smtClean="0">
-                <a:cs typeface="+mn-cs"/>
-              </a:rPr>
-              <a:t>	- native for BlackBerry 10</a:t>
-            </a:r>
-          </a:p>
-          <a:p>
-            <a:pPr eaLnBrk="1" hangingPunct="1">
-              <a:defRPr/>
-            </a:pPr>
-            <a:r>
-              <a:rPr lang="en-US" dirty="0" smtClean="0">
-                <a:cs typeface="+mn-cs"/>
-              </a:rPr>
-              <a:t>	- test for </a:t>
-            </a:r>
-            <a:r>
-              <a:rPr lang="en-US" dirty="0" err="1" smtClean="0">
-                <a:cs typeface="+mn-cs"/>
-              </a:rPr>
-              <a:t>WebInspector</a:t>
-            </a:r>
-            <a:r>
-              <a:rPr lang="en-US" dirty="0" smtClean="0">
-                <a:cs typeface="+mn-cs"/>
-              </a:rPr>
-              <a:t>, source output, and debug tokens. </a:t>
-            </a:r>
-            <a:r>
-              <a:rPr lang="en-US" dirty="0" smtClean="0">
-                <a:cs typeface="+mn-cs"/>
-              </a:rPr>
-              <a:t>Java builds will only run on simulators.</a:t>
-            </a:r>
-            <a:endParaRPr lang="en-US" dirty="0" smtClean="0">
-              <a:cs typeface="+mn-cs"/>
-            </a:endParaRPr>
-          </a:p>
-          <a:p>
-            <a:pPr eaLnBrk="1" hangingPunct="1">
-              <a:defRPr/>
-            </a:pPr>
-            <a:r>
-              <a:rPr lang="en-US" dirty="0" smtClean="0">
-                <a:cs typeface="+mn-cs"/>
-              </a:rPr>
-              <a:t>	- prod for regular signing with a build id and no debugging.</a:t>
-            </a:r>
-          </a:p>
-          <a:p>
-            <a:pPr eaLnBrk="1" hangingPunct="1">
-              <a:defRPr/>
-            </a:pPr>
-            <a:r>
-              <a:rPr lang="en-US" dirty="0" smtClean="0">
-                <a:cs typeface="+mn-cs"/>
-              </a:rPr>
-              <a:t>	- beta for regular signing with a build id and </a:t>
-            </a:r>
-            <a:r>
-              <a:rPr lang="en-US" dirty="0" err="1" smtClean="0">
-                <a:cs typeface="+mn-cs"/>
-              </a:rPr>
-              <a:t>WebInspector</a:t>
-            </a:r>
-            <a:r>
-              <a:rPr lang="en-US" dirty="0" smtClean="0">
-                <a:cs typeface="+mn-cs"/>
-              </a:rPr>
-              <a:t> turned on</a:t>
-            </a:r>
-          </a:p>
-          <a:p>
-            <a:pPr eaLnBrk="1" hangingPunct="1">
-              <a:defRPr/>
-            </a:pPr>
-            <a:endParaRPr lang="en-US" dirty="0" smtClean="0">
-              <a:cs typeface="+mn-cs"/>
-            </a:endParaRPr>
-          </a:p>
-          <a:p>
-            <a:pPr eaLnBrk="1" hangingPunct="1">
-              <a:defRPr/>
-            </a:pPr>
-            <a:r>
-              <a:rPr lang="en-US" b="1" dirty="0" err="1" smtClean="0">
+              </a:rPr>
+              <a:t>,</a:t>
+            </a:r>
+            <a:r>
+              <a:rPr lang="en-US" b="1" dirty="0" smtClean="0">
                 <a:solidFill>
                   <a:schemeClr val="accent1">
                     <a:lumMod val="60000"/>
                     <a:lumOff val="40000"/>
                   </a:schemeClr>
                 </a:solidFill>
-                <a:cs typeface="+mn-cs"/>
-              </a:rPr>
-              <a:t>build.optimize</a:t>
-            </a:r>
-            <a:r>
-              <a:rPr lang="en-US" dirty="0" smtClean="0">
-                <a:cs typeface="+mn-cs"/>
-              </a:rPr>
-              <a:t> runs both lint and minify tasks</a:t>
-            </a:r>
+              </a:rPr>
+              <a:t> beta</a:t>
+            </a:r>
+            <a:r>
+              <a:rPr lang="en-US" dirty="0" smtClean="0">
+                <a:solidFill>
+                  <a:srgbClr val="989A9B"/>
+                </a:solidFill>
+                <a:cs typeface="+mn-cs"/>
+              </a:rPr>
+              <a:t>]</a:t>
+            </a:r>
+          </a:p>
+          <a:p>
+            <a:pPr eaLnBrk="1" hangingPunct="1">
+              <a:defRPr/>
+            </a:pPr>
+            <a:r>
+              <a:rPr lang="en-US" dirty="0" smtClean="0">
+                <a:cs typeface="+mn-cs"/>
+              </a:rPr>
+              <a:t>	- </a:t>
+            </a:r>
+            <a:r>
+              <a:rPr lang="en-US" dirty="0" err="1" smtClean="0">
+                <a:cs typeface="+mn-cs"/>
+              </a:rPr>
+              <a:t>bbos</a:t>
+            </a:r>
+            <a:r>
+              <a:rPr lang="en-US" dirty="0" smtClean="0">
+                <a:cs typeface="+mn-cs"/>
+              </a:rPr>
+              <a:t> for </a:t>
+            </a:r>
+            <a:r>
+              <a:rPr lang="en-US" dirty="0" smtClean="0">
+                <a:cs typeface="+mn-cs"/>
+              </a:rPr>
+              <a:t>BlackBerry 5 through 7.x </a:t>
+            </a:r>
+            <a:r>
+              <a:rPr lang="en-US" dirty="0" err="1" smtClean="0">
+                <a:cs typeface="+mn-cs"/>
+              </a:rPr>
+              <a:t>smartphones</a:t>
+            </a:r>
+            <a:endParaRPr lang="en-US" dirty="0" smtClean="0">
+              <a:cs typeface="+mn-cs"/>
+            </a:endParaRPr>
+          </a:p>
+          <a:p>
+            <a:pPr eaLnBrk="1" hangingPunct="1">
+              <a:defRPr/>
+            </a:pPr>
+            <a:r>
+              <a:rPr lang="en-US" dirty="0" smtClean="0">
+                <a:cs typeface="+mn-cs"/>
+              </a:rPr>
+              <a:t>	- </a:t>
+            </a:r>
+            <a:r>
+              <a:rPr lang="en-US" dirty="0" smtClean="0">
+                <a:cs typeface="+mn-cs"/>
+              </a:rPr>
+              <a:t>tablet </a:t>
+            </a:r>
+            <a:r>
+              <a:rPr lang="en-US" dirty="0" smtClean="0">
+                <a:cs typeface="+mn-cs"/>
+              </a:rPr>
+              <a:t>for </a:t>
+            </a:r>
+            <a:r>
+              <a:rPr lang="en-US" dirty="0" err="1" smtClean="0">
+                <a:cs typeface="+mn-cs"/>
+              </a:rPr>
+              <a:t>PlayBook</a:t>
+            </a:r>
+            <a:r>
+              <a:rPr lang="en-US" dirty="0" smtClean="0">
+                <a:cs typeface="+mn-cs"/>
+              </a:rPr>
+              <a:t> 1.x through 2.x</a:t>
+            </a:r>
+          </a:p>
+          <a:p>
+            <a:pPr eaLnBrk="1" hangingPunct="1">
+              <a:defRPr/>
+            </a:pPr>
+            <a:r>
+              <a:rPr lang="en-US" dirty="0" smtClean="0">
+                <a:cs typeface="+mn-cs"/>
+              </a:rPr>
+              <a:t>	- </a:t>
+            </a:r>
+            <a:r>
+              <a:rPr lang="en-US" dirty="0" smtClean="0">
+                <a:cs typeface="+mn-cs"/>
+              </a:rPr>
+              <a:t>bb10 for </a:t>
+            </a:r>
+            <a:r>
+              <a:rPr lang="en-US" dirty="0" smtClean="0">
+                <a:cs typeface="+mn-cs"/>
+              </a:rPr>
+              <a:t>BlackBerry 10</a:t>
+            </a:r>
+          </a:p>
+          <a:p>
+            <a:pPr eaLnBrk="1" hangingPunct="1">
+              <a:defRPr/>
+            </a:pPr>
+            <a:r>
+              <a:rPr lang="en-US" dirty="0" smtClean="0">
+                <a:cs typeface="+mn-cs"/>
+              </a:rPr>
+              <a:t>	- test for </a:t>
+            </a:r>
+            <a:r>
+              <a:rPr lang="en-US" dirty="0" err="1" smtClean="0">
+                <a:cs typeface="+mn-cs"/>
+              </a:rPr>
+              <a:t>WebInspector</a:t>
+            </a:r>
+            <a:r>
+              <a:rPr lang="en-US" dirty="0" smtClean="0">
+                <a:cs typeface="+mn-cs"/>
+              </a:rPr>
+              <a:t>, source output, and debug tokens. Java builds will only run on simulators.</a:t>
+            </a:r>
+          </a:p>
+          <a:p>
+            <a:pPr eaLnBrk="1" hangingPunct="1">
+              <a:defRPr/>
+            </a:pPr>
+            <a:r>
+              <a:rPr lang="en-US" dirty="0" smtClean="0">
+                <a:cs typeface="+mn-cs"/>
+              </a:rPr>
+              <a:t>	- prod for regular signing with a build id and no debugging.</a:t>
+            </a:r>
+          </a:p>
+          <a:p>
+            <a:pPr eaLnBrk="1" hangingPunct="1">
+              <a:defRPr/>
+            </a:pPr>
+            <a:r>
+              <a:rPr lang="en-US" dirty="0" smtClean="0">
+                <a:cs typeface="+mn-cs"/>
+              </a:rPr>
+              <a:t>	- beta for regular signing with a build id and </a:t>
+            </a:r>
+            <a:r>
+              <a:rPr lang="en-US" dirty="0" err="1" smtClean="0">
+                <a:cs typeface="+mn-cs"/>
+              </a:rPr>
+              <a:t>WebInspector</a:t>
+            </a:r>
+            <a:r>
+              <a:rPr lang="en-US" dirty="0" smtClean="0">
+                <a:cs typeface="+mn-cs"/>
+              </a:rPr>
+              <a:t> turned on</a:t>
+            </a:r>
+          </a:p>
+          <a:p>
+            <a:pPr eaLnBrk="1" hangingPunct="1">
+              <a:defRPr/>
+            </a:pPr>
+            <a:endParaRPr lang="en-US" dirty="0" smtClean="0">
+              <a:cs typeface="+mn-cs"/>
+            </a:endParaRPr>
           </a:p>
           <a:p>
             <a:pPr eaLnBrk="1" hangingPunct="1">
@@ -5837,47 +5859,14 @@
                 </a:solidFill>
                 <a:cs typeface="+mn-cs"/>
               </a:rPr>
-              <a:t>build.lint</a:t>
-            </a:r>
-            <a:r>
-              <a:rPr lang="en-US" dirty="0" smtClean="0">
-                <a:cs typeface="+mn-cs"/>
-              </a:rPr>
-              <a:t> runs </a:t>
-            </a:r>
-            <a:r>
-              <a:rPr lang="en-US" dirty="0" err="1" smtClean="0">
-                <a:cs typeface="+mn-cs"/>
-              </a:rPr>
-              <a:t>jslint</a:t>
-            </a:r>
-            <a:r>
-              <a:rPr lang="en-US" dirty="0" smtClean="0">
-                <a:cs typeface="+mn-cs"/>
-              </a:rPr>
-              <a:t>, </a:t>
-            </a:r>
-            <a:r>
-              <a:rPr lang="en-US" dirty="0" err="1" smtClean="0">
-                <a:cs typeface="+mn-cs"/>
-              </a:rPr>
-              <a:t>jshint</a:t>
-            </a:r>
-            <a:r>
-              <a:rPr lang="en-US" dirty="0" smtClean="0">
-                <a:cs typeface="+mn-cs"/>
-              </a:rPr>
-              <a:t> and </a:t>
-            </a:r>
-            <a:r>
-              <a:rPr lang="en-US" dirty="0" err="1" smtClean="0">
-                <a:cs typeface="+mn-cs"/>
-              </a:rPr>
-              <a:t>csslint</a:t>
-            </a:r>
-            <a:endParaRPr lang="en-US" dirty="0" smtClean="0">
-              <a:cs typeface="+mn-cs"/>
-            </a:endParaRPr>
+              <a:t>build.optimize</a:t>
+            </a:r>
+            <a:r>
+              <a:rPr lang="en-US" dirty="0" smtClean="0">
+                <a:cs typeface="+mn-cs"/>
+              </a:rPr>
+              <a:t> runs both lint and minify tasks</a:t>
+            </a:r>
           </a:p>
           <a:p>
             <a:pPr eaLnBrk="1" hangingPunct="1">
@@ -5893,6 +5882,62 @@
                 </a:solidFill>
                 <a:cs typeface="+mn-cs"/>
               </a:rPr>
+              <a:t>build.lint</a:t>
+            </a:r>
+            <a:r>
+              <a:rPr lang="en-US" dirty="0" smtClean="0">
+                <a:cs typeface="+mn-cs"/>
+              </a:rPr>
+              <a:t> runs </a:t>
+            </a:r>
+            <a:r>
+              <a:rPr lang="en-US" dirty="0" err="1" smtClean="0">
+                <a:cs typeface="+mn-cs"/>
+              </a:rPr>
+              <a:t>jslint</a:t>
+            </a:r>
+            <a:r>
+              <a:rPr lang="en-US" dirty="0" smtClean="0">
+                <a:cs typeface="+mn-cs"/>
+              </a:rPr>
+              <a:t>, </a:t>
+            </a:r>
+            <a:r>
+              <a:rPr lang="en-US" dirty="0" err="1" smtClean="0">
+                <a:cs typeface="+mn-cs"/>
+              </a:rPr>
+              <a:t>jshint</a:t>
+            </a:r>
+            <a:r>
+              <a:rPr lang="en-US" dirty="0" smtClean="0">
+                <a:cs typeface="+mn-cs"/>
+              </a:rPr>
+              <a:t> and </a:t>
+            </a:r>
+            <a:r>
+              <a:rPr lang="en-US" dirty="0" err="1" smtClean="0">
+                <a:cs typeface="+mn-cs"/>
+              </a:rPr>
+              <a:t>csslint</a:t>
+            </a:r>
+            <a:endParaRPr lang="en-US" dirty="0" smtClean="0">
+              <a:cs typeface="+mn-cs"/>
+            </a:endParaRPr>
+          </a:p>
+          <a:p>
+            <a:pPr eaLnBrk="1" hangingPunct="1">
+              <a:defRPr/>
+            </a:pPr>
+            <a:r>
+              <a:rPr lang="en-US" b="1" dirty="0" err="1" smtClean="0">
+                <a:solidFill>
+                  <a:schemeClr val="accent1">
+                    <a:lumMod val="60000"/>
+                    <a:lumOff val="40000"/>
+                  </a:schemeClr>
+                </a:solidFill>
+                <a:cs typeface="+mn-cs"/>
+              </a:rPr>
               <a:t>build.minify</a:t>
             </a:r>
             <a:r>
@@ -5930,7 +5975,7 @@
                 <a:ea typeface="ＭＳ Ｐゴシック" pitchFamily="34" charset="-128"/>
               </a:rPr>
               <a:pPr/>
-              <a:t>November 28, 2012</a:t>
+              <a:t>January 24, 2013</a:t>
             </a:fld>
             <a:endParaRPr lang="en-US" smtClean="0">
               <a:latin typeface="Trade Gothic Next LT Pro Lt" pitchFamily="34" charset="0"/>
@@ -6047,7 +6092,7 @@
         </p:spPr>
         <p:txBody>
           <a:bodyPr numCol="1">
-            <a:normAutofit fontScale="85000" lnSpcReduction="10000"/>
+            <a:normAutofit fontScale="92500" lnSpcReduction="20000"/>
           </a:bodyPr>
           <a:lstStyle/>
           <a:p>
@@ -6116,7 +6161,7 @@
                 </a:solidFill>
                 <a:cs typeface="+mn-cs"/>
               </a:rPr>
-              <a:t>native.</a:t>
+              <a:t>bb10.</a:t>
             </a:r>
             <a:r>
               <a:rPr lang="en-US" dirty="0" smtClean="0">
@@ -6170,7 +6215,7 @@
                 </a:solidFill>
                 <a:cs typeface="+mn-cs"/>
               </a:rPr>
-              <a:t>air</a:t>
+              <a:t>tablet</a:t>
             </a:r>
             <a:r>
               <a:rPr lang="en-US" dirty="0" smtClean="0">
@@ -6182,13 +6227,13 @@
               <a:t>, </a:t>
             </a:r>
             <a:r>
-              <a:rPr lang="en-US" b="1" dirty="0" smtClean="0">
+              <a:rPr lang="en-US" b="1" dirty="0" err="1" smtClean="0">
                 <a:solidFill>
                   <a:srgbClr val="00A8DF"/>
                 </a:solidFill>
                 <a:cs typeface="+mn-cs"/>
               </a:rPr>
-              <a:t>java</a:t>
+              <a:t>bbos</a:t>
             </a:r>
             <a:r>
               <a:rPr lang="en-US" dirty="0" smtClean="0">
@@ -6289,7 +6334,25 @@
               <a:rPr lang="en-US" dirty="0" smtClean="0">
                 <a:cs typeface="+mn-cs"/>
               </a:rPr>
-              <a:t>	- java for BlackBerry 5 through 7.x </a:t>
+              <a:t>	- </a:t>
+            </a:r>
+            <a:r>
+              <a:rPr lang="en-US" dirty="0" err="1" smtClean="0">
+                <a:cs typeface="+mn-cs"/>
+              </a:rPr>
+              <a:t>bbos</a:t>
+            </a:r>
+            <a:r>
+              <a:rPr lang="en-US" dirty="0" smtClean="0">
+                <a:cs typeface="+mn-cs"/>
+              </a:rPr>
+              <a:t> </a:t>
+            </a:r>
+            <a:r>
+              <a:rPr lang="en-US" dirty="0" smtClean="0">
+                <a:cs typeface="+mn-cs"/>
+              </a:rPr>
+              <a:t>for BlackBerry 5 through 7.x </a:t>
             </a:r>
             <a:r>
               <a:rPr lang="en-US" dirty="0" err="1" smtClean="0">
@@ -6309,7 +6372,19 @@
               <a:rPr lang="en-US" dirty="0" smtClean="0">
                 <a:cs typeface="+mn-cs"/>
               </a:rPr>
-              <a:t>	- air for </a:t>
+              <a:t>	- </a:t>
+            </a:r>
+            <a:r>
+              <a:rPr lang="en-US" dirty="0" smtClean="0">
+                <a:cs typeface="+mn-cs"/>
+              </a:rPr>
+              <a:t>tablet </a:t>
+            </a:r>
+            <a:r>
+              <a:rPr lang="en-US" dirty="0" smtClean="0">
+                <a:cs typeface="+mn-cs"/>
+              </a:rPr>
+              <a:t>for </a:t>
             </a:r>
             <a:r>
               <a:rPr lang="en-US" dirty="0" err="1" smtClean="0">
@@ -6332,7 +6407,19 @@
               <a:rPr lang="en-US" dirty="0" smtClean="0">
                 <a:cs typeface="+mn-cs"/>
               </a:rPr>
-              <a:t>	- native for BlackBerry 10 also requires defining simulator build or device</a:t>
+              <a:t>	- </a:t>
+            </a:r>
+            <a:r>
+              <a:rPr lang="en-US" dirty="0" smtClean="0">
+                <a:cs typeface="+mn-cs"/>
+              </a:rPr>
+              <a:t>bb10 </a:t>
+            </a:r>
+            <a:r>
+              <a:rPr lang="en-US" dirty="0" smtClean="0">
+                <a:cs typeface="+mn-cs"/>
+              </a:rPr>
+              <a:t>for BlackBerry 10 also requires defining simulator build or device</a:t>
             </a:r>
           </a:p>
           <a:p>
@@ -6371,7 +6458,16 @@
                 </a:solidFill>
                 <a:cs typeface="+mn-cs"/>
               </a:rPr>
-              <a:t>device.</a:t>
+              <a:t>device</a:t>
+            </a:r>
+            <a:r>
+              <a:rPr lang="en-US" b="1" dirty="0" smtClean="0">
+                <a:solidFill>
+                  <a:srgbClr val="00A8DF"/>
+                </a:solidFill>
+                <a:cs typeface="+mn-cs"/>
+              </a:rPr>
+              <a:t>.</a:t>
             </a:r>
             <a:r>
               <a:rPr lang="en-US" dirty="0" smtClean="0">
@@ -6389,7 +6485,7 @@
                 </a:solidFill>
                 <a:cs typeface="+mn-cs"/>
               </a:rPr>
-              <a:t>native</a:t>
+              <a:t>bb10</a:t>
             </a:r>
             <a:r>
               <a:rPr lang="en-US" dirty="0" smtClean="0">
@@ -6407,7 +6503,7 @@
                 </a:solidFill>
                 <a:cs typeface="+mn-cs"/>
               </a:rPr>
-              <a:t> air</a:t>
+              <a:t> tablet</a:t>
             </a:r>
             <a:r>
               <a:rPr lang="en-US" dirty="0" smtClean="0">
@@ -6449,7 +6545,16 @@
                 </a:solidFill>
                 <a:cs typeface="+mn-cs"/>
               </a:rPr>
-              <a:t>device.</a:t>
+              <a:t>device</a:t>
+            </a:r>
+            <a:r>
+              <a:rPr lang="en-US" b="1" dirty="0" smtClean="0">
+                <a:solidFill>
+                  <a:srgbClr val="00A8DF"/>
+                </a:solidFill>
+                <a:cs typeface="+mn-cs"/>
+              </a:rPr>
+              <a:t>.</a:t>
             </a:r>
             <a:r>
               <a:rPr lang="en-US" dirty="0" smtClean="0">
@@ -6467,7 +6572,7 @@
                 </a:solidFill>
                 <a:cs typeface="+mn-cs"/>
               </a:rPr>
-              <a:t>native</a:t>
+              <a:t>bb10</a:t>
             </a:r>
             <a:r>
               <a:rPr lang="en-US" dirty="0" smtClean="0">
@@ -6485,7 +6590,7 @@
                 </a:solidFill>
                 <a:cs typeface="+mn-cs"/>
               </a:rPr>
-              <a:t> air</a:t>
+              <a:t> tablet</a:t>
             </a:r>
             <a:r>
               <a:rPr lang="en-US" dirty="0" smtClean="0">
@@ -6503,7 +6608,16 @@
                 </a:solidFill>
                 <a:cs typeface="+mn-cs"/>
               </a:rPr>
-              <a:t> java</a:t>
+              <a:t> </a:t>
+            </a:r>
+            <a:r>
+              <a:rPr lang="en-US" b="1" dirty="0" err="1" smtClean="0">
+                <a:solidFill>
+                  <a:srgbClr val="00A8DF"/>
+                </a:solidFill>
+                <a:cs typeface="+mn-cs"/>
+              </a:rPr>
+              <a:t>bbos</a:t>
             </a:r>
             <a:r>
               <a:rPr lang="en-US" dirty="0" smtClean="0">
@@ -6521,14 +6635,32 @@
                 </a:solidFill>
                 <a:cs typeface="+mn-cs"/>
               </a:rPr>
-              <a:t>.pw</a:t>
-            </a:r>
-            <a:r>
-              <a:rPr lang="en-US" dirty="0" smtClean="0">
-                <a:cs typeface="+mn-cs"/>
-              </a:rPr>
-              <a:t> properties when deploying</a:t>
-            </a:r>
+              <a:t>.</a:t>
+            </a:r>
+            <a:r>
+              <a:rPr lang="en-US" b="1" dirty="0" smtClean="0">
+                <a:solidFill>
+                  <a:srgbClr val="00A8DF"/>
+                </a:solidFill>
+                <a:cs typeface="+mn-cs"/>
+              </a:rPr>
+              <a:t>pw</a:t>
+            </a:r>
+            <a:r>
+              <a:rPr lang="en-US" dirty="0" smtClean="0">
+                <a:cs typeface="+mn-cs"/>
+              </a:rPr>
+              <a:t> </a:t>
+            </a:r>
+            <a:r>
+              <a:rPr lang="en-US" dirty="0" smtClean="0">
+                <a:cs typeface="+mn-cs"/>
+              </a:rPr>
+              <a:t>properties</a:t>
+            </a:r>
+            <a:endParaRPr lang="en-US" dirty="0" smtClean="0">
+              <a:cs typeface="+mn-cs"/>
+            </a:endParaRPr>
           </a:p>
           <a:p>
             <a:pPr eaLnBrk="1" hangingPunct="1">
@@ -6541,17 +6673,26 @@
               <a:t>	&lt;property name="</a:t>
             </a:r>
             <a:r>
-              <a:rPr lang="en-US" dirty="0" err="1" smtClean="0">
-                <a:cs typeface="+mn-cs"/>
-              </a:rPr>
-              <a:t>device.native.ip</a:t>
-            </a:r>
-            <a:r>
-              <a:rPr lang="en-US" dirty="0" smtClean="0">
-                <a:cs typeface="+mn-cs"/>
-              </a:rPr>
-              <a:t>" value="192.168.0.134"/&gt;</a:t>
-            </a:r>
+              <a:rPr lang="en-US" dirty="0" smtClean="0">
+                <a:cs typeface="+mn-cs"/>
+              </a:rPr>
+              <a:t>device.bb10.ip</a:t>
+            </a:r>
+            <a:r>
+              <a:rPr lang="en-US" dirty="0" smtClean="0">
+                <a:cs typeface="+mn-cs"/>
+              </a:rPr>
+              <a:t>" value</a:t>
+            </a:r>
+            <a:r>
+              <a:rPr lang="en-US" dirty="0" smtClean="0">
+                <a:cs typeface="+mn-cs"/>
+              </a:rPr>
+              <a:t>=“169.254.0.1"/&gt;</a:t>
+            </a:r>
+            <a:endParaRPr lang="en-US" dirty="0" smtClean="0">
+              <a:cs typeface="+mn-cs"/>
+            </a:endParaRPr>
           </a:p>
           <a:p>
             <a:pPr eaLnBrk="1" hangingPunct="1">
@@ -6561,7 +6702,31 @@
               <a:rPr lang="en-US" dirty="0" smtClean="0">
                 <a:cs typeface="+mn-cs"/>
               </a:rPr>
-              <a:t>	&lt;property name="device.native.pw" value="" /&gt;</a:t>
+              <a:t>	&lt;property name="</a:t>
+            </a:r>
+            <a:r>
+              <a:rPr lang="en-US" dirty="0" smtClean="0">
+                <a:cs typeface="+mn-cs"/>
+              </a:rPr>
+              <a:t>device.bb10.pw</a:t>
+            </a:r>
+            <a:r>
+              <a:rPr lang="en-US" dirty="0" smtClean="0">
+                <a:cs typeface="+mn-cs"/>
+              </a:rPr>
+              <a:t>" value</a:t>
+            </a:r>
+            <a:r>
+              <a:rPr lang="en-US" dirty="0" smtClean="0">
+                <a:cs typeface="+mn-cs"/>
+              </a:rPr>
+              <a:t>=“******" </a:t>
+            </a:r>
+            <a:r>
+              <a:rPr lang="en-US" dirty="0" smtClean="0">
+                <a:cs typeface="+mn-cs"/>
+              </a:rPr>
+              <a:t>/&gt;</a:t>
             </a:r>
           </a:p>
           <a:p>
@@ -6613,7 +6778,7 @@
                 <a:ea typeface="ＭＳ Ｐゴシック" pitchFamily="34" charset="-128"/>
               </a:rPr>
               <a:pPr/>
-              <a:t>November 28, 2012</a:t>
+              <a:t>January 24, 2013</a:t>
             </a:fld>
             <a:endParaRPr lang="en-US" smtClean="0">
               <a:latin typeface="Trade Gothic Next LT Pro Lt" pitchFamily="34" charset="0"/>
@@ -6740,7 +6905,7 @@
                 <a:ea typeface="ＭＳ Ｐゴシック" pitchFamily="34" charset="-128"/>
               </a:rPr>
               <a:pPr/>
-              <a:t>November 28, 2012</a:t>
+              <a:t>January 24, 2013</a:t>
             </a:fld>
             <a:endParaRPr lang="en-US" smtClean="0">
               <a:latin typeface="Trade Gothic Next LT Pro Lt" pitchFamily="34" charset="0"/>

</xml_diff>

<commit_message>
Added instructions for Debug Tokens
</commit_message>
<xml_diff>
--- a/Ant-Build-Script/WebWorksBuildScript.pptx
+++ b/Ant-Build-Script/WebWorksBuildScript.pptx
@@ -5,21 +5,22 @@
     <p:sldMasterId id="2147483648" r:id="rId1"/>
   </p:sldMasterIdLst>
   <p:notesMasterIdLst>
-    <p:notesMasterId r:id="rId8"/>
+    <p:notesMasterId r:id="rId9"/>
   </p:notesMasterIdLst>
   <p:handoutMasterIdLst>
-    <p:handoutMasterId r:id="rId9"/>
+    <p:handoutMasterId r:id="rId10"/>
   </p:handoutMasterIdLst>
   <p:sldIdLst>
-    <p:sldId id="275" r:id="rId2"/>
-    <p:sldId id="265" r:id="rId3"/>
-    <p:sldId id="277" r:id="rId4"/>
-    <p:sldId id="266" r:id="rId5"/>
-    <p:sldId id="279" r:id="rId6"/>
+    <p:sldId id="273" r:id="rId2"/>
+    <p:sldId id="274" r:id="rId3"/>
+    <p:sldId id="275" r:id="rId4"/>
+    <p:sldId id="276" r:id="rId5"/>
+    <p:sldId id="277" r:id="rId6"/>
     <p:sldId id="278" r:id="rId7"/>
+    <p:sldId id="279" r:id="rId8"/>
   </p:sldIdLst>
   <p:sldSz cx="14630400" cy="8229600"/>
-  <p:notesSz cx="6858000" cy="9144000"/>
+  <p:notesSz cx="7010400" cy="9296400"/>
   <p:defaultTextStyle>
     <a:defPPr>
       <a:defRPr lang="en-US"/>
@@ -35,7 +36,7 @@
         <a:solidFill>
           <a:schemeClr val="tx1"/>
         </a:solidFill>
-        <a:latin typeface="Arial" pitchFamily="34" charset="0"/>
+        <a:latin typeface="Arial" charset="0"/>
         <a:ea typeface="ＭＳ Ｐゴシック" pitchFamily="34" charset="-128"/>
         <a:cs typeface="+mn-cs"/>
       </a:defRPr>
@@ -51,7 +52,7 @@
         <a:solidFill>
           <a:schemeClr val="tx1"/>
         </a:solidFill>
-        <a:latin typeface="Arial" pitchFamily="34" charset="0"/>
+        <a:latin typeface="Arial" charset="0"/>
         <a:ea typeface="ＭＳ Ｐゴシック" pitchFamily="34" charset="-128"/>
         <a:cs typeface="+mn-cs"/>
       </a:defRPr>
@@ -67,7 +68,7 @@
         <a:solidFill>
           <a:schemeClr val="tx1"/>
         </a:solidFill>
-        <a:latin typeface="Arial" pitchFamily="34" charset="0"/>
+        <a:latin typeface="Arial" charset="0"/>
         <a:ea typeface="ＭＳ Ｐゴシック" pitchFamily="34" charset="-128"/>
         <a:cs typeface="+mn-cs"/>
       </a:defRPr>
@@ -83,7 +84,7 @@
         <a:solidFill>
           <a:schemeClr val="tx1"/>
         </a:solidFill>
-        <a:latin typeface="Arial" pitchFamily="34" charset="0"/>
+        <a:latin typeface="Arial" charset="0"/>
         <a:ea typeface="ＭＳ Ｐゴシック" pitchFamily="34" charset="-128"/>
         <a:cs typeface="+mn-cs"/>
       </a:defRPr>
@@ -99,7 +100,7 @@
         <a:solidFill>
           <a:schemeClr val="tx1"/>
         </a:solidFill>
-        <a:latin typeface="Arial" pitchFamily="34" charset="0"/>
+        <a:latin typeface="Arial" charset="0"/>
         <a:ea typeface="ＭＳ Ｐゴシック" pitchFamily="34" charset="-128"/>
         <a:cs typeface="+mn-cs"/>
       </a:defRPr>
@@ -109,7 +110,7 @@
         <a:solidFill>
           <a:schemeClr val="tx1"/>
         </a:solidFill>
-        <a:latin typeface="Arial" pitchFamily="34" charset="0"/>
+        <a:latin typeface="Arial" charset="0"/>
         <a:ea typeface="ＭＳ Ｐゴシック" pitchFamily="34" charset="-128"/>
         <a:cs typeface="+mn-cs"/>
       </a:defRPr>
@@ -119,7 +120,7 @@
         <a:solidFill>
           <a:schemeClr val="tx1"/>
         </a:solidFill>
-        <a:latin typeface="Arial" pitchFamily="34" charset="0"/>
+        <a:latin typeface="Arial" charset="0"/>
         <a:ea typeface="ＭＳ Ｐゴシック" pitchFamily="34" charset="-128"/>
         <a:cs typeface="+mn-cs"/>
       </a:defRPr>
@@ -129,7 +130,7 @@
         <a:solidFill>
           <a:schemeClr val="tx1"/>
         </a:solidFill>
-        <a:latin typeface="Arial" pitchFamily="34" charset="0"/>
+        <a:latin typeface="Arial" charset="0"/>
         <a:ea typeface="ＭＳ Ｐゴシック" pitchFamily="34" charset="-128"/>
         <a:cs typeface="+mn-cs"/>
       </a:defRPr>
@@ -139,7 +140,7 @@
         <a:solidFill>
           <a:schemeClr val="tx1"/>
         </a:solidFill>
-        <a:latin typeface="Arial" pitchFamily="34" charset="0"/>
+        <a:latin typeface="Arial" charset="0"/>
         <a:ea typeface="ＭＳ Ｐゴシック" pitchFamily="34" charset="-128"/>
         <a:cs typeface="+mn-cs"/>
       </a:defRPr>
@@ -180,23 +181,34 @@
             <p:ph type="hdr" sz="quarter"/>
           </p:nvPr>
         </p:nvSpPr>
-        <p:spPr>
+        <p:spPr bwMode="auto">
           <a:xfrm>
             <a:off x="0" y="0"/>
-            <a:ext cx="2971800" cy="457200"/>
+            <a:ext cx="3038475" cy="465138"/>
           </a:xfrm>
           <a:prstGeom prst="rect">
             <a:avLst/>
           </a:prstGeom>
+          <a:noFill/>
+          <a:ln w="9525">
+            <a:noFill/>
+            <a:miter lim="800000"/>
+            <a:headEnd/>
+            <a:tailEnd/>
+          </a:ln>
         </p:spPr>
         <p:txBody>
-          <a:bodyPr vert="horz" lIns="91440" tIns="45720" rIns="91440" bIns="45720" rtlCol="0"/>
+          <a:bodyPr vert="horz" wrap="square" lIns="93177" tIns="46589" rIns="93177" bIns="46589" numCol="1" anchor="t" anchorCtr="0" compatLnSpc="1">
+            <a:prstTxWarp prst="textNoShape">
+              <a:avLst/>
+            </a:prstTxWarp>
+          </a:bodyPr>
           <a:lstStyle>
-            <a:lvl1pPr algn="l" eaLnBrk="0" hangingPunct="0">
+            <a:lvl1pPr defTabSz="931863" eaLnBrk="0" hangingPunct="0">
               <a:defRPr sz="1200">
                 <a:latin typeface="Arial" charset="0"/>
-                <a:ea typeface="ＭＳ Ｐゴシック" pitchFamily="-16" charset="-128"/>
-                <a:cs typeface="+mn-cs"/>
+                <a:ea typeface="ＭＳ Ｐゴシック"/>
+                <a:cs typeface="ＭＳ Ｐゴシック"/>
               </a:defRPr>
             </a:lvl1pPr>
           </a:lstStyle>
@@ -218,23 +230,34 @@
             <p:ph type="dt" sz="quarter" idx="1"/>
           </p:nvPr>
         </p:nvSpPr>
-        <p:spPr>
+        <p:spPr bwMode="auto">
           <a:xfrm>
-            <a:off x="3884613" y="0"/>
-            <a:ext cx="2971800" cy="457200"/>
+            <a:off x="3970338" y="0"/>
+            <a:ext cx="3038475" cy="465138"/>
           </a:xfrm>
           <a:prstGeom prst="rect">
             <a:avLst/>
           </a:prstGeom>
+          <a:noFill/>
+          <a:ln w="9525">
+            <a:noFill/>
+            <a:miter lim="800000"/>
+            <a:headEnd/>
+            <a:tailEnd/>
+          </a:ln>
         </p:spPr>
         <p:txBody>
-          <a:bodyPr vert="horz" lIns="91440" tIns="45720" rIns="91440" bIns="45720" rtlCol="0"/>
+          <a:bodyPr vert="horz" wrap="square" lIns="93177" tIns="46589" rIns="93177" bIns="46589" numCol="1" anchor="t" anchorCtr="0" compatLnSpc="1">
+            <a:prstTxWarp prst="textNoShape">
+              <a:avLst/>
+            </a:prstTxWarp>
+          </a:bodyPr>
           <a:lstStyle>
-            <a:lvl1pPr algn="r" eaLnBrk="0" hangingPunct="0">
+            <a:lvl1pPr algn="r" defTabSz="931863" eaLnBrk="0" hangingPunct="0">
               <a:defRPr sz="1200">
                 <a:latin typeface="Arial" charset="0"/>
-                <a:ea typeface="ＭＳ Ｐゴシック" pitchFamily="-16" charset="-128"/>
-                <a:cs typeface="+mn-cs"/>
+                <a:ea typeface="ＭＳ Ｐゴシック"/>
+                <a:cs typeface="ＭＳ Ｐゴシック"/>
               </a:defRPr>
             </a:lvl1pPr>
           </a:lstStyle>
@@ -242,12 +265,12 @@
             <a:pPr>
               <a:defRPr/>
             </a:pPr>
-            <a:fld id="{DDB52642-783B-483E-903C-AFDDBDC9ECA6}" type="datetimeFigureOut">
+            <a:fld id="{97864A3B-8842-4E64-B343-8F2AB3D50035}" type="datetimeFigureOut">
               <a:rPr lang="en-US"/>
               <a:pPr>
                 <a:defRPr/>
               </a:pPr>
-              <a:t>1/24/2013</a:t>
+              <a:t>4/17/2013</a:t>
             </a:fld>
             <a:endParaRPr lang="en-US"/>
           </a:p>
@@ -263,23 +286,34 @@
             <p:ph type="ftr" sz="quarter" idx="2"/>
           </p:nvPr>
         </p:nvSpPr>
-        <p:spPr>
+        <p:spPr bwMode="auto">
           <a:xfrm>
-            <a:off x="0" y="8685213"/>
-            <a:ext cx="2971800" cy="457200"/>
+            <a:off x="0" y="8829675"/>
+            <a:ext cx="3038475" cy="465138"/>
           </a:xfrm>
           <a:prstGeom prst="rect">
             <a:avLst/>
           </a:prstGeom>
+          <a:noFill/>
+          <a:ln w="9525">
+            <a:noFill/>
+            <a:miter lim="800000"/>
+            <a:headEnd/>
+            <a:tailEnd/>
+          </a:ln>
         </p:spPr>
         <p:txBody>
-          <a:bodyPr vert="horz" lIns="91440" tIns="45720" rIns="91440" bIns="45720" rtlCol="0" anchor="b"/>
+          <a:bodyPr vert="horz" wrap="square" lIns="93177" tIns="46589" rIns="93177" bIns="46589" numCol="1" anchor="b" anchorCtr="0" compatLnSpc="1">
+            <a:prstTxWarp prst="textNoShape">
+              <a:avLst/>
+            </a:prstTxWarp>
+          </a:bodyPr>
           <a:lstStyle>
-            <a:lvl1pPr algn="l" eaLnBrk="0" hangingPunct="0">
+            <a:lvl1pPr defTabSz="931863" eaLnBrk="0" hangingPunct="0">
               <a:defRPr sz="1200">
                 <a:latin typeface="Arial" charset="0"/>
-                <a:ea typeface="ＭＳ Ｐゴシック" pitchFamily="-16" charset="-128"/>
-                <a:cs typeface="+mn-cs"/>
+                <a:ea typeface="ＭＳ Ｐゴシック"/>
+                <a:cs typeface="ＭＳ Ｐゴシック"/>
               </a:defRPr>
             </a:lvl1pPr>
           </a:lstStyle>
@@ -301,23 +335,34 @@
             <p:ph type="sldNum" sz="quarter" idx="3"/>
           </p:nvPr>
         </p:nvSpPr>
-        <p:spPr>
+        <p:spPr bwMode="auto">
           <a:xfrm>
-            <a:off x="3884613" y="8685213"/>
-            <a:ext cx="2971800" cy="457200"/>
+            <a:off x="3970338" y="8829675"/>
+            <a:ext cx="3038475" cy="465138"/>
           </a:xfrm>
           <a:prstGeom prst="rect">
             <a:avLst/>
           </a:prstGeom>
+          <a:noFill/>
+          <a:ln w="9525">
+            <a:noFill/>
+            <a:miter lim="800000"/>
+            <a:headEnd/>
+            <a:tailEnd/>
+          </a:ln>
         </p:spPr>
         <p:txBody>
-          <a:bodyPr vert="horz" lIns="91440" tIns="45720" rIns="91440" bIns="45720" rtlCol="0" anchor="b"/>
+          <a:bodyPr vert="horz" wrap="square" lIns="93177" tIns="46589" rIns="93177" bIns="46589" numCol="1" anchor="b" anchorCtr="0" compatLnSpc="1">
+            <a:prstTxWarp prst="textNoShape">
+              <a:avLst/>
+            </a:prstTxWarp>
+          </a:bodyPr>
           <a:lstStyle>
-            <a:lvl1pPr algn="r" eaLnBrk="0" hangingPunct="0">
+            <a:lvl1pPr algn="r" defTabSz="931863" eaLnBrk="0" hangingPunct="0">
               <a:defRPr sz="1200">
                 <a:latin typeface="Arial" charset="0"/>
-                <a:ea typeface="ＭＳ Ｐゴシック" pitchFamily="-16" charset="-128"/>
-                <a:cs typeface="+mn-cs"/>
+                <a:ea typeface="ＭＳ Ｐゴシック"/>
+                <a:cs typeface="ＭＳ Ｐゴシック"/>
               </a:defRPr>
             </a:lvl1pPr>
           </a:lstStyle>
@@ -325,7 +370,7 @@
             <a:pPr>
               <a:defRPr/>
             </a:pPr>
-            <a:fld id="{0223180E-FC50-4CC6-B81A-F3A5DE3C6E13}" type="slidenum">
+            <a:fld id="{27F79CAB-DA4C-416A-B421-BDFC076CFE12}" type="slidenum">
               <a:rPr lang="en-US"/>
               <a:pPr>
                 <a:defRPr/>
@@ -380,7 +425,7 @@
         <p:spPr bwMode="auto">
           <a:xfrm>
             <a:off x="0" y="0"/>
-            <a:ext cx="2971800" cy="457200"/>
+            <a:ext cx="3038475" cy="465138"/>
           </a:xfrm>
           <a:prstGeom prst="rect">
             <a:avLst/>
@@ -394,17 +439,17 @@
           </a:ln>
         </p:spPr>
         <p:txBody>
-          <a:bodyPr vert="horz" wrap="square" lIns="91440" tIns="45720" rIns="91440" bIns="45720" numCol="1" anchor="t" anchorCtr="0" compatLnSpc="1">
+          <a:bodyPr vert="horz" wrap="square" lIns="93177" tIns="46589" rIns="93177" bIns="46589" numCol="1" anchor="t" anchorCtr="0" compatLnSpc="1">
             <a:prstTxWarp prst="textNoShape">
               <a:avLst/>
             </a:prstTxWarp>
           </a:bodyPr>
           <a:lstStyle>
-            <a:lvl1pPr eaLnBrk="0" hangingPunct="0">
+            <a:lvl1pPr defTabSz="931863" eaLnBrk="0" hangingPunct="0">
               <a:defRPr sz="1200">
                 <a:latin typeface="Arial" charset="0"/>
-                <a:ea typeface="ＭＳ Ｐゴシック" pitchFamily="-16" charset="-128"/>
-                <a:cs typeface="+mn-cs"/>
+                <a:ea typeface="ＭＳ Ｐゴシック"/>
+                <a:cs typeface="ＭＳ Ｐゴシック"/>
               </a:defRPr>
             </a:lvl1pPr>
           </a:lstStyle>
@@ -428,8 +473,8 @@
         </p:nvSpPr>
         <p:spPr bwMode="auto">
           <a:xfrm>
-            <a:off x="3886200" y="0"/>
-            <a:ext cx="2971800" cy="457200"/>
+            <a:off x="3971925" y="0"/>
+            <a:ext cx="3038475" cy="465138"/>
           </a:xfrm>
           <a:prstGeom prst="rect">
             <a:avLst/>
@@ -443,17 +488,17 @@
           </a:ln>
         </p:spPr>
         <p:txBody>
-          <a:bodyPr vert="horz" wrap="square" lIns="91440" tIns="45720" rIns="91440" bIns="45720" numCol="1" anchor="t" anchorCtr="0" compatLnSpc="1">
+          <a:bodyPr vert="horz" wrap="square" lIns="93177" tIns="46589" rIns="93177" bIns="46589" numCol="1" anchor="t" anchorCtr="0" compatLnSpc="1">
             <a:prstTxWarp prst="textNoShape">
               <a:avLst/>
             </a:prstTxWarp>
           </a:bodyPr>
           <a:lstStyle>
-            <a:lvl1pPr algn="r" eaLnBrk="0" hangingPunct="0">
+            <a:lvl1pPr algn="r" defTabSz="931863" eaLnBrk="0" hangingPunct="0">
               <a:defRPr sz="1200">
                 <a:latin typeface="Arial" charset="0"/>
-                <a:ea typeface="ＭＳ Ｐゴシック" pitchFamily="-16" charset="-128"/>
-                <a:cs typeface="+mn-cs"/>
+                <a:ea typeface="ＭＳ Ｐゴシック"/>
+                <a:cs typeface="ＭＳ Ｐゴシック"/>
               </a:defRPr>
             </a:lvl1pPr>
           </a:lstStyle>
@@ -467,7 +512,7 @@
       </p:sp>
       <p:sp>
         <p:nvSpPr>
-          <p:cNvPr id="30724" name="Rectangle 4"/>
+          <p:cNvPr id="20484" name="Rectangle 4"/>
           <p:cNvSpPr>
             <a:spLocks noGrp="1" noRot="1" noChangeAspect="1" noChangeArrowheads="1" noTextEdit="1"/>
           </p:cNvSpPr>
@@ -477,8 +522,8 @@
         </p:nvSpPr>
         <p:spPr bwMode="auto">
           <a:xfrm>
-            <a:off x="381000" y="685800"/>
-            <a:ext cx="6096000" cy="3429000"/>
+            <a:off x="406400" y="696913"/>
+            <a:ext cx="6197600" cy="3486150"/>
           </a:xfrm>
           <a:prstGeom prst="rect">
             <a:avLst/>
@@ -506,8 +551,8 @@
         </p:nvSpPr>
         <p:spPr bwMode="auto">
           <a:xfrm>
-            <a:off x="914400" y="4343400"/>
-            <a:ext cx="5029200" cy="4114800"/>
+            <a:off x="935038" y="4416425"/>
+            <a:ext cx="5140325" cy="4183063"/>
           </a:xfrm>
           <a:prstGeom prst="rect">
             <a:avLst/>
@@ -521,7 +566,7 @@
           </a:ln>
         </p:spPr>
         <p:txBody>
-          <a:bodyPr vert="horz" wrap="square" lIns="91440" tIns="45720" rIns="91440" bIns="45720" numCol="1" anchor="t" anchorCtr="0" compatLnSpc="1">
+          <a:bodyPr vert="horz" wrap="square" lIns="93177" tIns="46589" rIns="93177" bIns="46589" numCol="1" anchor="t" anchorCtr="0" compatLnSpc="1">
             <a:prstTxWarp prst="textNoShape">
               <a:avLst/>
             </a:prstTxWarp>
@@ -576,8 +621,8 @@
         </p:nvSpPr>
         <p:spPr bwMode="auto">
           <a:xfrm>
-            <a:off x="0" y="8686800"/>
-            <a:ext cx="2971800" cy="457200"/>
+            <a:off x="0" y="8831263"/>
+            <a:ext cx="3038475" cy="465137"/>
           </a:xfrm>
           <a:prstGeom prst="rect">
             <a:avLst/>
@@ -591,17 +636,17 @@
           </a:ln>
         </p:spPr>
         <p:txBody>
-          <a:bodyPr vert="horz" wrap="square" lIns="91440" tIns="45720" rIns="91440" bIns="45720" numCol="1" anchor="b" anchorCtr="0" compatLnSpc="1">
+          <a:bodyPr vert="horz" wrap="square" lIns="93177" tIns="46589" rIns="93177" bIns="46589" numCol="1" anchor="b" anchorCtr="0" compatLnSpc="1">
             <a:prstTxWarp prst="textNoShape">
               <a:avLst/>
             </a:prstTxWarp>
           </a:bodyPr>
           <a:lstStyle>
-            <a:lvl1pPr eaLnBrk="0" hangingPunct="0">
+            <a:lvl1pPr defTabSz="931863" eaLnBrk="0" hangingPunct="0">
               <a:defRPr sz="1200">
                 <a:latin typeface="Arial" charset="0"/>
-                <a:ea typeface="ＭＳ Ｐゴシック" pitchFamily="-16" charset="-128"/>
-                <a:cs typeface="+mn-cs"/>
+                <a:ea typeface="ＭＳ Ｐゴシック"/>
+                <a:cs typeface="ＭＳ Ｐゴシック"/>
               </a:defRPr>
             </a:lvl1pPr>
           </a:lstStyle>
@@ -625,8 +670,8 @@
         </p:nvSpPr>
         <p:spPr bwMode="auto">
           <a:xfrm>
-            <a:off x="3886200" y="8686800"/>
-            <a:ext cx="2971800" cy="457200"/>
+            <a:off x="3971925" y="8831263"/>
+            <a:ext cx="3038475" cy="465137"/>
           </a:xfrm>
           <a:prstGeom prst="rect">
             <a:avLst/>
@@ -640,17 +685,17 @@
           </a:ln>
         </p:spPr>
         <p:txBody>
-          <a:bodyPr vert="horz" wrap="square" lIns="91440" tIns="45720" rIns="91440" bIns="45720" numCol="1" anchor="b" anchorCtr="0" compatLnSpc="1">
+          <a:bodyPr vert="horz" wrap="square" lIns="93177" tIns="46589" rIns="93177" bIns="46589" numCol="1" anchor="b" anchorCtr="0" compatLnSpc="1">
             <a:prstTxWarp prst="textNoShape">
               <a:avLst/>
             </a:prstTxWarp>
           </a:bodyPr>
           <a:lstStyle>
-            <a:lvl1pPr algn="r" eaLnBrk="0" hangingPunct="0">
+            <a:lvl1pPr algn="r" defTabSz="931863" eaLnBrk="0" hangingPunct="0">
               <a:defRPr sz="1200">
                 <a:latin typeface="Arial" charset="0"/>
-                <a:ea typeface="ＭＳ Ｐゴシック" pitchFamily="-16" charset="-128"/>
-                <a:cs typeface="+mn-cs"/>
+                <a:ea typeface="ＭＳ Ｐゴシック"/>
+                <a:cs typeface="ＭＳ Ｐゴシック"/>
               </a:defRPr>
             </a:lvl1pPr>
           </a:lstStyle>
@@ -658,7 +703,7 @@
             <a:pPr>
               <a:defRPr/>
             </a:pPr>
-            <a:fld id="{6968DDAF-6C38-44DC-8C44-4813184C3F6B}" type="slidenum">
+            <a:fld id="{29F1A7C7-7436-4D08-A521-E3F140650041}" type="slidenum">
               <a:rPr lang="en-US"/>
               <a:pPr>
                 <a:defRPr/>
@@ -814,12 +859,21 @@
           <a:chExt cx="0" cy="0"/>
         </a:xfrm>
       </p:grpSpPr>
-      <p:sp>
-        <p:nvSpPr>
-          <p:cNvPr id="4" name="Rectangle 3"/>
-          <p:cNvSpPr/>
+      <p:pic>
+        <p:nvPicPr>
+          <p:cNvPr id="4" name="Picture 8"/>
+          <p:cNvPicPr>
+            <a:picLocks noChangeAspect="1"/>
+          </p:cNvPicPr>
           <p:nvPr userDrawn="1"/>
-        </p:nvSpPr>
+        </p:nvPicPr>
+        <p:blipFill>
+          <a:blip r:embed="rId2" cstate="print"/>
+          <a:srcRect/>
+          <a:stretch>
+            <a:fillRect/>
+          </a:stretch>
+        </p:blipFill>
         <p:spPr bwMode="auto">
           <a:xfrm>
             <a:off x="0" y="0"/>
@@ -828,40 +882,20 @@
           <a:prstGeom prst="rect">
             <a:avLst/>
           </a:prstGeom>
-          <a:solidFill>
-            <a:schemeClr val="tx1"/>
-          </a:solidFill>
-          <a:ln w="9525" cap="flat" cmpd="sng" algn="ctr">
+          <a:noFill/>
+          <a:ln w="9525">
             <a:noFill/>
-            <a:prstDash val="solid"/>
-            <a:round/>
-            <a:headEnd type="none" w="med" len="med"/>
-            <a:tailEnd type="none" w="med" len="med"/>
+            <a:miter lim="800000"/>
+            <a:headEnd/>
+            <a:tailEnd/>
           </a:ln>
-          <a:effectLst/>
         </p:spPr>
-        <p:txBody>
-          <a:bodyPr/>
-          <a:lstStyle/>
-          <a:p>
-            <a:pPr eaLnBrk="0" hangingPunct="0">
-              <a:defRPr/>
-            </a:pPr>
-            <a:r>
-              <a:rPr lang="en-US" dirty="0">
-                <a:latin typeface="Arial" charset="0"/>
-                <a:ea typeface="ＭＳ Ｐゴシック" pitchFamily="-16" charset="-128"/>
-              </a:rPr>
-              <a:t>{</a:t>
-            </a:r>
-          </a:p>
-        </p:txBody>
-      </p:sp>
+      </p:pic>
       <p:sp>
         <p:nvSpPr>
           <p:cNvPr id="5" name="Rectangle 4"/>
           <p:cNvSpPr/>
-          <p:nvPr userDrawn="1"/>
+          <p:nvPr/>
         </p:nvSpPr>
         <p:spPr bwMode="auto">
           <a:xfrm>
@@ -894,44 +928,11 @@
               <a:defRPr/>
             </a:pPr>
             <a:endParaRPr lang="en-US">
-              <a:latin typeface="Arial" charset="0"/>
               <a:ea typeface="ＭＳ Ｐゴシック" pitchFamily="-16" charset="-128"/>
             </a:endParaRPr>
           </a:p>
         </p:txBody>
       </p:sp>
-      <p:pic>
-        <p:nvPicPr>
-          <p:cNvPr id="6" name="Picture 12" descr="RIM_white_LG16percent.png"/>
-          <p:cNvPicPr>
-            <a:picLocks noChangeAspect="1"/>
-          </p:cNvPicPr>
-          <p:nvPr userDrawn="1"/>
-        </p:nvPicPr>
-        <p:blipFill>
-          <a:blip r:embed="rId2" cstate="print"/>
-          <a:srcRect/>
-          <a:stretch>
-            <a:fillRect/>
-          </a:stretch>
-        </p:blipFill>
-        <p:spPr bwMode="auto">
-          <a:xfrm>
-            <a:off x="10807700" y="6424613"/>
-            <a:ext cx="3617913" cy="1574800"/>
-          </a:xfrm>
-          <a:prstGeom prst="rect">
-            <a:avLst/>
-          </a:prstGeom>
-          <a:noFill/>
-          <a:ln w="9525">
-            <a:noFill/>
-            <a:miter lim="800000"/>
-            <a:headEnd/>
-            <a:tailEnd/>
-          </a:ln>
-        </p:spPr>
-      </p:pic>
       <p:sp>
         <p:nvSpPr>
           <p:cNvPr id="2" name="Title 1"/>
@@ -944,8 +945,8 @@
         </p:nvSpPr>
         <p:spPr bwMode="ltGray">
           <a:xfrm>
-            <a:off x="448885" y="1899137"/>
-            <a:ext cx="10519153" cy="1660038"/>
+            <a:off x="448885" y="651177"/>
+            <a:ext cx="10519153" cy="2607424"/>
           </a:xfrm>
         </p:spPr>
         <p:txBody>
@@ -957,7 +958,7 @@
           </a:lstStyle>
           <a:p>
             <a:r>
-              <a:rPr lang="en-US" dirty="0" smtClean="0"/>
+              <a:rPr lang="en-US" smtClean="0"/>
               <a:t>Click to edit Master title style</a:t>
             </a:r>
             <a:endParaRPr lang="en-US" dirty="0"/>
@@ -977,7 +978,7 @@
         <p:spPr bwMode="ltGray">
           <a:xfrm>
             <a:off x="448885" y="3541346"/>
-            <a:ext cx="10219115" cy="725854"/>
+            <a:ext cx="10219115" cy="515265"/>
           </a:xfrm>
         </p:spPr>
         <p:txBody>
@@ -1003,7 +1004,7 @@
       </p:sp>
       <p:sp>
         <p:nvSpPr>
-          <p:cNvPr id="7" name="Date Placeholder 2"/>
+          <p:cNvPr id="6" name="Date Placeholder 2"/>
           <p:cNvSpPr>
             <a:spLocks noGrp="1"/>
           </p:cNvSpPr>
@@ -1013,9 +1014,12 @@
         </p:nvSpPr>
         <p:spPr>
           <a:xfrm>
-            <a:off x="449263" y="4268788"/>
+            <a:off x="449263" y="4087813"/>
             <a:ext cx="10218737" cy="633412"/>
           </a:xfrm>
+          <a:prstGeom prst="rect">
+            <a:avLst/>
+          </a:prstGeom>
         </p:spPr>
         <p:txBody>
           <a:bodyPr anchor="t"/>
@@ -1032,12 +1036,12 @@
             <a:pPr>
               <a:defRPr/>
             </a:pPr>
-            <a:fld id="{96683E6D-C5CE-4896-BCE2-FBB074C3CA9C}" type="datetime4">
+            <a:fld id="{25437AFA-9B62-442E-9ED2-04A3ADF25B07}" type="datetime4">
               <a:rPr lang="en-US"/>
               <a:pPr>
                 <a:defRPr/>
               </a:pPr>
-              <a:t>January 24, 2013</a:t>
+              <a:t>April 17, 2013</a:t>
             </a:fld>
             <a:endParaRPr lang="en-US" dirty="0"/>
           </a:p>
@@ -1051,1097 +1055,6 @@
   <p:transition spd="slow">
     <p:fade thruBlk="1"/>
   </p:transition>
-</p:sldLayout>
-</file>
-
-<file path=ppt/slideLayouts/slideLayout10.xml><?xml version="1.0" encoding="utf-8"?>
-<p:sldLayout xmlns:a="http://schemas.openxmlformats.org/drawingml/2006/main" xmlns:r="http://schemas.openxmlformats.org/officeDocument/2006/relationships" xmlns:p="http://schemas.openxmlformats.org/presentationml/2006/main" preserve="1" userDrawn="1">
-  <p:cSld name="Content Bulleted List White 2 Column">
-    <p:bg>
-      <p:bgPr>
-        <a:solidFill>
-          <a:schemeClr val="bg1"/>
-        </a:solidFill>
-        <a:effectLst/>
-      </p:bgPr>
-    </p:bg>
-    <p:spTree>
-      <p:nvGrpSpPr>
-        <p:cNvPr id="1" name=""/>
-        <p:cNvGrpSpPr/>
-        <p:nvPr/>
-      </p:nvGrpSpPr>
-      <p:grpSpPr>
-        <a:xfrm>
-          <a:off x="0" y="0"/>
-          <a:ext cx="0" cy="0"/>
-          <a:chOff x="0" y="0"/>
-          <a:chExt cx="0" cy="0"/>
-        </a:xfrm>
-      </p:grpSpPr>
-      <p:pic>
-        <p:nvPicPr>
-          <p:cNvPr id="4" name="Picture 10" descr="RIM_black.png"/>
-          <p:cNvPicPr>
-            <a:picLocks noChangeAspect="1"/>
-          </p:cNvPicPr>
-          <p:nvPr userDrawn="1"/>
-        </p:nvPicPr>
-        <p:blipFill>
-          <a:blip r:embed="rId2" cstate="print"/>
-          <a:srcRect/>
-          <a:stretch>
-            <a:fillRect/>
-          </a:stretch>
-        </p:blipFill>
-        <p:spPr bwMode="auto">
-          <a:xfrm>
-            <a:off x="419100" y="254000"/>
-            <a:ext cx="877888" cy="381000"/>
-          </a:xfrm>
-          <a:prstGeom prst="rect">
-            <a:avLst/>
-          </a:prstGeom>
-          <a:noFill/>
-          <a:ln w="9525">
-            <a:noFill/>
-            <a:miter lim="800000"/>
-            <a:headEnd/>
-            <a:tailEnd/>
-          </a:ln>
-        </p:spPr>
-      </p:pic>
-      <p:sp>
-        <p:nvSpPr>
-          <p:cNvPr id="2" name="Title 1"/>
-          <p:cNvSpPr>
-            <a:spLocks noGrp="1"/>
-          </p:cNvSpPr>
-          <p:nvPr>
-            <p:ph type="title"/>
-          </p:nvPr>
-        </p:nvSpPr>
-        <p:spPr bwMode="black"/>
-        <p:txBody>
-          <a:bodyPr/>
-          <a:lstStyle>
-            <a:lvl1pPr>
-              <a:defRPr>
-                <a:solidFill>
-                  <a:schemeClr val="tx1"/>
-                </a:solidFill>
-              </a:defRPr>
-            </a:lvl1pPr>
-          </a:lstStyle>
-          <a:p>
-            <a:r>
-              <a:rPr lang="en-US" smtClean="0"/>
-              <a:t>Click to edit Master title style</a:t>
-            </a:r>
-            <a:endParaRPr lang="en-US"/>
-          </a:p>
-        </p:txBody>
-      </p:sp>
-      <p:sp>
-        <p:nvSpPr>
-          <p:cNvPr id="7" name="Text Placeholder 6"/>
-          <p:cNvSpPr>
-            <a:spLocks noGrp="1"/>
-          </p:cNvSpPr>
-          <p:nvPr>
-            <p:ph type="body" sz="quarter" idx="13"/>
-          </p:nvPr>
-        </p:nvSpPr>
-        <p:spPr bwMode="gray">
-          <a:xfrm>
-            <a:off x="457200" y="3172968"/>
-            <a:ext cx="13716000" cy="4621657"/>
-          </a:xfrm>
-        </p:spPr>
-        <p:txBody>
-          <a:bodyPr numCol="2" spcCol="301752"/>
-          <a:lstStyle>
-            <a:lvl1pPr>
-              <a:defRPr>
-                <a:solidFill>
-                  <a:schemeClr val="accent1"/>
-                </a:solidFill>
-              </a:defRPr>
-            </a:lvl1pPr>
-            <a:lvl2pPr>
-              <a:defRPr>
-                <a:solidFill>
-                  <a:schemeClr val="accent1"/>
-                </a:solidFill>
-              </a:defRPr>
-            </a:lvl2pPr>
-            <a:lvl3pPr>
-              <a:defRPr>
-                <a:solidFill>
-                  <a:schemeClr val="accent1"/>
-                </a:solidFill>
-              </a:defRPr>
-            </a:lvl3pPr>
-            <a:lvl4pPr>
-              <a:defRPr>
-                <a:solidFill>
-                  <a:schemeClr val="accent1"/>
-                </a:solidFill>
-              </a:defRPr>
-            </a:lvl4pPr>
-            <a:lvl5pPr>
-              <a:defRPr>
-                <a:solidFill>
-                  <a:schemeClr val="accent1"/>
-                </a:solidFill>
-              </a:defRPr>
-            </a:lvl5pPr>
-          </a:lstStyle>
-          <a:p>
-            <a:pPr lvl="0"/>
-            <a:r>
-              <a:rPr lang="en-US" smtClean="0"/>
-              <a:t>Click to edit Master text styles</a:t>
-            </a:r>
-          </a:p>
-          <a:p>
-            <a:pPr lvl="1"/>
-            <a:r>
-              <a:rPr lang="en-US" smtClean="0"/>
-              <a:t>Second level</a:t>
-            </a:r>
-          </a:p>
-          <a:p>
-            <a:pPr lvl="2"/>
-            <a:r>
-              <a:rPr lang="en-US" smtClean="0"/>
-              <a:t>Third level</a:t>
-            </a:r>
-          </a:p>
-        </p:txBody>
-      </p:sp>
-      <p:sp>
-        <p:nvSpPr>
-          <p:cNvPr id="5" name="Date Placeholder 2"/>
-          <p:cNvSpPr>
-            <a:spLocks noGrp="1"/>
-          </p:cNvSpPr>
-          <p:nvPr>
-            <p:ph type="dt" sz="half" idx="14"/>
-          </p:nvPr>
-        </p:nvSpPr>
-        <p:spPr/>
-        <p:txBody>
-          <a:bodyPr/>
-          <a:lstStyle>
-            <a:lvl1pPr>
-              <a:defRPr/>
-            </a:lvl1pPr>
-          </a:lstStyle>
-          <a:p>
-            <a:pPr>
-              <a:defRPr/>
-            </a:pPr>
-            <a:fld id="{8E66DC11-70F7-4BC7-A147-6BED823AE323}" type="datetime4">
-              <a:rPr lang="en-US"/>
-              <a:pPr>
-                <a:defRPr/>
-              </a:pPr>
-              <a:t>January 24, 2013</a:t>
-            </a:fld>
-            <a:endParaRPr lang="en-US"/>
-          </a:p>
-        </p:txBody>
-      </p:sp>
-      <p:sp>
-        <p:nvSpPr>
-          <p:cNvPr id="6" name="Slide Number Placeholder 4"/>
-          <p:cNvSpPr>
-            <a:spLocks noGrp="1"/>
-          </p:cNvSpPr>
-          <p:nvPr>
-            <p:ph type="sldNum" sz="quarter" idx="15"/>
-          </p:nvPr>
-        </p:nvSpPr>
-        <p:spPr/>
-        <p:txBody>
-          <a:bodyPr/>
-          <a:lstStyle>
-            <a:lvl1pPr>
-              <a:defRPr/>
-            </a:lvl1pPr>
-          </a:lstStyle>
-          <a:p>
-            <a:pPr>
-              <a:defRPr/>
-            </a:pPr>
-            <a:fld id="{61AF5AFD-5D8E-4B58-94C3-7EBB5E285DE5}" type="slidenum">
-              <a:rPr lang="en-US"/>
-              <a:pPr>
-                <a:defRPr/>
-              </a:pPr>
-              <a:t>‹#›</a:t>
-            </a:fld>
-            <a:endParaRPr lang="en-US"/>
-          </a:p>
-        </p:txBody>
-      </p:sp>
-    </p:spTree>
-  </p:cSld>
-  <p:clrMapOvr>
-    <a:masterClrMapping/>
-  </p:clrMapOvr>
-  <p:transition spd="slow">
-    <p:fade thruBlk="1"/>
-  </p:transition>
-  <p:hf hdr="0" ftr="0"/>
-</p:sldLayout>
-</file>
-
-<file path=ppt/slideLayouts/slideLayout11.xml><?xml version="1.0" encoding="utf-8"?>
-<p:sldLayout xmlns:a="http://schemas.openxmlformats.org/drawingml/2006/main" xmlns:r="http://schemas.openxmlformats.org/officeDocument/2006/relationships" xmlns:p="http://schemas.openxmlformats.org/presentationml/2006/main" preserve="1" userDrawn="1">
-  <p:cSld name="Content Paragraph White 2 Column">
-    <p:bg>
-      <p:bgPr>
-        <a:solidFill>
-          <a:schemeClr val="bg1"/>
-        </a:solidFill>
-        <a:effectLst/>
-      </p:bgPr>
-    </p:bg>
-    <p:spTree>
-      <p:nvGrpSpPr>
-        <p:cNvPr id="1" name=""/>
-        <p:cNvGrpSpPr/>
-        <p:nvPr/>
-      </p:nvGrpSpPr>
-      <p:grpSpPr>
-        <a:xfrm>
-          <a:off x="0" y="0"/>
-          <a:ext cx="0" cy="0"/>
-          <a:chOff x="0" y="0"/>
-          <a:chExt cx="0" cy="0"/>
-        </a:xfrm>
-      </p:grpSpPr>
-      <p:pic>
-        <p:nvPicPr>
-          <p:cNvPr id="4" name="Picture 10" descr="RIM_black.png"/>
-          <p:cNvPicPr>
-            <a:picLocks noChangeAspect="1"/>
-          </p:cNvPicPr>
-          <p:nvPr userDrawn="1"/>
-        </p:nvPicPr>
-        <p:blipFill>
-          <a:blip r:embed="rId2" cstate="print"/>
-          <a:srcRect/>
-          <a:stretch>
-            <a:fillRect/>
-          </a:stretch>
-        </p:blipFill>
-        <p:spPr bwMode="auto">
-          <a:xfrm>
-            <a:off x="419100" y="254000"/>
-            <a:ext cx="877888" cy="381000"/>
-          </a:xfrm>
-          <a:prstGeom prst="rect">
-            <a:avLst/>
-          </a:prstGeom>
-          <a:noFill/>
-          <a:ln w="9525">
-            <a:noFill/>
-            <a:miter lim="800000"/>
-            <a:headEnd/>
-            <a:tailEnd/>
-          </a:ln>
-        </p:spPr>
-      </p:pic>
-      <p:sp>
-        <p:nvSpPr>
-          <p:cNvPr id="2" name="Title 1"/>
-          <p:cNvSpPr>
-            <a:spLocks noGrp="1"/>
-          </p:cNvSpPr>
-          <p:nvPr>
-            <p:ph type="title"/>
-          </p:nvPr>
-        </p:nvSpPr>
-        <p:spPr bwMode="black"/>
-        <p:txBody>
-          <a:bodyPr/>
-          <a:lstStyle>
-            <a:lvl1pPr>
-              <a:defRPr>
-                <a:solidFill>
-                  <a:schemeClr val="tx1"/>
-                </a:solidFill>
-              </a:defRPr>
-            </a:lvl1pPr>
-          </a:lstStyle>
-          <a:p>
-            <a:r>
-              <a:rPr lang="en-US" smtClean="0"/>
-              <a:t>Click to edit Master title style</a:t>
-            </a:r>
-            <a:endParaRPr lang="en-US" dirty="0"/>
-          </a:p>
-        </p:txBody>
-      </p:sp>
-      <p:sp>
-        <p:nvSpPr>
-          <p:cNvPr id="7" name="Text Placeholder 6"/>
-          <p:cNvSpPr>
-            <a:spLocks noGrp="1"/>
-          </p:cNvSpPr>
-          <p:nvPr>
-            <p:ph type="body" sz="quarter" idx="13"/>
-          </p:nvPr>
-        </p:nvSpPr>
-        <p:spPr bwMode="black">
-          <a:xfrm>
-            <a:off x="457200" y="3172968"/>
-            <a:ext cx="13716000" cy="4621657"/>
-          </a:xfrm>
-        </p:spPr>
-        <p:txBody>
-          <a:bodyPr numCol="2" spcCol="301752"/>
-          <a:lstStyle>
-            <a:lvl1pPr marL="0" indent="0">
-              <a:buNone/>
-              <a:defRPr>
-                <a:solidFill>
-                  <a:schemeClr val="tx1"/>
-                </a:solidFill>
-              </a:defRPr>
-            </a:lvl1pPr>
-            <a:lvl2pPr>
-              <a:buNone/>
-              <a:defRPr/>
-            </a:lvl2pPr>
-            <a:lvl3pPr>
-              <a:buNone/>
-              <a:defRPr/>
-            </a:lvl3pPr>
-            <a:lvl4pPr>
-              <a:buNone/>
-              <a:defRPr/>
-            </a:lvl4pPr>
-            <a:lvl5pPr>
-              <a:buNone/>
-              <a:defRPr/>
-            </a:lvl5pPr>
-          </a:lstStyle>
-          <a:p>
-            <a:pPr lvl="0"/>
-            <a:r>
-              <a:rPr lang="en-US" smtClean="0"/>
-              <a:t>Click to edit Master text styles</a:t>
-            </a:r>
-          </a:p>
-        </p:txBody>
-      </p:sp>
-      <p:sp>
-        <p:nvSpPr>
-          <p:cNvPr id="5" name="Date Placeholder 2"/>
-          <p:cNvSpPr>
-            <a:spLocks noGrp="1"/>
-          </p:cNvSpPr>
-          <p:nvPr>
-            <p:ph type="dt" sz="half" idx="14"/>
-          </p:nvPr>
-        </p:nvSpPr>
-        <p:spPr/>
-        <p:txBody>
-          <a:bodyPr/>
-          <a:lstStyle>
-            <a:lvl1pPr>
-              <a:defRPr/>
-            </a:lvl1pPr>
-          </a:lstStyle>
-          <a:p>
-            <a:pPr>
-              <a:defRPr/>
-            </a:pPr>
-            <a:fld id="{43D3F0A7-0312-4CF9-AAC0-243905D935A8}" type="datetime4">
-              <a:rPr lang="en-US"/>
-              <a:pPr>
-                <a:defRPr/>
-              </a:pPr>
-              <a:t>January 24, 2013</a:t>
-            </a:fld>
-            <a:endParaRPr lang="en-US"/>
-          </a:p>
-        </p:txBody>
-      </p:sp>
-      <p:sp>
-        <p:nvSpPr>
-          <p:cNvPr id="6" name="Slide Number Placeholder 4"/>
-          <p:cNvSpPr>
-            <a:spLocks noGrp="1"/>
-          </p:cNvSpPr>
-          <p:nvPr>
-            <p:ph type="sldNum" sz="quarter" idx="15"/>
-          </p:nvPr>
-        </p:nvSpPr>
-        <p:spPr/>
-        <p:txBody>
-          <a:bodyPr/>
-          <a:lstStyle>
-            <a:lvl1pPr>
-              <a:defRPr/>
-            </a:lvl1pPr>
-          </a:lstStyle>
-          <a:p>
-            <a:pPr>
-              <a:defRPr/>
-            </a:pPr>
-            <a:fld id="{B8BE516F-0C9F-4A8E-A47D-F7D4F3B0E64C}" type="slidenum">
-              <a:rPr lang="en-US"/>
-              <a:pPr>
-                <a:defRPr/>
-              </a:pPr>
-              <a:t>‹#›</a:t>
-            </a:fld>
-            <a:endParaRPr lang="en-US"/>
-          </a:p>
-        </p:txBody>
-      </p:sp>
-    </p:spTree>
-  </p:cSld>
-  <p:clrMapOvr>
-    <a:masterClrMapping/>
-  </p:clrMapOvr>
-  <p:transition spd="slow">
-    <p:fade thruBlk="1"/>
-  </p:transition>
-  <p:hf hdr="0" ftr="0"/>
-</p:sldLayout>
-</file>
-
-<file path=ppt/slideLayouts/slideLayout12.xml><?xml version="1.0" encoding="utf-8"?>
-<p:sldLayout xmlns:a="http://schemas.openxmlformats.org/drawingml/2006/main" xmlns:r="http://schemas.openxmlformats.org/officeDocument/2006/relationships" xmlns:p="http://schemas.openxmlformats.org/presentationml/2006/main" preserve="1" userDrawn="1">
-  <p:cSld name="Device Image White">
-    <p:bg>
-      <p:bgPr>
-        <a:solidFill>
-          <a:schemeClr val="bg1"/>
-        </a:solidFill>
-        <a:effectLst/>
-      </p:bgPr>
-    </p:bg>
-    <p:spTree>
-      <p:nvGrpSpPr>
-        <p:cNvPr id="1" name=""/>
-        <p:cNvGrpSpPr/>
-        <p:nvPr/>
-      </p:nvGrpSpPr>
-      <p:grpSpPr>
-        <a:xfrm>
-          <a:off x="0" y="0"/>
-          <a:ext cx="0" cy="0"/>
-          <a:chOff x="0" y="0"/>
-          <a:chExt cx="0" cy="0"/>
-        </a:xfrm>
-      </p:grpSpPr>
-      <p:pic>
-        <p:nvPicPr>
-          <p:cNvPr id="4" name="Picture 10" descr="RIM_black.png"/>
-          <p:cNvPicPr>
-            <a:picLocks noChangeAspect="1"/>
-          </p:cNvPicPr>
-          <p:nvPr userDrawn="1"/>
-        </p:nvPicPr>
-        <p:blipFill>
-          <a:blip r:embed="rId2" cstate="print"/>
-          <a:srcRect/>
-          <a:stretch>
-            <a:fillRect/>
-          </a:stretch>
-        </p:blipFill>
-        <p:spPr bwMode="auto">
-          <a:xfrm>
-            <a:off x="419100" y="254000"/>
-            <a:ext cx="877888" cy="381000"/>
-          </a:xfrm>
-          <a:prstGeom prst="rect">
-            <a:avLst/>
-          </a:prstGeom>
-          <a:noFill/>
-          <a:ln w="9525">
-            <a:noFill/>
-            <a:miter lim="800000"/>
-            <a:headEnd/>
-            <a:tailEnd/>
-          </a:ln>
-        </p:spPr>
-      </p:pic>
-      <p:sp>
-        <p:nvSpPr>
-          <p:cNvPr id="10" name="Text Placeholder 6"/>
-          <p:cNvSpPr>
-            <a:spLocks noGrp="1"/>
-          </p:cNvSpPr>
-          <p:nvPr>
-            <p:ph type="body" sz="quarter" idx="13"/>
-          </p:nvPr>
-        </p:nvSpPr>
-        <p:spPr bwMode="black">
-          <a:xfrm>
-            <a:off x="7467600" y="3172968"/>
-            <a:ext cx="6705600" cy="4621657"/>
-          </a:xfrm>
-        </p:spPr>
-        <p:txBody>
-          <a:bodyPr anchor="b"/>
-          <a:lstStyle>
-            <a:lvl1pPr marL="0" indent="0">
-              <a:buNone/>
-              <a:defRPr>
-                <a:solidFill>
-                  <a:schemeClr val="tx1"/>
-                </a:solidFill>
-              </a:defRPr>
-            </a:lvl1pPr>
-            <a:lvl2pPr>
-              <a:buNone/>
-              <a:defRPr/>
-            </a:lvl2pPr>
-            <a:lvl3pPr>
-              <a:buNone/>
-              <a:defRPr/>
-            </a:lvl3pPr>
-            <a:lvl4pPr>
-              <a:buNone/>
-              <a:defRPr/>
-            </a:lvl4pPr>
-            <a:lvl5pPr>
-              <a:buNone/>
-              <a:defRPr/>
-            </a:lvl5pPr>
-          </a:lstStyle>
-          <a:p>
-            <a:pPr lvl="0"/>
-            <a:r>
-              <a:rPr lang="en-US" smtClean="0"/>
-              <a:t>Click to edit Master text styles</a:t>
-            </a:r>
-          </a:p>
-        </p:txBody>
-      </p:sp>
-      <p:sp>
-        <p:nvSpPr>
-          <p:cNvPr id="11" name="Picture Placeholder 7"/>
-          <p:cNvSpPr>
-            <a:spLocks noGrp="1"/>
-          </p:cNvSpPr>
-          <p:nvPr>
-            <p:ph type="pic" sz="quarter" idx="14"/>
-          </p:nvPr>
-        </p:nvSpPr>
-        <p:spPr bwMode="gray">
-          <a:xfrm>
-            <a:off x="457200" y="1078523"/>
-            <a:ext cx="6705600" cy="6716102"/>
-          </a:xfrm>
-        </p:spPr>
-        <p:txBody>
-          <a:bodyPr>
-            <a:normAutofit/>
-          </a:bodyPr>
-          <a:lstStyle>
-            <a:lvl1pPr>
-              <a:buNone/>
-              <a:defRPr sz="2000"/>
-            </a:lvl1pPr>
-          </a:lstStyle>
-          <a:p>
-            <a:pPr lvl="0"/>
-            <a:r>
-              <a:rPr lang="en-US" noProof="0" smtClean="0"/>
-              <a:t>Click icon to add picture</a:t>
-            </a:r>
-            <a:endParaRPr lang="en-US" noProof="0"/>
-          </a:p>
-        </p:txBody>
-      </p:sp>
-      <p:sp>
-        <p:nvSpPr>
-          <p:cNvPr id="5" name="Date Placeholder 2"/>
-          <p:cNvSpPr>
-            <a:spLocks noGrp="1"/>
-          </p:cNvSpPr>
-          <p:nvPr>
-            <p:ph type="dt" sz="half" idx="15"/>
-          </p:nvPr>
-        </p:nvSpPr>
-        <p:spPr/>
-        <p:txBody>
-          <a:bodyPr/>
-          <a:lstStyle>
-            <a:lvl1pPr>
-              <a:defRPr/>
-            </a:lvl1pPr>
-          </a:lstStyle>
-          <a:p>
-            <a:pPr>
-              <a:defRPr/>
-            </a:pPr>
-            <a:fld id="{F858F6DB-BCF8-4832-BFB3-DC9A14BC6FB7}" type="datetime4">
-              <a:rPr lang="en-US"/>
-              <a:pPr>
-                <a:defRPr/>
-              </a:pPr>
-              <a:t>January 24, 2013</a:t>
-            </a:fld>
-            <a:endParaRPr lang="en-US"/>
-          </a:p>
-        </p:txBody>
-      </p:sp>
-      <p:sp>
-        <p:nvSpPr>
-          <p:cNvPr id="6" name="Slide Number Placeholder 4"/>
-          <p:cNvSpPr>
-            <a:spLocks noGrp="1"/>
-          </p:cNvSpPr>
-          <p:nvPr>
-            <p:ph type="sldNum" sz="quarter" idx="16"/>
-          </p:nvPr>
-        </p:nvSpPr>
-        <p:spPr/>
-        <p:txBody>
-          <a:bodyPr/>
-          <a:lstStyle>
-            <a:lvl1pPr>
-              <a:defRPr/>
-            </a:lvl1pPr>
-          </a:lstStyle>
-          <a:p>
-            <a:pPr>
-              <a:defRPr/>
-            </a:pPr>
-            <a:fld id="{7CD45F76-EBB3-44F5-95FE-77F73820FBF9}" type="slidenum">
-              <a:rPr lang="en-US"/>
-              <a:pPr>
-                <a:defRPr/>
-              </a:pPr>
-              <a:t>‹#›</a:t>
-            </a:fld>
-            <a:endParaRPr lang="en-US"/>
-          </a:p>
-        </p:txBody>
-      </p:sp>
-    </p:spTree>
-  </p:cSld>
-  <p:clrMapOvr>
-    <a:masterClrMapping/>
-  </p:clrMapOvr>
-  <p:transition spd="slow">
-    <p:fade thruBlk="1"/>
-  </p:transition>
-  <p:hf hdr="0" ftr="0"/>
-</p:sldLayout>
-</file>
-
-<file path=ppt/slideLayouts/slideLayout13.xml><?xml version="1.0" encoding="utf-8"?>
-<p:sldLayout xmlns:a="http://schemas.openxmlformats.org/drawingml/2006/main" xmlns:r="http://schemas.openxmlformats.org/officeDocument/2006/relationships" xmlns:p="http://schemas.openxmlformats.org/presentationml/2006/main" preserve="1" userDrawn="1">
-  <p:cSld name="Table Placeholder White">
-    <p:bg>
-      <p:bgPr>
-        <a:solidFill>
-          <a:schemeClr val="bg1"/>
-        </a:solidFill>
-        <a:effectLst/>
-      </p:bgPr>
-    </p:bg>
-    <p:spTree>
-      <p:nvGrpSpPr>
-        <p:cNvPr id="1" name=""/>
-        <p:cNvGrpSpPr/>
-        <p:nvPr/>
-      </p:nvGrpSpPr>
-      <p:grpSpPr>
-        <a:xfrm>
-          <a:off x="0" y="0"/>
-          <a:ext cx="0" cy="0"/>
-          <a:chOff x="0" y="0"/>
-          <a:chExt cx="0" cy="0"/>
-        </a:xfrm>
-      </p:grpSpPr>
-      <p:pic>
-        <p:nvPicPr>
-          <p:cNvPr id="4" name="Picture 10" descr="RIM_black.png"/>
-          <p:cNvPicPr>
-            <a:picLocks noChangeAspect="1"/>
-          </p:cNvPicPr>
-          <p:nvPr userDrawn="1"/>
-        </p:nvPicPr>
-        <p:blipFill>
-          <a:blip r:embed="rId2" cstate="print"/>
-          <a:srcRect/>
-          <a:stretch>
-            <a:fillRect/>
-          </a:stretch>
-        </p:blipFill>
-        <p:spPr bwMode="auto">
-          <a:xfrm>
-            <a:off x="419100" y="254000"/>
-            <a:ext cx="877888" cy="381000"/>
-          </a:xfrm>
-          <a:prstGeom prst="rect">
-            <a:avLst/>
-          </a:prstGeom>
-          <a:noFill/>
-          <a:ln w="9525">
-            <a:noFill/>
-            <a:miter lim="800000"/>
-            <a:headEnd/>
-            <a:tailEnd/>
-          </a:ln>
-        </p:spPr>
-      </p:pic>
-      <p:sp>
-        <p:nvSpPr>
-          <p:cNvPr id="2" name="Title 1"/>
-          <p:cNvSpPr>
-            <a:spLocks noGrp="1"/>
-          </p:cNvSpPr>
-          <p:nvPr>
-            <p:ph type="title"/>
-          </p:nvPr>
-        </p:nvSpPr>
-        <p:spPr bwMode="black"/>
-        <p:txBody>
-          <a:bodyPr/>
-          <a:lstStyle>
-            <a:lvl1pPr>
-              <a:defRPr>
-                <a:solidFill>
-                  <a:schemeClr val="tx1"/>
-                </a:solidFill>
-              </a:defRPr>
-            </a:lvl1pPr>
-          </a:lstStyle>
-          <a:p>
-            <a:r>
-              <a:rPr lang="en-US" smtClean="0"/>
-              <a:t>Click to edit Master title style</a:t>
-            </a:r>
-            <a:endParaRPr lang="en-US" dirty="0"/>
-          </a:p>
-        </p:txBody>
-      </p:sp>
-      <p:sp>
-        <p:nvSpPr>
-          <p:cNvPr id="9" name="Table Placeholder 8"/>
-          <p:cNvSpPr>
-            <a:spLocks noGrp="1"/>
-          </p:cNvSpPr>
-          <p:nvPr>
-            <p:ph type="tbl" sz="quarter" idx="13"/>
-          </p:nvPr>
-        </p:nvSpPr>
-        <p:spPr bwMode="gray">
-          <a:xfrm>
-            <a:off x="457200" y="3172968"/>
-            <a:ext cx="13716000" cy="4617720"/>
-          </a:xfrm>
-        </p:spPr>
-        <p:txBody>
-          <a:bodyPr>
-            <a:normAutofit/>
-          </a:bodyPr>
-          <a:lstStyle>
-            <a:lvl1pPr>
-              <a:buNone/>
-              <a:defRPr sz="2000"/>
-            </a:lvl1pPr>
-          </a:lstStyle>
-          <a:p>
-            <a:pPr lvl="0"/>
-            <a:r>
-              <a:rPr lang="en-US" noProof="0" smtClean="0"/>
-              <a:t>Click icon to add table</a:t>
-            </a:r>
-            <a:endParaRPr lang="en-US" noProof="0"/>
-          </a:p>
-        </p:txBody>
-      </p:sp>
-      <p:sp>
-        <p:nvSpPr>
-          <p:cNvPr id="5" name="Date Placeholder 2"/>
-          <p:cNvSpPr>
-            <a:spLocks noGrp="1"/>
-          </p:cNvSpPr>
-          <p:nvPr>
-            <p:ph type="dt" sz="half" idx="14"/>
-          </p:nvPr>
-        </p:nvSpPr>
-        <p:spPr/>
-        <p:txBody>
-          <a:bodyPr/>
-          <a:lstStyle>
-            <a:lvl1pPr>
-              <a:defRPr/>
-            </a:lvl1pPr>
-          </a:lstStyle>
-          <a:p>
-            <a:pPr>
-              <a:defRPr/>
-            </a:pPr>
-            <a:fld id="{26CFA545-9B20-47AD-9106-B2E2CDD0545F}" type="datetime4">
-              <a:rPr lang="en-US"/>
-              <a:pPr>
-                <a:defRPr/>
-              </a:pPr>
-              <a:t>January 24, 2013</a:t>
-            </a:fld>
-            <a:endParaRPr lang="en-US"/>
-          </a:p>
-        </p:txBody>
-      </p:sp>
-      <p:sp>
-        <p:nvSpPr>
-          <p:cNvPr id="6" name="Slide Number Placeholder 4"/>
-          <p:cNvSpPr>
-            <a:spLocks noGrp="1"/>
-          </p:cNvSpPr>
-          <p:nvPr>
-            <p:ph type="sldNum" sz="quarter" idx="15"/>
-          </p:nvPr>
-        </p:nvSpPr>
-        <p:spPr/>
-        <p:txBody>
-          <a:bodyPr/>
-          <a:lstStyle>
-            <a:lvl1pPr>
-              <a:defRPr/>
-            </a:lvl1pPr>
-          </a:lstStyle>
-          <a:p>
-            <a:pPr>
-              <a:defRPr/>
-            </a:pPr>
-            <a:fld id="{B9BC29A1-A7FE-40E5-BB7D-CBDD21F7ECC1}" type="slidenum">
-              <a:rPr lang="en-US"/>
-              <a:pPr>
-                <a:defRPr/>
-              </a:pPr>
-              <a:t>‹#›</a:t>
-            </a:fld>
-            <a:endParaRPr lang="en-US"/>
-          </a:p>
-        </p:txBody>
-      </p:sp>
-    </p:spTree>
-  </p:cSld>
-  <p:clrMapOvr>
-    <a:masterClrMapping/>
-  </p:clrMapOvr>
-  <p:transition spd="slow">
-    <p:fade thruBlk="1"/>
-  </p:transition>
-  <p:hf hdr="0" ftr="0"/>
-</p:sldLayout>
-</file>
-
-<file path=ppt/slideLayouts/slideLayout14.xml><?xml version="1.0" encoding="utf-8"?>
-<p:sldLayout xmlns:a="http://schemas.openxmlformats.org/drawingml/2006/main" xmlns:r="http://schemas.openxmlformats.org/officeDocument/2006/relationships" xmlns:p="http://schemas.openxmlformats.org/presentationml/2006/main" preserve="1" userDrawn="1">
-  <p:cSld name="Graph Placeholder White">
-    <p:bg>
-      <p:bgPr>
-        <a:solidFill>
-          <a:schemeClr val="bg1"/>
-        </a:solidFill>
-        <a:effectLst/>
-      </p:bgPr>
-    </p:bg>
-    <p:spTree>
-      <p:nvGrpSpPr>
-        <p:cNvPr id="1" name=""/>
-        <p:cNvGrpSpPr/>
-        <p:nvPr/>
-      </p:nvGrpSpPr>
-      <p:grpSpPr>
-        <a:xfrm>
-          <a:off x="0" y="0"/>
-          <a:ext cx="0" cy="0"/>
-          <a:chOff x="0" y="0"/>
-          <a:chExt cx="0" cy="0"/>
-        </a:xfrm>
-      </p:grpSpPr>
-      <p:pic>
-        <p:nvPicPr>
-          <p:cNvPr id="4" name="Picture 10" descr="RIM_black.png"/>
-          <p:cNvPicPr>
-            <a:picLocks noChangeAspect="1"/>
-          </p:cNvPicPr>
-          <p:nvPr userDrawn="1"/>
-        </p:nvPicPr>
-        <p:blipFill>
-          <a:blip r:embed="rId2" cstate="print"/>
-          <a:srcRect/>
-          <a:stretch>
-            <a:fillRect/>
-          </a:stretch>
-        </p:blipFill>
-        <p:spPr bwMode="auto">
-          <a:xfrm>
-            <a:off x="419100" y="254000"/>
-            <a:ext cx="877888" cy="381000"/>
-          </a:xfrm>
-          <a:prstGeom prst="rect">
-            <a:avLst/>
-          </a:prstGeom>
-          <a:noFill/>
-          <a:ln w="9525">
-            <a:noFill/>
-            <a:miter lim="800000"/>
-            <a:headEnd/>
-            <a:tailEnd/>
-          </a:ln>
-        </p:spPr>
-      </p:pic>
-      <p:sp>
-        <p:nvSpPr>
-          <p:cNvPr id="2" name="Title 1"/>
-          <p:cNvSpPr>
-            <a:spLocks noGrp="1"/>
-          </p:cNvSpPr>
-          <p:nvPr>
-            <p:ph type="title"/>
-          </p:nvPr>
-        </p:nvSpPr>
-        <p:spPr bwMode="black"/>
-        <p:txBody>
-          <a:bodyPr/>
-          <a:lstStyle>
-            <a:lvl1pPr>
-              <a:defRPr>
-                <a:solidFill>
-                  <a:schemeClr val="tx1"/>
-                </a:solidFill>
-              </a:defRPr>
-            </a:lvl1pPr>
-          </a:lstStyle>
-          <a:p>
-            <a:r>
-              <a:rPr lang="en-US" smtClean="0"/>
-              <a:t>Click to edit Master title style</a:t>
-            </a:r>
-            <a:endParaRPr lang="en-US" dirty="0"/>
-          </a:p>
-        </p:txBody>
-      </p:sp>
-      <p:sp>
-        <p:nvSpPr>
-          <p:cNvPr id="8" name="Chart Placeholder 7"/>
-          <p:cNvSpPr>
-            <a:spLocks noGrp="1"/>
-          </p:cNvSpPr>
-          <p:nvPr>
-            <p:ph type="chart" sz="quarter" idx="13"/>
-          </p:nvPr>
-        </p:nvSpPr>
-        <p:spPr bwMode="gray">
-          <a:xfrm>
-            <a:off x="457200" y="3172968"/>
-            <a:ext cx="13716000" cy="4617720"/>
-          </a:xfrm>
-        </p:spPr>
-        <p:txBody>
-          <a:bodyPr>
-            <a:normAutofit/>
-          </a:bodyPr>
-          <a:lstStyle>
-            <a:lvl1pPr>
-              <a:buNone/>
-              <a:defRPr sz="2000"/>
-            </a:lvl1pPr>
-          </a:lstStyle>
-          <a:p>
-            <a:pPr lvl="0"/>
-            <a:r>
-              <a:rPr lang="en-US" noProof="0" smtClean="0"/>
-              <a:t>Click icon to add chart</a:t>
-            </a:r>
-            <a:endParaRPr lang="en-US" noProof="0"/>
-          </a:p>
-        </p:txBody>
-      </p:sp>
-      <p:sp>
-        <p:nvSpPr>
-          <p:cNvPr id="5" name="Date Placeholder 2"/>
-          <p:cNvSpPr>
-            <a:spLocks noGrp="1"/>
-          </p:cNvSpPr>
-          <p:nvPr>
-            <p:ph type="dt" sz="half" idx="14"/>
-          </p:nvPr>
-        </p:nvSpPr>
-        <p:spPr/>
-        <p:txBody>
-          <a:bodyPr/>
-          <a:lstStyle>
-            <a:lvl1pPr>
-              <a:defRPr/>
-            </a:lvl1pPr>
-          </a:lstStyle>
-          <a:p>
-            <a:pPr>
-              <a:defRPr/>
-            </a:pPr>
-            <a:fld id="{CF080B09-04EA-44FE-8384-4FBB3BB30734}" type="datetime4">
-              <a:rPr lang="en-US"/>
-              <a:pPr>
-                <a:defRPr/>
-              </a:pPr>
-              <a:t>January 24, 2013</a:t>
-            </a:fld>
-            <a:endParaRPr lang="en-US"/>
-          </a:p>
-        </p:txBody>
-      </p:sp>
-      <p:sp>
-        <p:nvSpPr>
-          <p:cNvPr id="6" name="Slide Number Placeholder 4"/>
-          <p:cNvSpPr>
-            <a:spLocks noGrp="1"/>
-          </p:cNvSpPr>
-          <p:nvPr>
-            <p:ph type="sldNum" sz="quarter" idx="15"/>
-          </p:nvPr>
-        </p:nvSpPr>
-        <p:spPr/>
-        <p:txBody>
-          <a:bodyPr/>
-          <a:lstStyle>
-            <a:lvl1pPr>
-              <a:defRPr/>
-            </a:lvl1pPr>
-          </a:lstStyle>
-          <a:p>
-            <a:pPr>
-              <a:defRPr/>
-            </a:pPr>
-            <a:fld id="{CDCB1B10-7AEE-41F4-989C-971B02A4AB59}" type="slidenum">
-              <a:rPr lang="en-US"/>
-              <a:pPr>
-                <a:defRPr/>
-              </a:pPr>
-              <a:t>‹#›</a:t>
-            </a:fld>
-            <a:endParaRPr lang="en-US"/>
-          </a:p>
-        </p:txBody>
-      </p:sp>
-    </p:spTree>
-  </p:cSld>
-  <p:clrMapOvr>
-    <a:masterClrMapping/>
-  </p:clrMapOvr>
-  <p:transition spd="slow">
-    <p:fade thruBlk="1"/>
-  </p:transition>
-  <p:hf hdr="0" ftr="0"/>
 </p:sldLayout>
 </file>
 
@@ -2174,7 +1087,7 @@
         <p:nvSpPr>
           <p:cNvPr id="3" name="Rectangle 2"/>
           <p:cNvSpPr/>
-          <p:nvPr userDrawn="1"/>
+          <p:nvPr/>
         </p:nvSpPr>
         <p:spPr bwMode="auto">
           <a:xfrm>
@@ -2185,7 +1098,7 @@
             <a:avLst/>
           </a:prstGeom>
           <a:solidFill>
-            <a:srgbClr val="8CC747"/>
+            <a:schemeClr val="accent3"/>
           </a:solidFill>
           <a:ln w="9525" cap="flat" cmpd="sng" algn="ctr">
             <a:noFill/>
@@ -2204,46 +1117,18 @@
               <a:defRPr/>
             </a:pPr>
             <a:endParaRPr lang="en-US">
-              <a:latin typeface="Arial" charset="0"/>
               <a:ea typeface="ＭＳ Ｐゴシック" pitchFamily="-16" charset="-128"/>
             </a:endParaRPr>
           </a:p>
         </p:txBody>
       </p:sp>
-      <p:cxnSp>
-        <p:nvCxnSpPr>
-          <p:cNvPr id="4" name="Straight Connector 6"/>
-          <p:cNvCxnSpPr>
-            <a:cxnSpLocks noChangeShapeType="1"/>
-          </p:cNvCxnSpPr>
-          <p:nvPr userDrawn="1"/>
-        </p:nvCxnSpPr>
-        <p:spPr bwMode="white">
-          <a:xfrm>
-            <a:off x="461963" y="762000"/>
-            <a:ext cx="13711237" cy="0"/>
-          </a:xfrm>
-          <a:prstGeom prst="line">
-            <a:avLst/>
-          </a:prstGeom>
-          <a:noFill/>
-          <a:ln w="12700">
-            <a:solidFill>
-              <a:schemeClr val="bg1"/>
-            </a:solidFill>
-            <a:round/>
-            <a:headEnd/>
-            <a:tailEnd/>
-          </a:ln>
-        </p:spPr>
-      </p:cxnSp>
       <p:pic>
         <p:nvPicPr>
-          <p:cNvPr id="5" name="Picture 13" descr="RIM_white.png"/>
+          <p:cNvPr id="5" name="Picture 16" descr="BlackBerry_Logo_Preferred_White_New"/>
           <p:cNvPicPr>
-            <a:picLocks noChangeAspect="1"/>
+            <a:picLocks noChangeAspect="1" noChangeArrowheads="1"/>
           </p:cNvPicPr>
-          <p:nvPr userDrawn="1"/>
+          <p:nvPr/>
         </p:nvPicPr>
         <p:blipFill>
           <a:blip r:embed="rId2" cstate="print"/>
@@ -2254,8 +1139,8 @@
         </p:blipFill>
         <p:spPr bwMode="auto">
           <a:xfrm>
-            <a:off x="419100" y="261938"/>
-            <a:ext cx="835025" cy="363537"/>
+            <a:off x="13230225" y="7908925"/>
+            <a:ext cx="1400175" cy="320675"/>
           </a:xfrm>
           <a:prstGeom prst="rect">
             <a:avLst/>
@@ -2281,8 +1166,8 @@
         </p:nvSpPr>
         <p:spPr>
           <a:xfrm>
-            <a:off x="457200" y="1838848"/>
-            <a:ext cx="13716000" cy="4180952"/>
+            <a:off x="457200" y="1066800"/>
+            <a:ext cx="13716000" cy="4953000"/>
           </a:xfrm>
         </p:spPr>
         <p:txBody>
@@ -2294,84 +1179,10 @@
           </a:lstStyle>
           <a:p>
             <a:r>
-              <a:rPr lang="en-US" dirty="0" smtClean="0"/>
+              <a:rPr lang="en-US" smtClean="0"/>
               <a:t>Click to edit Master title style</a:t>
             </a:r>
             <a:endParaRPr lang="en-US" dirty="0"/>
-          </a:p>
-        </p:txBody>
-      </p:sp>
-      <p:sp>
-        <p:nvSpPr>
-          <p:cNvPr id="6" name="Date Placeholder 2"/>
-          <p:cNvSpPr>
-            <a:spLocks noGrp="1"/>
-          </p:cNvSpPr>
-          <p:nvPr>
-            <p:ph type="dt" sz="half" idx="10"/>
-          </p:nvPr>
-        </p:nvSpPr>
-        <p:spPr/>
-        <p:txBody>
-          <a:bodyPr/>
-          <a:lstStyle>
-            <a:lvl1pPr>
-              <a:defRPr>
-                <a:solidFill>
-                  <a:schemeClr val="bg1"/>
-                </a:solidFill>
-              </a:defRPr>
-            </a:lvl1pPr>
-          </a:lstStyle>
-          <a:p>
-            <a:pPr>
-              <a:defRPr/>
-            </a:pPr>
-            <a:fld id="{4C89CB34-1176-4649-B56A-A7A0C46DFABF}" type="datetime4">
-              <a:rPr lang="en-US"/>
-              <a:pPr>
-                <a:defRPr/>
-              </a:pPr>
-              <a:t>January 24, 2013</a:t>
-            </a:fld>
-            <a:endParaRPr lang="en-US"/>
-          </a:p>
-        </p:txBody>
-      </p:sp>
-      <p:sp>
-        <p:nvSpPr>
-          <p:cNvPr id="7" name="Slide Number Placeholder 4"/>
-          <p:cNvSpPr>
-            <a:spLocks noGrp="1"/>
-          </p:cNvSpPr>
-          <p:nvPr>
-            <p:ph type="sldNum" sz="quarter" idx="11"/>
-          </p:nvPr>
-        </p:nvSpPr>
-        <p:spPr/>
-        <p:txBody>
-          <a:bodyPr/>
-          <a:lstStyle>
-            <a:lvl1pPr>
-              <a:defRPr>
-                <a:solidFill>
-                  <a:schemeClr val="bg1"/>
-                </a:solidFill>
-              </a:defRPr>
-            </a:lvl1pPr>
-          </a:lstStyle>
-          <a:p>
-            <a:pPr>
-              <a:defRPr/>
-            </a:pPr>
-            <a:fld id="{EE0C6729-A62D-4863-BE8D-1E8D6475805B}" type="slidenum">
-              <a:rPr lang="en-US"/>
-              <a:pPr>
-                <a:defRPr/>
-              </a:pPr>
-              <a:t>‹#›</a:t>
-            </a:fld>
-            <a:endParaRPr lang="en-US"/>
           </a:p>
         </p:txBody>
       </p:sp>
@@ -2418,7 +1229,7 @@
           <p:cNvPicPr>
             <a:picLocks noChangeAspect="1"/>
           </p:cNvPicPr>
-          <p:nvPr userDrawn="1"/>
+          <p:nvPr/>
         </p:nvPicPr>
         <p:blipFill>
           <a:blip r:embed="rId2" cstate="print"/>
@@ -2456,8 +1267,8 @@
         </p:nvSpPr>
         <p:spPr>
           <a:xfrm>
-            <a:off x="457200" y="1858944"/>
-            <a:ext cx="13716000" cy="4160855"/>
+            <a:off x="457200" y="1066800"/>
+            <a:ext cx="13716000" cy="4953000"/>
           </a:xfrm>
         </p:spPr>
         <p:txBody>
@@ -2491,6 +1302,9 @@
             <a:off x="13863638" y="1588"/>
             <a:ext cx="750887" cy="15875"/>
           </a:xfrm>
+          <a:prstGeom prst="rect">
+            <a:avLst/>
+          </a:prstGeom>
         </p:spPr>
         <p:txBody>
           <a:bodyPr>
@@ -2509,12 +1323,12 @@
             <a:pPr>
               <a:defRPr/>
             </a:pPr>
-            <a:fld id="{19EA5E6A-2DE2-4FBD-A374-2D44CE347F88}" type="datetime4">
+            <a:fld id="{BCBDDCAA-97E6-46FF-9BB4-0EA6C10E8D94}" type="datetime4">
               <a:rPr lang="en-US"/>
               <a:pPr>
                 <a:defRPr/>
               </a:pPr>
-              <a:t>January 24, 2013</a:t>
+              <a:t>April 17, 2013</a:t>
             </a:fld>
             <a:endParaRPr lang="en-US"/>
           </a:p>
@@ -2535,6 +1349,9 @@
             <a:off x="14157325" y="0"/>
             <a:ext cx="430213" cy="15875"/>
           </a:xfrm>
+          <a:prstGeom prst="rect">
+            <a:avLst/>
+          </a:prstGeom>
         </p:spPr>
         <p:txBody>
           <a:bodyPr>
@@ -2553,7 +1370,7 @@
             <a:pPr>
               <a:defRPr/>
             </a:pPr>
-            <a:fld id="{DE3605C1-2958-4CD4-B77B-FF2060BC950A}" type="slidenum">
+            <a:fld id="{E875A132-725E-4F91-A6AF-9668EA57D533}" type="slidenum">
               <a:rPr lang="en-US"/>
               <a:pPr>
                 <a:defRPr/>
@@ -2607,7 +1424,7 @@
           <p:cNvPicPr>
             <a:picLocks noChangeAspect="1"/>
           </p:cNvPicPr>
-          <p:nvPr userDrawn="1"/>
+          <p:nvPr/>
         </p:nvPicPr>
         <p:blipFill>
           <a:blip r:embed="rId2" cstate="print"/>
@@ -2637,7 +1454,7 @@
         <p:nvSpPr>
           <p:cNvPr id="4" name="Rectangle 3"/>
           <p:cNvSpPr/>
-          <p:nvPr userDrawn="1"/>
+          <p:nvPr/>
         </p:nvSpPr>
         <p:spPr bwMode="auto">
           <a:xfrm>
@@ -2670,7 +1487,6 @@
               <a:defRPr/>
             </a:pPr>
             <a:endParaRPr lang="en-US">
-              <a:latin typeface="Arial" charset="0"/>
               <a:ea typeface="ＭＳ Ｐゴシック" pitchFamily="-16" charset="-128"/>
             </a:endParaRPr>
           </a:p>
@@ -2688,20 +1504,20 @@
         </p:nvSpPr>
         <p:spPr>
           <a:xfrm>
-            <a:off x="457200" y="1858945"/>
-            <a:ext cx="13716000" cy="4160854"/>
+            <a:off x="457200" y="1066800"/>
+            <a:ext cx="13716000" cy="4953000"/>
           </a:xfrm>
         </p:spPr>
         <p:txBody>
           <a:bodyPr/>
           <a:lstStyle>
             <a:lvl1pPr>
-              <a:defRPr sz="6400" baseline="0"/>
+              <a:defRPr sz="6400"/>
             </a:lvl1pPr>
           </a:lstStyle>
           <a:p>
             <a:r>
-              <a:rPr lang="en-US" dirty="0" smtClean="0"/>
+              <a:rPr lang="en-US" smtClean="0"/>
               <a:t>Click to edit Master title style</a:t>
             </a:r>
             <a:endParaRPr lang="en-US" dirty="0"/>
@@ -2723,6 +1539,9 @@
             <a:off x="13863638" y="1588"/>
             <a:ext cx="750887" cy="15875"/>
           </a:xfrm>
+          <a:prstGeom prst="rect">
+            <a:avLst/>
+          </a:prstGeom>
         </p:spPr>
         <p:txBody>
           <a:bodyPr>
@@ -2741,12 +1560,12 @@
             <a:pPr>
               <a:defRPr/>
             </a:pPr>
-            <a:fld id="{07EE420B-09CC-4AE7-8012-FE5CBCCFB033}" type="datetime4">
+            <a:fld id="{84E8BB03-D258-41EB-A356-DC8C3F7AC0C9}" type="datetime4">
               <a:rPr lang="en-US"/>
               <a:pPr>
                 <a:defRPr/>
               </a:pPr>
-              <a:t>January 24, 2013</a:t>
+              <a:t>April 17, 2013</a:t>
             </a:fld>
             <a:endParaRPr lang="en-US"/>
           </a:p>
@@ -2767,6 +1586,9 @@
             <a:off x="14157325" y="0"/>
             <a:ext cx="430213" cy="15875"/>
           </a:xfrm>
+          <a:prstGeom prst="rect">
+            <a:avLst/>
+          </a:prstGeom>
         </p:spPr>
         <p:txBody>
           <a:bodyPr>
@@ -2785,7 +1607,7 @@
             <a:pPr>
               <a:defRPr/>
             </a:pPr>
-            <a:fld id="{ABE9B61B-3FD3-4D49-A0C3-76B39711135F}" type="slidenum">
+            <a:fld id="{8298C2F6-9904-4D58-914D-E06E6069D309}" type="slidenum">
               <a:rPr lang="en-US"/>
               <a:pPr>
                 <a:defRPr/>
@@ -2829,7 +1651,7 @@
         <p:nvSpPr>
           <p:cNvPr id="4" name="Rectangle 3"/>
           <p:cNvSpPr/>
-          <p:nvPr userDrawn="1"/>
+          <p:nvPr/>
         </p:nvSpPr>
         <p:spPr bwMode="auto">
           <a:xfrm>
@@ -2862,7 +1684,6 @@
               <a:defRPr/>
             </a:pPr>
             <a:endParaRPr lang="en-US">
-              <a:latin typeface="Arial" charset="0"/>
               <a:ea typeface="ＭＳ Ｐゴシック" pitchFamily="-16" charset="-128"/>
             </a:endParaRPr>
           </a:p>
@@ -2903,8 +1724,8 @@
         </p:nvSpPr>
         <p:spPr>
           <a:xfrm>
-            <a:off x="457200" y="3172968"/>
-            <a:ext cx="13716000" cy="4621657"/>
+            <a:off x="457200" y="2222500"/>
+            <a:ext cx="13716000" cy="5572125"/>
           </a:xfrm>
         </p:spPr>
         <p:txBody>
@@ -2920,65 +1741,6 @@
               <a:rPr lang="en-US" smtClean="0"/>
               <a:t>Click to edit Master text styles</a:t>
             </a:r>
-          </a:p>
-        </p:txBody>
-      </p:sp>
-      <p:sp>
-        <p:nvSpPr>
-          <p:cNvPr id="5" name="Date Placeholder 2"/>
-          <p:cNvSpPr>
-            <a:spLocks noGrp="1"/>
-          </p:cNvSpPr>
-          <p:nvPr>
-            <p:ph type="dt" sz="half" idx="14"/>
-          </p:nvPr>
-        </p:nvSpPr>
-        <p:spPr/>
-        <p:txBody>
-          <a:bodyPr/>
-          <a:lstStyle>
-            <a:lvl1pPr>
-              <a:defRPr/>
-            </a:lvl1pPr>
-          </a:lstStyle>
-          <a:p>
-            <a:pPr>
-              <a:defRPr/>
-            </a:pPr>
-            <a:endParaRPr lang="en-US"/>
-          </a:p>
-        </p:txBody>
-      </p:sp>
-      <p:sp>
-        <p:nvSpPr>
-          <p:cNvPr id="6" name="Slide Number Placeholder 4"/>
-          <p:cNvSpPr>
-            <a:spLocks noGrp="1"/>
-          </p:cNvSpPr>
-          <p:nvPr>
-            <p:ph type="sldNum" sz="quarter" idx="15"/>
-          </p:nvPr>
-        </p:nvSpPr>
-        <p:spPr/>
-        <p:txBody>
-          <a:bodyPr/>
-          <a:lstStyle>
-            <a:lvl1pPr>
-              <a:defRPr/>
-            </a:lvl1pPr>
-          </a:lstStyle>
-          <a:p>
-            <a:pPr>
-              <a:defRPr/>
-            </a:pPr>
-            <a:fld id="{7F51AB47-A530-45F3-A4B6-BC79FE73C39E}" type="slidenum">
-              <a:rPr lang="en-US"/>
-              <a:pPr>
-                <a:defRPr/>
-              </a:pPr>
-              <a:t>‹#›</a:t>
-            </a:fld>
-            <a:endParaRPr lang="en-US"/>
           </a:p>
         </p:txBody>
       </p:sp>
@@ -3015,7 +1777,7 @@
         <p:nvSpPr>
           <p:cNvPr id="4" name="Rectangle 3"/>
           <p:cNvSpPr/>
-          <p:nvPr userDrawn="1"/>
+          <p:nvPr/>
         </p:nvSpPr>
         <p:spPr bwMode="auto">
           <a:xfrm>
@@ -3048,7 +1810,6 @@
               <a:defRPr/>
             </a:pPr>
             <a:endParaRPr lang="en-US">
-              <a:latin typeface="Arial" charset="0"/>
               <a:ea typeface="ＭＳ Ｐゴシック" pitchFamily="-16" charset="-128"/>
             </a:endParaRPr>
           </a:p>
@@ -3070,10 +1831,10 @@
           <a:lstStyle/>
           <a:p>
             <a:r>
-              <a:rPr lang="en-US" smtClean="0"/>
+              <a:rPr lang="en-US" dirty="0" smtClean="0"/>
               <a:t>Click to edit Master title style</a:t>
             </a:r>
-            <a:endParaRPr lang="en-US"/>
+            <a:endParaRPr lang="en-US" dirty="0"/>
           </a:p>
         </p:txBody>
       </p:sp>
@@ -3089,8 +1850,8 @@
         </p:nvSpPr>
         <p:spPr>
           <a:xfrm>
-            <a:off x="457200" y="3172968"/>
-            <a:ext cx="13716000" cy="4621657"/>
+            <a:off x="457200" y="2197100"/>
+            <a:ext cx="10287000" cy="5597525"/>
           </a:xfrm>
         </p:spPr>
         <p:txBody>
@@ -3120,75 +1881,9 @@
           <a:p>
             <a:pPr lvl="0"/>
             <a:r>
-              <a:rPr lang="en-US" smtClean="0"/>
+              <a:rPr lang="en-US" dirty="0" smtClean="0"/>
               <a:t>Click to edit Master text styles</a:t>
             </a:r>
-          </a:p>
-        </p:txBody>
-      </p:sp>
-      <p:sp>
-        <p:nvSpPr>
-          <p:cNvPr id="5" name="Date Placeholder 2"/>
-          <p:cNvSpPr>
-            <a:spLocks noGrp="1"/>
-          </p:cNvSpPr>
-          <p:nvPr>
-            <p:ph type="dt" sz="half" idx="14"/>
-          </p:nvPr>
-        </p:nvSpPr>
-        <p:spPr/>
-        <p:txBody>
-          <a:bodyPr/>
-          <a:lstStyle>
-            <a:lvl1pPr>
-              <a:defRPr/>
-            </a:lvl1pPr>
-          </a:lstStyle>
-          <a:p>
-            <a:pPr>
-              <a:defRPr/>
-            </a:pPr>
-            <a:fld id="{3D1F8E75-9BF6-4FE8-B555-45B44933CBEA}" type="datetime4">
-              <a:rPr lang="en-US"/>
-              <a:pPr>
-                <a:defRPr/>
-              </a:pPr>
-              <a:t>January 24, 2013</a:t>
-            </a:fld>
-            <a:endParaRPr lang="en-US"/>
-          </a:p>
-        </p:txBody>
-      </p:sp>
-      <p:sp>
-        <p:nvSpPr>
-          <p:cNvPr id="6" name="Slide Number Placeholder 4"/>
-          <p:cNvSpPr>
-            <a:spLocks noGrp="1"/>
-          </p:cNvSpPr>
-          <p:nvPr>
-            <p:ph type="sldNum" sz="quarter" idx="15"/>
-          </p:nvPr>
-        </p:nvSpPr>
-        <p:spPr/>
-        <p:txBody>
-          <a:bodyPr/>
-          <a:lstStyle>
-            <a:lvl1pPr>
-              <a:defRPr/>
-            </a:lvl1pPr>
-          </a:lstStyle>
-          <a:p>
-            <a:pPr>
-              <a:defRPr/>
-            </a:pPr>
-            <a:fld id="{2E9A61A8-BC3B-4599-B562-8E45CEDD557B}" type="slidenum">
-              <a:rPr lang="en-US"/>
-              <a:pPr>
-                <a:defRPr/>
-              </a:pPr>
-              <a:t>‹#›</a:t>
-            </a:fld>
-            <a:endParaRPr lang="en-US"/>
           </a:p>
         </p:txBody>
       </p:sp>
@@ -3225,7 +1920,7 @@
         <p:nvSpPr>
           <p:cNvPr id="4" name="Rectangle 3"/>
           <p:cNvSpPr/>
-          <p:nvPr userDrawn="1"/>
+          <p:nvPr/>
         </p:nvSpPr>
         <p:spPr bwMode="auto">
           <a:xfrm>
@@ -3258,7 +1953,6 @@
               <a:defRPr/>
             </a:pPr>
             <a:endParaRPr lang="en-US">
-              <a:latin typeface="Arial" charset="0"/>
               <a:ea typeface="ＭＳ Ｐゴシック" pitchFamily="-16" charset="-128"/>
             </a:endParaRPr>
           </a:p>
@@ -3346,72 +2040,6 @@
               <a:t>Click icon to add picture</a:t>
             </a:r>
             <a:endParaRPr lang="en-US" noProof="0"/>
-          </a:p>
-        </p:txBody>
-      </p:sp>
-      <p:sp>
-        <p:nvSpPr>
-          <p:cNvPr id="5" name="Date Placeholder 2"/>
-          <p:cNvSpPr>
-            <a:spLocks noGrp="1"/>
-          </p:cNvSpPr>
-          <p:nvPr>
-            <p:ph type="dt" sz="half" idx="15"/>
-          </p:nvPr>
-        </p:nvSpPr>
-        <p:spPr/>
-        <p:txBody>
-          <a:bodyPr/>
-          <a:lstStyle>
-            <a:lvl1pPr>
-              <a:defRPr/>
-            </a:lvl1pPr>
-          </a:lstStyle>
-          <a:p>
-            <a:pPr>
-              <a:defRPr/>
-            </a:pPr>
-            <a:fld id="{255AFF4E-B70F-4088-9FC5-3AF55648EBA5}" type="datetime4">
-              <a:rPr lang="en-US"/>
-              <a:pPr>
-                <a:defRPr/>
-              </a:pPr>
-              <a:t>January 24, 2013</a:t>
-            </a:fld>
-            <a:endParaRPr lang="en-US" dirty="0"/>
-          </a:p>
-        </p:txBody>
-      </p:sp>
-      <p:sp>
-        <p:nvSpPr>
-          <p:cNvPr id="7" name="Slide Number Placeholder 4"/>
-          <p:cNvSpPr>
-            <a:spLocks noGrp="1"/>
-          </p:cNvSpPr>
-          <p:nvPr>
-            <p:ph type="sldNum" sz="quarter" idx="16"/>
-          </p:nvPr>
-        </p:nvSpPr>
-        <p:spPr/>
-        <p:txBody>
-          <a:bodyPr/>
-          <a:lstStyle>
-            <a:lvl1pPr>
-              <a:defRPr/>
-            </a:lvl1pPr>
-          </a:lstStyle>
-          <a:p>
-            <a:pPr>
-              <a:defRPr/>
-            </a:pPr>
-            <a:fld id="{2C15823E-DD0B-42D7-A00B-F009F5A96E5D}" type="slidenum">
-              <a:rPr lang="en-US"/>
-              <a:pPr>
-                <a:defRPr/>
-              </a:pPr>
-              <a:t>‹#›</a:t>
-            </a:fld>
-            <a:endParaRPr lang="en-US" dirty="0"/>
           </a:p>
         </p:txBody>
       </p:sp>
@@ -3448,7 +2076,7 @@
         <p:nvSpPr>
           <p:cNvPr id="4" name="Rectangle 3"/>
           <p:cNvSpPr/>
-          <p:nvPr userDrawn="1"/>
+          <p:nvPr/>
         </p:nvSpPr>
         <p:spPr bwMode="auto">
           <a:xfrm>
@@ -3481,7 +2109,6 @@
               <a:defRPr/>
             </a:pPr>
             <a:endParaRPr lang="en-US">
-              <a:latin typeface="Arial" charset="0"/>
               <a:ea typeface="ＭＳ Ｐゴシック" pitchFamily="-16" charset="-128"/>
             </a:endParaRPr>
           </a:p>
@@ -3543,72 +2170,6 @@
               <a:t>Click icon to add table</a:t>
             </a:r>
             <a:endParaRPr lang="en-US" noProof="0"/>
-          </a:p>
-        </p:txBody>
-      </p:sp>
-      <p:sp>
-        <p:nvSpPr>
-          <p:cNvPr id="5" name="Date Placeholder 2"/>
-          <p:cNvSpPr>
-            <a:spLocks noGrp="1"/>
-          </p:cNvSpPr>
-          <p:nvPr>
-            <p:ph type="dt" sz="half" idx="14"/>
-          </p:nvPr>
-        </p:nvSpPr>
-        <p:spPr/>
-        <p:txBody>
-          <a:bodyPr/>
-          <a:lstStyle>
-            <a:lvl1pPr>
-              <a:defRPr/>
-            </a:lvl1pPr>
-          </a:lstStyle>
-          <a:p>
-            <a:pPr>
-              <a:defRPr/>
-            </a:pPr>
-            <a:fld id="{4DE83712-9EE3-4DEB-9CD0-F7EFD195CCE8}" type="datetime4">
-              <a:rPr lang="en-US"/>
-              <a:pPr>
-                <a:defRPr/>
-              </a:pPr>
-              <a:t>January 24, 2013</a:t>
-            </a:fld>
-            <a:endParaRPr lang="en-US"/>
-          </a:p>
-        </p:txBody>
-      </p:sp>
-      <p:sp>
-        <p:nvSpPr>
-          <p:cNvPr id="6" name="Slide Number Placeholder 4"/>
-          <p:cNvSpPr>
-            <a:spLocks noGrp="1"/>
-          </p:cNvSpPr>
-          <p:nvPr>
-            <p:ph type="sldNum" sz="quarter" idx="15"/>
-          </p:nvPr>
-        </p:nvSpPr>
-        <p:spPr/>
-        <p:txBody>
-          <a:bodyPr/>
-          <a:lstStyle>
-            <a:lvl1pPr>
-              <a:defRPr/>
-            </a:lvl1pPr>
-          </a:lstStyle>
-          <a:p>
-            <a:pPr>
-              <a:defRPr/>
-            </a:pPr>
-            <a:fld id="{E6BC1A0E-1DBF-46E2-8D7B-53EDCC4556CE}" type="slidenum">
-              <a:rPr lang="en-US"/>
-              <a:pPr>
-                <a:defRPr/>
-              </a:pPr>
-              <a:t>‹#›</a:t>
-            </a:fld>
-            <a:endParaRPr lang="en-US"/>
           </a:p>
         </p:txBody>
       </p:sp>
@@ -3645,7 +2206,7 @@
         <p:nvSpPr>
           <p:cNvPr id="4" name="Rectangle 3"/>
           <p:cNvSpPr/>
-          <p:nvPr userDrawn="1"/>
+          <p:nvPr/>
         </p:nvSpPr>
         <p:spPr bwMode="auto">
           <a:xfrm>
@@ -3678,7 +2239,6 @@
               <a:defRPr/>
             </a:pPr>
             <a:endParaRPr lang="en-US">
-              <a:latin typeface="Arial" charset="0"/>
               <a:ea typeface="ＭＳ Ｐゴシック" pitchFamily="-16" charset="-128"/>
             </a:endParaRPr>
           </a:p>
@@ -3740,72 +2300,6 @@
               <a:t>Click icon to add chart</a:t>
             </a:r>
             <a:endParaRPr lang="en-US" noProof="0"/>
-          </a:p>
-        </p:txBody>
-      </p:sp>
-      <p:sp>
-        <p:nvSpPr>
-          <p:cNvPr id="5" name="Date Placeholder 2"/>
-          <p:cNvSpPr>
-            <a:spLocks noGrp="1"/>
-          </p:cNvSpPr>
-          <p:nvPr>
-            <p:ph type="dt" sz="half" idx="14"/>
-          </p:nvPr>
-        </p:nvSpPr>
-        <p:spPr/>
-        <p:txBody>
-          <a:bodyPr/>
-          <a:lstStyle>
-            <a:lvl1pPr>
-              <a:defRPr/>
-            </a:lvl1pPr>
-          </a:lstStyle>
-          <a:p>
-            <a:pPr>
-              <a:defRPr/>
-            </a:pPr>
-            <a:fld id="{04ED44B4-9F03-48B4-B6CC-A1C4BEA9BED3}" type="datetime4">
-              <a:rPr lang="en-US"/>
-              <a:pPr>
-                <a:defRPr/>
-              </a:pPr>
-              <a:t>January 24, 2013</a:t>
-            </a:fld>
-            <a:endParaRPr lang="en-US"/>
-          </a:p>
-        </p:txBody>
-      </p:sp>
-      <p:sp>
-        <p:nvSpPr>
-          <p:cNvPr id="6" name="Slide Number Placeholder 4"/>
-          <p:cNvSpPr>
-            <a:spLocks noGrp="1"/>
-          </p:cNvSpPr>
-          <p:nvPr>
-            <p:ph type="sldNum" sz="quarter" idx="15"/>
-          </p:nvPr>
-        </p:nvSpPr>
-        <p:spPr/>
-        <p:txBody>
-          <a:bodyPr/>
-          <a:lstStyle>
-            <a:lvl1pPr>
-              <a:defRPr/>
-            </a:lvl1pPr>
-          </a:lstStyle>
-          <a:p>
-            <a:pPr>
-              <a:defRPr/>
-            </a:pPr>
-            <a:fld id="{A4ABB6C2-7D6A-4843-8FCB-0C38A17FAAFF}" type="slidenum">
-              <a:rPr lang="en-US"/>
-              <a:pPr>
-                <a:defRPr/>
-              </a:pPr>
-              <a:t>‹#›</a:t>
-            </a:fld>
-            <a:endParaRPr lang="en-US"/>
           </a:p>
         </p:txBody>
       </p:sp>
@@ -3848,7 +2342,7 @@
       </p:grpSpPr>
       <p:sp>
         <p:nvSpPr>
-          <p:cNvPr id="4098" name="Rectangle 2"/>
+          <p:cNvPr id="1026" name="Rectangle 2"/>
           <p:cNvSpPr>
             <a:spLocks noGrp="1" noChangeArrowheads="1"/>
           </p:cNvSpPr>
@@ -3858,8 +2352,50 @@
         </p:nvSpPr>
         <p:spPr bwMode="white">
           <a:xfrm>
-            <a:off x="457200" y="1066800"/>
-            <a:ext cx="10510838" cy="1573213"/>
+            <a:off x="215900" y="203200"/>
+            <a:ext cx="10510838" cy="1752600"/>
+          </a:xfrm>
+          <a:prstGeom prst="rect">
+            <a:avLst/>
+          </a:prstGeom>
+          <a:noFill/>
+          <a:ln w="9525">
+            <a:noFill/>
+            <a:miter lim="800000"/>
+            <a:headEnd/>
+            <a:tailEnd/>
+          </a:ln>
+        </p:spPr>
+        <p:txBody>
+          <a:bodyPr vert="horz" wrap="square" lIns="0" tIns="0" rIns="0" bIns="0" numCol="1" anchor="b" anchorCtr="0" compatLnSpc="1">
+            <a:prstTxWarp prst="textNoShape">
+              <a:avLst/>
+            </a:prstTxWarp>
+          </a:bodyPr>
+          <a:lstStyle/>
+          <a:p>
+            <a:pPr lvl="0"/>
+            <a:r>
+              <a:rPr lang="en-US" smtClean="0"/>
+              <a:t>Click to edit Master title style</a:t>
+            </a:r>
+          </a:p>
+        </p:txBody>
+      </p:sp>
+      <p:sp>
+        <p:nvSpPr>
+          <p:cNvPr id="1027" name="Rectangle 3"/>
+          <p:cNvSpPr>
+            <a:spLocks noGrp="1" noChangeArrowheads="1"/>
+          </p:cNvSpPr>
+          <p:nvPr>
+            <p:ph type="body" idx="1"/>
+          </p:nvPr>
+        </p:nvSpPr>
+        <p:spPr bwMode="white">
+          <a:xfrm>
+            <a:off x="457200" y="2222500"/>
+            <a:ext cx="13716000" cy="5572125"/>
           </a:xfrm>
           <a:prstGeom prst="rect">
             <a:avLst/>
@@ -3882,223 +2418,36 @@
           <a:p>
             <a:pPr lvl="0"/>
             <a:r>
-              <a:rPr lang="en-US" smtClean="0"/>
-              <a:t>Click to edit Master title style</a:t>
+              <a:rPr lang="en-US" dirty="0" smtClean="0"/>
+              <a:t>Click to edit Master text styles</a:t>
+            </a:r>
+          </a:p>
+          <a:p>
+            <a:pPr lvl="1"/>
+            <a:r>
+              <a:rPr lang="en-US" dirty="0" smtClean="0"/>
+              <a:t>Second level</a:t>
+            </a:r>
+          </a:p>
+          <a:p>
+            <a:pPr lvl="2"/>
+            <a:r>
+              <a:rPr lang="en-US" dirty="0" smtClean="0"/>
+              <a:t>Third level</a:t>
             </a:r>
           </a:p>
         </p:txBody>
       </p:sp>
-      <p:sp>
-        <p:nvSpPr>
-          <p:cNvPr id="4099" name="Rectangle 3"/>
-          <p:cNvSpPr>
-            <a:spLocks noGrp="1" noChangeArrowheads="1"/>
-          </p:cNvSpPr>
-          <p:nvPr>
-            <p:ph type="body" idx="1"/>
-          </p:nvPr>
-        </p:nvSpPr>
-        <p:spPr bwMode="white">
-          <a:xfrm>
-            <a:off x="457200" y="3175000"/>
-            <a:ext cx="13716000" cy="4619625"/>
-          </a:xfrm>
-          <a:prstGeom prst="rect">
-            <a:avLst/>
-          </a:prstGeom>
-          <a:noFill/>
-          <a:ln w="9525">
-            <a:noFill/>
-            <a:miter lim="800000"/>
-            <a:headEnd/>
-            <a:tailEnd/>
-          </a:ln>
-        </p:spPr>
-        <p:txBody>
-          <a:bodyPr vert="horz" wrap="square" lIns="0" tIns="0" rIns="0" bIns="0" numCol="1" anchor="t" anchorCtr="0" compatLnSpc="1">
-            <a:prstTxWarp prst="textNoShape">
-              <a:avLst/>
-            </a:prstTxWarp>
-          </a:bodyPr>
-          <a:lstStyle/>
-          <a:p>
-            <a:pPr lvl="0"/>
-            <a:r>
-              <a:rPr lang="en-US" smtClean="0"/>
-              <a:t>Click to edit Master text styles</a:t>
-            </a:r>
-          </a:p>
-          <a:p>
-            <a:pPr lvl="1"/>
-            <a:r>
-              <a:rPr lang="en-US" smtClean="0"/>
-              <a:t>Second level</a:t>
-            </a:r>
-          </a:p>
-          <a:p>
-            <a:pPr lvl="2"/>
-            <a:r>
-              <a:rPr lang="en-US" smtClean="0"/>
-              <a:t>Third level</a:t>
-            </a:r>
-          </a:p>
-        </p:txBody>
-      </p:sp>
-      <p:sp>
-        <p:nvSpPr>
-          <p:cNvPr id="1028" name="Rectangle 4"/>
-          <p:cNvSpPr>
-            <a:spLocks noGrp="1" noChangeArrowheads="1"/>
-          </p:cNvSpPr>
-          <p:nvPr>
-            <p:ph type="dt" sz="half" idx="2"/>
-          </p:nvPr>
-        </p:nvSpPr>
-        <p:spPr bwMode="gray">
-          <a:xfrm>
-            <a:off x="10972800" y="371475"/>
-            <a:ext cx="2743200" cy="228600"/>
-          </a:xfrm>
-          <a:prstGeom prst="rect">
-            <a:avLst/>
-          </a:prstGeom>
-          <a:noFill/>
-          <a:ln w="9525">
-            <a:noFill/>
-            <a:miter lim="800000"/>
-            <a:headEnd/>
-            <a:tailEnd/>
-          </a:ln>
-        </p:spPr>
-        <p:txBody>
-          <a:bodyPr vert="horz" wrap="square" lIns="0" tIns="0" rIns="0" bIns="0" numCol="1" anchor="b" anchorCtr="0" compatLnSpc="1">
-            <a:prstTxWarp prst="textNoShape">
-              <a:avLst/>
-            </a:prstTxWarp>
-          </a:bodyPr>
-          <a:lstStyle>
-            <a:lvl1pPr eaLnBrk="0" hangingPunct="0">
-              <a:defRPr sz="1400">
-                <a:solidFill>
-                  <a:srgbClr val="989A9B"/>
-                </a:solidFill>
-                <a:latin typeface="Trade Gothic Next LT Pro Lt" pitchFamily="-16" charset="0"/>
-                <a:ea typeface="ＭＳ Ｐゴシック" pitchFamily="-16" charset="-128"/>
-                <a:cs typeface="+mn-cs"/>
-              </a:defRPr>
-            </a:lvl1pPr>
-          </a:lstStyle>
-          <a:p>
-            <a:pPr>
-              <a:defRPr/>
-            </a:pPr>
-            <a:fld id="{7349EE47-919F-4006-9EDF-4E22C7528C72}" type="datetime4">
-              <a:rPr lang="en-US"/>
-              <a:pPr>
-                <a:defRPr/>
-              </a:pPr>
-              <a:t>January 24, 2013</a:t>
-            </a:fld>
-            <a:endParaRPr lang="en-US" dirty="0"/>
-          </a:p>
-        </p:txBody>
-      </p:sp>
-      <p:sp>
-        <p:nvSpPr>
-          <p:cNvPr id="1030" name="Rectangle 6"/>
-          <p:cNvSpPr>
-            <a:spLocks noGrp="1" noChangeAspect="1" noChangeArrowheads="1"/>
-          </p:cNvSpPr>
-          <p:nvPr>
-            <p:ph type="sldNum" sz="quarter" idx="4"/>
-          </p:nvPr>
-        </p:nvSpPr>
-        <p:spPr bwMode="gray">
-          <a:xfrm>
-            <a:off x="13716000" y="369888"/>
-            <a:ext cx="430213" cy="228600"/>
-          </a:xfrm>
-          <a:prstGeom prst="rect">
-            <a:avLst/>
-          </a:prstGeom>
-          <a:noFill/>
-          <a:ln w="9525">
-            <a:noFill/>
-            <a:miter lim="800000"/>
-            <a:headEnd/>
-            <a:tailEnd/>
-          </a:ln>
-        </p:spPr>
-        <p:txBody>
-          <a:bodyPr vert="horz" wrap="square" lIns="0" tIns="0" rIns="0" bIns="0" numCol="1" anchor="b" anchorCtr="0" compatLnSpc="1">
-            <a:prstTxWarp prst="textNoShape">
-              <a:avLst/>
-            </a:prstTxWarp>
-          </a:bodyPr>
-          <a:lstStyle>
-            <a:lvl1pPr algn="r" eaLnBrk="0" hangingPunct="0">
-              <a:defRPr sz="1400">
-                <a:solidFill>
-                  <a:schemeClr val="bg2"/>
-                </a:solidFill>
-                <a:latin typeface="Trade Gothic Next LT Pro Lt" pitchFamily="-16" charset="0"/>
-                <a:ea typeface="ＭＳ Ｐゴシック" pitchFamily="-16" charset="-128"/>
-                <a:cs typeface="+mn-cs"/>
-              </a:defRPr>
-            </a:lvl1pPr>
-          </a:lstStyle>
-          <a:p>
-            <a:pPr>
-              <a:defRPr/>
-            </a:pPr>
-            <a:fld id="{0674D5CD-BE8A-4B0E-A535-8930D4FC1D43}" type="slidenum">
-              <a:rPr lang="en-US"/>
-              <a:pPr>
-                <a:defRPr/>
-              </a:pPr>
-              <a:t>‹#›</a:t>
-            </a:fld>
-            <a:endParaRPr lang="en-US" dirty="0"/>
-          </a:p>
-        </p:txBody>
-      </p:sp>
-      <p:cxnSp>
-        <p:nvCxnSpPr>
-          <p:cNvPr id="4102" name="Straight Connector 6"/>
-          <p:cNvCxnSpPr>
-            <a:cxnSpLocks noChangeShapeType="1"/>
-          </p:cNvCxnSpPr>
-          <p:nvPr/>
-        </p:nvCxnSpPr>
-        <p:spPr bwMode="gray">
-          <a:xfrm>
-            <a:off x="461963" y="762000"/>
-            <a:ext cx="13711237" cy="0"/>
-          </a:xfrm>
-          <a:prstGeom prst="line">
-            <a:avLst/>
-          </a:prstGeom>
-          <a:noFill/>
-          <a:ln w="12700">
-            <a:solidFill>
-              <a:srgbClr val="989A9B"/>
-            </a:solidFill>
-            <a:round/>
-            <a:headEnd/>
-            <a:tailEnd/>
-          </a:ln>
-        </p:spPr>
-      </p:cxnSp>
       <p:pic>
         <p:nvPicPr>
-          <p:cNvPr id="4103" name="Picture 9" descr="RIM_white.png"/>
+          <p:cNvPr id="1031" name="Picture 16" descr="BlackBerry_Logo_Preferred_White_New"/>
           <p:cNvPicPr>
-            <a:picLocks noChangeAspect="1"/>
+            <a:picLocks noChangeAspect="1" noChangeArrowheads="1"/>
           </p:cNvPicPr>
-          <p:nvPr userDrawn="1"/>
+          <p:nvPr/>
         </p:nvPicPr>
         <p:blipFill>
-          <a:blip r:embed="rId16" cstate="print"/>
+          <a:blip r:embed="rId11" cstate="print"/>
           <a:srcRect/>
           <a:stretch>
             <a:fillRect/>
@@ -4106,8 +2455,8 @@
         </p:blipFill>
         <p:spPr bwMode="auto">
           <a:xfrm>
-            <a:off x="419100" y="261938"/>
-            <a:ext cx="835025" cy="363537"/>
+            <a:off x="13231813" y="7908925"/>
+            <a:ext cx="1398587" cy="320675"/>
           </a:xfrm>
           <a:prstGeom prst="rect">
             <a:avLst/>
@@ -4125,20 +2474,15 @@
   </p:cSld>
   <p:clrMap bg1="lt1" tx1="dk1" bg2="lt2" tx2="dk2" accent1="accent1" accent2="accent2" accent3="accent3" accent4="accent4" accent5="accent5" accent6="accent6" hlink="hlink" folHlink="folHlink"/>
   <p:sldLayoutIdLst>
-    <p:sldLayoutId id="2147483803" r:id="rId1"/>
-    <p:sldLayoutId id="2147483804" r:id="rId2"/>
-    <p:sldLayoutId id="2147483805" r:id="rId3"/>
-    <p:sldLayoutId id="2147483806" r:id="rId4"/>
-    <p:sldLayoutId id="2147483807" r:id="rId5"/>
-    <p:sldLayoutId id="2147483808" r:id="rId6"/>
-    <p:sldLayoutId id="2147483809" r:id="rId7"/>
-    <p:sldLayoutId id="2147483810" r:id="rId8"/>
-    <p:sldLayoutId id="2147483811" r:id="rId9"/>
-    <p:sldLayoutId id="2147483812" r:id="rId10"/>
-    <p:sldLayoutId id="2147483813" r:id="rId11"/>
-    <p:sldLayoutId id="2147483814" r:id="rId12"/>
-    <p:sldLayoutId id="2147483815" r:id="rId13"/>
-    <p:sldLayoutId id="2147483816" r:id="rId14"/>
+    <p:sldLayoutId id="2147483827" r:id="rId1"/>
+    <p:sldLayoutId id="2147483828" r:id="rId2"/>
+    <p:sldLayoutId id="2147483829" r:id="rId3"/>
+    <p:sldLayoutId id="2147483830" r:id="rId4"/>
+    <p:sldLayoutId id="2147483831" r:id="rId5"/>
+    <p:sldLayoutId id="2147483832" r:id="rId6"/>
+    <p:sldLayoutId id="2147483833" r:id="rId7"/>
+    <p:sldLayoutId id="2147483834" r:id="rId8"/>
+    <p:sldLayoutId id="2147483835" r:id="rId9"/>
   </p:sldLayoutIdLst>
   <p:transition spd="slow">
     <p:fade thruBlk="1"/>
@@ -4649,7 +2993,7 @@
                 <a:ea typeface="ＭＳ Ｐゴシック" pitchFamily="34" charset="-128"/>
               </a:rPr>
               <a:pPr/>
-              <a:t>January 24, 2013</a:t>
+              <a:t>April 17, 2013</a:t>
             </a:fld>
             <a:endParaRPr lang="en-US" dirty="0" smtClean="0">
               <a:solidFill>
@@ -4676,6 +3020,9 @@
             <a:off x="14200188" y="369888"/>
             <a:ext cx="430212" cy="228600"/>
           </a:xfrm>
+          <a:prstGeom prst="rect">
+            <a:avLst/>
+          </a:prstGeom>
         </p:spPr>
         <p:txBody>
           <a:bodyPr/>
@@ -4764,10 +3111,17 @@
             <a:spLocks noGrp="1"/>
           </p:cNvSpPr>
           <p:nvPr>
-            <p:ph type="dt" sz="quarter" idx="14"/>
+            <p:ph type="dt" sz="quarter" idx="4294967295"/>
           </p:nvPr>
         </p:nvSpPr>
         <p:spPr>
+          <a:xfrm>
+            <a:off x="10972800" y="371475"/>
+            <a:ext cx="2743200" cy="228600"/>
+          </a:xfrm>
+          <a:prstGeom prst="rect">
+            <a:avLst/>
+          </a:prstGeom>
           <a:noFill/>
         </p:spPr>
         <p:txBody>
@@ -4780,7 +3134,7 @@
                 <a:ea typeface="ＭＳ Ｐゴシック" pitchFamily="34" charset="-128"/>
               </a:rPr>
               <a:pPr/>
-              <a:t>January 24, 2013</a:t>
+              <a:t>April 17, 2013</a:t>
             </a:fld>
             <a:endParaRPr lang="en-US" smtClean="0">
               <a:latin typeface="Trade Gothic Next LT Pro Lt" pitchFamily="34" charset="0"/>
@@ -4796,10 +3150,17 @@
             <a:spLocks noGrp="1"/>
           </p:cNvSpPr>
           <p:nvPr>
-            <p:ph type="sldNum" sz="quarter" idx="15"/>
+            <p:ph type="sldNum" sz="quarter" idx="4294967295"/>
           </p:nvPr>
         </p:nvSpPr>
         <p:spPr>
+          <a:xfrm>
+            <a:off x="13716000" y="369888"/>
+            <a:ext cx="430213" cy="228600"/>
+          </a:xfrm>
+          <a:prstGeom prst="rect">
+            <a:avLst/>
+          </a:prstGeom>
           <a:noFill/>
         </p:spPr>
         <p:txBody>
@@ -5056,10 +3417,17 @@
             <a:spLocks noGrp="1"/>
           </p:cNvSpPr>
           <p:nvPr>
-            <p:ph type="dt" sz="quarter" idx="14"/>
+            <p:ph type="dt" sz="quarter" idx="4294967295"/>
           </p:nvPr>
         </p:nvSpPr>
         <p:spPr>
+          <a:xfrm>
+            <a:off x="10972800" y="371475"/>
+            <a:ext cx="2743200" cy="228600"/>
+          </a:xfrm>
+          <a:prstGeom prst="rect">
+            <a:avLst/>
+          </a:prstGeom>
           <a:noFill/>
         </p:spPr>
         <p:txBody>
@@ -5072,7 +3440,7 @@
                 <a:ea typeface="ＭＳ Ｐゴシック" pitchFamily="34" charset="-128"/>
               </a:rPr>
               <a:pPr/>
-              <a:t>January 24, 2013</a:t>
+              <a:t>April 17, 2013</a:t>
             </a:fld>
             <a:endParaRPr lang="en-US" smtClean="0">
               <a:latin typeface="Trade Gothic Next LT Pro Lt" pitchFamily="34" charset="0"/>
@@ -5088,10 +3456,17 @@
             <a:spLocks noGrp="1"/>
           </p:cNvSpPr>
           <p:nvPr>
-            <p:ph type="sldNum" sz="quarter" idx="15"/>
+            <p:ph type="sldNum" sz="quarter" idx="4294967295"/>
           </p:nvPr>
         </p:nvSpPr>
         <p:spPr>
+          <a:xfrm>
+            <a:off x="13716000" y="369888"/>
+            <a:ext cx="430213" cy="228600"/>
+          </a:xfrm>
+          <a:prstGeom prst="rect">
+            <a:avLst/>
+          </a:prstGeom>
           <a:noFill/>
         </p:spPr>
         <p:txBody>
@@ -5515,10 +3890,19 @@
                 </a:solidFill>
                 <a:cs typeface="+mn-cs"/>
               </a:rPr>
-              <a:t>build</a:t>
-            </a:r>
-            <a:r>
-              <a:rPr lang="en-US" b="1" dirty="0" smtClean="0">
+              <a:t>build.</a:t>
+            </a:r>
+            <a:r>
+              <a:rPr lang="en-US" dirty="0" smtClean="0">
+                <a:solidFill>
+                  <a:srgbClr val="989A9B"/>
+                </a:solidFill>
+                <a:cs typeface="+mn-cs"/>
+              </a:rPr>
+              <a:t>[</a:t>
+            </a:r>
+            <a:r>
+              <a:rPr lang="en-US" b="1" dirty="0" err="1" smtClean="0">
                 <a:solidFill>
                   <a:schemeClr val="accent1">
                     <a:lumMod val="60000"/>
@@ -5527,7 +3911,7 @@
                 </a:solidFill>
                 <a:cs typeface="+mn-cs"/>
               </a:rPr>
-              <a:t>.</a:t>
+              <a:t>bbos</a:t>
             </a:r>
             <a:r>
               <a:rPr lang="en-US" dirty="0" smtClean="0">
@@ -5536,10 +3920,10 @@
                 </a:solidFill>
                 <a:cs typeface="+mn-cs"/>
               </a:rPr>
-              <a:t>[</a:t>
-            </a:r>
-            <a:r>
-              <a:rPr lang="en-US" b="1" dirty="0" err="1" smtClean="0">
+              <a:t>,</a:t>
+            </a:r>
+            <a:r>
+              <a:rPr lang="en-US" b="1" dirty="0" smtClean="0">
                 <a:solidFill>
                   <a:schemeClr val="accent1">
                     <a:lumMod val="60000"/>
@@ -5548,7 +3932,7 @@
                 </a:solidFill>
                 <a:cs typeface="+mn-cs"/>
               </a:rPr>
-              <a:t>bbos</a:t>
+              <a:t> tablet</a:t>
             </a:r>
             <a:r>
               <a:rPr lang="en-US" dirty="0" smtClean="0">
@@ -5569,7 +3953,7 @@
                 </a:solidFill>
                 <a:cs typeface="+mn-cs"/>
               </a:rPr>
-              <a:t> tablet</a:t>
+              <a:t> bb10</a:t>
             </a:r>
             <a:r>
               <a:rPr lang="en-US" dirty="0" smtClean="0">
@@ -5578,7 +3962,7 @@
                 </a:solidFill>
                 <a:cs typeface="+mn-cs"/>
               </a:rPr>
-              <a:t>,</a:t>
+              <a:t>]</a:t>
             </a:r>
             <a:r>
               <a:rPr lang="en-US" b="1" dirty="0" smtClean="0">
@@ -5590,7 +3974,7 @@
                 </a:solidFill>
                 <a:cs typeface="+mn-cs"/>
               </a:rPr>
-              <a:t> bb10</a:t>
+              <a:t>.</a:t>
             </a:r>
             <a:r>
               <a:rPr lang="en-US" dirty="0" smtClean="0">
@@ -5599,7 +3983,7 @@
                 </a:solidFill>
                 <a:cs typeface="+mn-cs"/>
               </a:rPr>
-              <a:t>]</a:t>
+              <a:t>[</a:t>
             </a:r>
             <a:r>
               <a:rPr lang="en-US" b="1" dirty="0" smtClean="0">
@@ -5611,7 +3995,7 @@
                 </a:solidFill>
                 <a:cs typeface="+mn-cs"/>
               </a:rPr>
-              <a:t>.</a:t>
+              <a:t>test</a:t>
             </a:r>
             <a:r>
               <a:rPr lang="en-US" dirty="0" smtClean="0">
@@ -5620,7 +4004,7 @@
                 </a:solidFill>
                 <a:cs typeface="+mn-cs"/>
               </a:rPr>
-              <a:t>[</a:t>
+              <a:t>,</a:t>
             </a:r>
             <a:r>
               <a:rPr lang="en-US" b="1" dirty="0" smtClean="0">
@@ -5632,14 +4016,13 @@
                 </a:solidFill>
                 <a:cs typeface="+mn-cs"/>
               </a:rPr>
-              <a:t>test</a:t>
+              <a:t> prod</a:t>
             </a:r>
             <a:r>
               <a:rPr lang="en-US" dirty="0" smtClean="0">
                 <a:solidFill>
                   <a:srgbClr val="989A9B"/>
                 </a:solidFill>
-                <a:cs typeface="+mn-cs"/>
               </a:rPr>
               <a:t>,</a:t>
             </a:r>
@@ -5651,34 +4034,14 @@
                     <a:lumOff val="40000"/>
                   </a:schemeClr>
                 </a:solidFill>
-                <a:cs typeface="+mn-cs"/>
-              </a:rPr>
-              <a:t> prod</a:t>
+              </a:rPr>
+              <a:t> beta</a:t>
             </a:r>
             <a:r>
               <a:rPr lang="en-US" dirty="0" smtClean="0">
                 <a:solidFill>
                   <a:srgbClr val="989A9B"/>
                 </a:solidFill>
-              </a:rPr>
-              <a:t>,</a:t>
-            </a:r>
-            <a:r>
-              <a:rPr lang="en-US" b="1" dirty="0" smtClean="0">
-                <a:solidFill>
-                  <a:schemeClr val="accent1">
-                    <a:lumMod val="60000"/>
-                    <a:lumOff val="40000"/>
-                  </a:schemeClr>
-                </a:solidFill>
-              </a:rPr>
-              <a:t> beta</a:t>
-            </a:r>
-            <a:r>
-              <a:rPr lang="en-US" dirty="0" smtClean="0">
-                <a:solidFill>
-                  <a:srgbClr val="989A9B"/>
-                </a:solidFill>
                 <a:cs typeface="+mn-cs"/>
               </a:rPr>
               <a:t>]</a:t>
@@ -5704,13 +4067,7 @@
               <a:rPr lang="en-US" dirty="0" smtClean="0">
                 <a:cs typeface="+mn-cs"/>
               </a:rPr>
-              <a:t> for </a:t>
-            </a:r>
-            <a:r>
-              <a:rPr lang="en-US" dirty="0" smtClean="0">
-                <a:cs typeface="+mn-cs"/>
-              </a:rPr>
-              <a:t>BlackBerry 5 through 7.x </a:t>
+              <a:t> for BlackBerry 5 through 7.x </a:t>
             </a:r>
             <a:r>
               <a:rPr lang="en-US" dirty="0" err="1" smtClean="0">
@@ -5730,19 +4087,7 @@
               <a:rPr lang="en-US" dirty="0" smtClean="0">
                 <a:cs typeface="+mn-cs"/>
               </a:rPr>
-              <a:t>	- </a:t>
-            </a:r>
-            <a:r>
-              <a:rPr lang="en-US" dirty="0" smtClean="0">
-                <a:cs typeface="+mn-cs"/>
-              </a:rPr>
-              <a:t>tablet </a:t>
-            </a:r>
-            <a:r>
-              <a:rPr lang="en-US" dirty="0" smtClean="0">
-                <a:cs typeface="+mn-cs"/>
-              </a:rPr>
-              <a:t>for </a:t>
+              <a:t>	- tablet for </a:t>
             </a:r>
             <a:r>
               <a:rPr lang="en-US" dirty="0" err="1" smtClean="0">
@@ -5765,19 +4110,7 @@
               <a:rPr lang="en-US" dirty="0" smtClean="0">
                 <a:cs typeface="+mn-cs"/>
               </a:rPr>
-              <a:t>	- </a:t>
-            </a:r>
-            <a:r>
-              <a:rPr lang="en-US" dirty="0" smtClean="0">
-                <a:cs typeface="+mn-cs"/>
-              </a:rPr>
-              <a:t>bb10 for </a:t>
-            </a:r>
-            <a:r>
-              <a:rPr lang="en-US" dirty="0" smtClean="0">
-                <a:cs typeface="+mn-cs"/>
-              </a:rPr>
-              <a:t>BlackBerry 10</a:t>
+              <a:t>	- bb10 for BlackBerry 10</a:t>
             </a:r>
           </a:p>
           <a:p>
@@ -5959,10 +4292,17 @@
             <a:spLocks noGrp="1"/>
           </p:cNvSpPr>
           <p:nvPr>
-            <p:ph type="dt" sz="quarter" idx="14"/>
+            <p:ph type="dt" sz="quarter" idx="4294967295"/>
           </p:nvPr>
         </p:nvSpPr>
         <p:spPr>
+          <a:xfrm>
+            <a:off x="10972800" y="371475"/>
+            <a:ext cx="2743200" cy="228600"/>
+          </a:xfrm>
+          <a:prstGeom prst="rect">
+            <a:avLst/>
+          </a:prstGeom>
           <a:noFill/>
         </p:spPr>
         <p:txBody>
@@ -5975,7 +4315,7 @@
                 <a:ea typeface="ＭＳ Ｐゴシック" pitchFamily="34" charset="-128"/>
               </a:rPr>
               <a:pPr/>
-              <a:t>January 24, 2013</a:t>
+              <a:t>April 17, 2013</a:t>
             </a:fld>
             <a:endParaRPr lang="en-US" smtClean="0">
               <a:latin typeface="Trade Gothic Next LT Pro Lt" pitchFamily="34" charset="0"/>
@@ -5991,10 +4331,17 @@
             <a:spLocks noGrp="1"/>
           </p:cNvSpPr>
           <p:nvPr>
-            <p:ph type="sldNum" sz="quarter" idx="15"/>
+            <p:ph type="sldNum" sz="quarter" idx="4294967295"/>
           </p:nvPr>
         </p:nvSpPr>
         <p:spPr>
+          <a:xfrm>
+            <a:off x="13716000" y="369888"/>
+            <a:ext cx="430213" cy="228600"/>
+          </a:xfrm>
+          <a:prstGeom prst="rect">
+            <a:avLst/>
+          </a:prstGeom>
           <a:noFill/>
         </p:spPr>
         <p:txBody>
@@ -6121,6 +4468,15 @@
             <a:r>
               <a:rPr lang="en-US" b="1" dirty="0" err="1" smtClean="0">
                 <a:solidFill>
+                  <a:srgbClr val="00B0F0"/>
+                </a:solidFill>
+                <a:cs typeface="+mn-cs"/>
+              </a:rPr>
+              <a:t>build.deploy</a:t>
+            </a:r>
+            <a:r>
+              <a:rPr lang="en-US" b="1" dirty="0" smtClean="0">
+                <a:solidFill>
                   <a:schemeClr val="accent1">
                     <a:lumMod val="60000"/>
                     <a:lumOff val="40000"/>
@@ -6128,7 +4484,25 @@
                 </a:solidFill>
                 <a:cs typeface="+mn-cs"/>
               </a:rPr>
-              <a:t>build.deploy</a:t>
+              <a:t>.</a:t>
+            </a:r>
+            <a:r>
+              <a:rPr lang="en-US" dirty="0" smtClean="0">
+                <a:solidFill>
+                  <a:srgbClr val="989A9B"/>
+                </a:solidFill>
+                <a:cs typeface="+mn-cs"/>
+              </a:rPr>
+              <a:t>[</a:t>
+            </a:r>
+            <a:r>
+              <a:rPr lang="en-US" b="1" dirty="0" smtClean="0">
+                <a:solidFill>
+                  <a:srgbClr val="00B0F0"/>
+                </a:solidFill>
+                <a:cs typeface="+mn-cs"/>
+              </a:rPr>
+              <a:t>bb10</a:t>
             </a:r>
             <a:r>
               <a:rPr lang="en-US" b="1" dirty="0" smtClean="0">
@@ -6154,6 +4528,78 @@
             <a:r>
               <a:rPr lang="en-US" b="1" dirty="0" smtClean="0">
                 <a:solidFill>
+                  <a:srgbClr val="00A8DF"/>
+                </a:solidFill>
+                <a:cs typeface="+mn-cs"/>
+              </a:rPr>
+              <a:t>device</a:t>
+            </a:r>
+            <a:r>
+              <a:rPr lang="en-US" dirty="0" smtClean="0">
+                <a:solidFill>
+                  <a:srgbClr val="989A9B"/>
+                </a:solidFill>
+                <a:cs typeface="+mn-cs"/>
+              </a:rPr>
+              <a:t>, </a:t>
+            </a:r>
+            <a:r>
+              <a:rPr lang="en-US" b="1" dirty="0" err="1" smtClean="0">
+                <a:solidFill>
+                  <a:srgbClr val="00A8DF"/>
+                </a:solidFill>
+                <a:cs typeface="+mn-cs"/>
+              </a:rPr>
+              <a:t>sim</a:t>
+            </a:r>
+            <a:r>
+              <a:rPr lang="en-US" dirty="0" smtClean="0">
+                <a:solidFill>
+                  <a:srgbClr val="989A9B"/>
+                </a:solidFill>
+                <a:cs typeface="+mn-cs"/>
+              </a:rPr>
+              <a:t>], </a:t>
+            </a:r>
+            <a:r>
+              <a:rPr lang="en-US" b="1" dirty="0" smtClean="0">
+                <a:solidFill>
+                  <a:srgbClr val="00A8DF"/>
+                </a:solidFill>
+                <a:cs typeface="+mn-cs"/>
+              </a:rPr>
+              <a:t>tablet</a:t>
+            </a:r>
+            <a:r>
+              <a:rPr lang="en-US" dirty="0" smtClean="0">
+                <a:solidFill>
+                  <a:srgbClr val="989A9B"/>
+                </a:solidFill>
+                <a:cs typeface="+mn-cs"/>
+              </a:rPr>
+              <a:t>, </a:t>
+            </a:r>
+            <a:r>
+              <a:rPr lang="en-US" b="1" dirty="0" err="1" smtClean="0">
+                <a:solidFill>
+                  <a:srgbClr val="00A8DF"/>
+                </a:solidFill>
+                <a:cs typeface="+mn-cs"/>
+              </a:rPr>
+              <a:t>bbos</a:t>
+            </a:r>
+            <a:r>
+              <a:rPr lang="en-US" dirty="0" smtClean="0">
+                <a:solidFill>
+                  <a:srgbClr val="989A9B"/>
+                </a:solidFill>
+                <a:cs typeface="+mn-cs"/>
+              </a:rPr>
+              <a:t>]</a:t>
+            </a:r>
+            <a:r>
+              <a:rPr lang="en-US" b="1" dirty="0" smtClean="0">
+                <a:solidFill>
                   <a:schemeClr val="accent1">
                     <a:lumMod val="60000"/>
                     <a:lumOff val="40000"/>
@@ -6161,7 +4607,7 @@
                 </a:solidFill>
                 <a:cs typeface="+mn-cs"/>
               </a:rPr>
-              <a:t>bb10.</a:t>
+              <a:t>.</a:t>
             </a:r>
             <a:r>
               <a:rPr lang="en-US" dirty="0" smtClean="0">
@@ -6175,11 +4621,11 @@
             <a:r>
               <a:rPr lang="en-US" b="1" dirty="0" smtClean="0">
                 <a:solidFill>
-                  <a:srgbClr val="00A8DF"/>
-                </a:solidFill>
-                <a:cs typeface="+mn-cs"/>
-              </a:rPr>
-              <a:t>device</a:t>
+                  <a:srgbClr val="00B0F0"/>
+                </a:solidFill>
+                <a:cs typeface="+mn-cs"/>
+              </a:rPr>
+              <a:t>test</a:t>
             </a:r>
             <a:r>
               <a:rPr lang="en-US" dirty="0" smtClean="0">
@@ -6188,61 +4634,7 @@
                 </a:solidFill>
                 <a:cs typeface="+mn-cs"/>
               </a:rPr>
-              <a:t>, </a:t>
-            </a:r>
-            <a:r>
-              <a:rPr lang="en-US" b="1" dirty="0" err="1" smtClean="0">
-                <a:solidFill>
-                  <a:srgbClr val="00A8DF"/>
-                </a:solidFill>
-                <a:cs typeface="+mn-cs"/>
-              </a:rPr>
-              <a:t>sim</a:t>
-            </a:r>
-            <a:r>
-              <a:rPr lang="en-US" dirty="0" smtClean="0">
-                <a:solidFill>
-                  <a:srgbClr val="989A9B"/>
-                </a:solidFill>
-                <a:cs typeface="+mn-cs"/>
-              </a:rPr>
-              <a:t>], </a:t>
-            </a:r>
-            <a:r>
-              <a:rPr lang="en-US" b="1" dirty="0" smtClean="0">
-                <a:solidFill>
-                  <a:srgbClr val="00A8DF"/>
-                </a:solidFill>
-                <a:cs typeface="+mn-cs"/>
-              </a:rPr>
-              <a:t>tablet</a:t>
-            </a:r>
-            <a:r>
-              <a:rPr lang="en-US" dirty="0" smtClean="0">
-                <a:solidFill>
-                  <a:srgbClr val="989A9B"/>
-                </a:solidFill>
-                <a:cs typeface="+mn-cs"/>
-              </a:rPr>
-              <a:t>, </a:t>
-            </a:r>
-            <a:r>
-              <a:rPr lang="en-US" b="1" dirty="0" err="1" smtClean="0">
-                <a:solidFill>
-                  <a:srgbClr val="00A8DF"/>
-                </a:solidFill>
-                <a:cs typeface="+mn-cs"/>
-              </a:rPr>
-              <a:t>bbos</a:t>
-            </a:r>
-            <a:r>
-              <a:rPr lang="en-US" dirty="0" smtClean="0">
-                <a:solidFill>
-                  <a:srgbClr val="989A9B"/>
-                </a:solidFill>
-                <a:cs typeface="+mn-cs"/>
-              </a:rPr>
-              <a:t>]</a:t>
+              <a:t>,</a:t>
             </a:r>
             <a:r>
               <a:rPr lang="en-US" b="1" dirty="0" smtClean="0">
@@ -6254,7 +4646,16 @@
                 </a:solidFill>
                 <a:cs typeface="+mn-cs"/>
               </a:rPr>
-              <a:t>.</a:t>
+              <a:t> </a:t>
+            </a:r>
+            <a:r>
+              <a:rPr lang="en-US" b="1" dirty="0" smtClean="0">
+                <a:solidFill>
+                  <a:srgbClr val="00B0F0"/>
+                </a:solidFill>
+                <a:cs typeface="+mn-cs"/>
+              </a:rPr>
+              <a:t>prod</a:t>
             </a:r>
             <a:r>
               <a:rPr lang="en-US" dirty="0" smtClean="0">
@@ -6263,19 +4664,16 @@
                 </a:solidFill>
                 <a:cs typeface="+mn-cs"/>
               </a:rPr>
-              <a:t>[</a:t>
+              <a:t>, </a:t>
             </a:r>
             <a:r>
               <a:rPr lang="en-US" b="1" dirty="0" smtClean="0">
                 <a:solidFill>
-                  <a:schemeClr val="accent1">
-                    <a:lumMod val="60000"/>
-                    <a:lumOff val="40000"/>
-                  </a:schemeClr>
-                </a:solidFill>
-                <a:cs typeface="+mn-cs"/>
-              </a:rPr>
-              <a:t>test</a:t>
+                  <a:srgbClr val="00A8DF"/>
+                </a:solidFill>
+                <a:cs typeface="+mn-cs"/>
+              </a:rPr>
+              <a:t>beta</a:t>
             </a:r>
             <a:r>
               <a:rPr lang="en-US" dirty="0" smtClean="0">
@@ -6284,45 +4682,6 @@
                 </a:solidFill>
                 <a:cs typeface="+mn-cs"/>
               </a:rPr>
-              <a:t>,</a:t>
-            </a:r>
-            <a:r>
-              <a:rPr lang="en-US" b="1" dirty="0" smtClean="0">
-                <a:solidFill>
-                  <a:schemeClr val="accent1">
-                    <a:lumMod val="60000"/>
-                    <a:lumOff val="40000"/>
-                  </a:schemeClr>
-                </a:solidFill>
-                <a:cs typeface="+mn-cs"/>
-              </a:rPr>
-              <a:t> prod</a:t>
-            </a:r>
-            <a:r>
-              <a:rPr lang="en-US" dirty="0" smtClean="0">
-                <a:solidFill>
-                  <a:srgbClr val="989A9B"/>
-                </a:solidFill>
-                <a:cs typeface="+mn-cs"/>
-              </a:rPr>
-              <a:t>, </a:t>
-            </a:r>
-            <a:r>
-              <a:rPr lang="en-US" b="1" dirty="0" smtClean="0">
-                <a:solidFill>
-                  <a:srgbClr val="00A8DF"/>
-                </a:solidFill>
-                <a:cs typeface="+mn-cs"/>
-              </a:rPr>
-              <a:t>beta</a:t>
-            </a:r>
-            <a:r>
-              <a:rPr lang="en-US" dirty="0" smtClean="0">
-                <a:solidFill>
-                  <a:srgbClr val="989A9B"/>
-                </a:solidFill>
-                <a:cs typeface="+mn-cs"/>
-              </a:rPr>
               <a:t>]</a:t>
             </a:r>
           </a:p>
@@ -6346,13 +4705,7 @@
               <a:rPr lang="en-US" dirty="0" smtClean="0">
                 <a:cs typeface="+mn-cs"/>
               </a:rPr>
-              <a:t> </a:t>
-            </a:r>
-            <a:r>
-              <a:rPr lang="en-US" dirty="0" smtClean="0">
-                <a:cs typeface="+mn-cs"/>
-              </a:rPr>
-              <a:t>for BlackBerry 5 through 7.x </a:t>
+              <a:t> for BlackBerry 5 through 7.x </a:t>
             </a:r>
             <a:r>
               <a:rPr lang="en-US" dirty="0" err="1" smtClean="0">
@@ -6372,19 +4725,7 @@
               <a:rPr lang="en-US" dirty="0" smtClean="0">
                 <a:cs typeface="+mn-cs"/>
               </a:rPr>
-              <a:t>	- </a:t>
-            </a:r>
-            <a:r>
-              <a:rPr lang="en-US" dirty="0" smtClean="0">
-                <a:cs typeface="+mn-cs"/>
-              </a:rPr>
-              <a:t>tablet </a:t>
-            </a:r>
-            <a:r>
-              <a:rPr lang="en-US" dirty="0" smtClean="0">
-                <a:cs typeface="+mn-cs"/>
-              </a:rPr>
-              <a:t>for </a:t>
+              <a:t>	- tablet for </a:t>
             </a:r>
             <a:r>
               <a:rPr lang="en-US" dirty="0" err="1" smtClean="0">
@@ -6407,19 +4748,7 @@
               <a:rPr lang="en-US" dirty="0" smtClean="0">
                 <a:cs typeface="+mn-cs"/>
               </a:rPr>
-              <a:t>	- </a:t>
-            </a:r>
-            <a:r>
-              <a:rPr lang="en-US" dirty="0" smtClean="0">
-                <a:cs typeface="+mn-cs"/>
-              </a:rPr>
-              <a:t>bb10 </a:t>
-            </a:r>
-            <a:r>
-              <a:rPr lang="en-US" dirty="0" smtClean="0">
-                <a:cs typeface="+mn-cs"/>
-              </a:rPr>
-              <a:t>for BlackBerry 10 also requires defining simulator build or device</a:t>
+              <a:t>	- bb10 for BlackBerry 10 also requires defining simulator build or device</a:t>
             </a:r>
           </a:p>
           <a:p>
@@ -6458,7 +4787,16 @@
                 </a:solidFill>
                 <a:cs typeface="+mn-cs"/>
               </a:rPr>
-              <a:t>device</a:t>
+              <a:t>device.</a:t>
+            </a:r>
+            <a:r>
+              <a:rPr lang="en-US" dirty="0" smtClean="0">
+                <a:solidFill>
+                  <a:srgbClr val="989A9B"/>
+                </a:solidFill>
+                <a:cs typeface="+mn-cs"/>
+              </a:rPr>
+              <a:t>[</a:t>
             </a:r>
             <a:r>
               <a:rPr lang="en-US" b="1" dirty="0" smtClean="0">
@@ -6467,9 +4805,69 @@
                 </a:solidFill>
                 <a:cs typeface="+mn-cs"/>
               </a:rPr>
+              <a:t>bb10</a:t>
+            </a:r>
+            <a:r>
+              <a:rPr lang="en-US" dirty="0" smtClean="0">
+                <a:solidFill>
+                  <a:srgbClr val="989A9B"/>
+                </a:solidFill>
+                <a:cs typeface="+mn-cs"/>
+              </a:rPr>
+              <a:t>,</a:t>
+            </a:r>
+            <a:r>
+              <a:rPr lang="en-US" b="1" dirty="0" smtClean="0">
+                <a:solidFill>
+                  <a:srgbClr val="00A8DF"/>
+                </a:solidFill>
+                <a:cs typeface="+mn-cs"/>
+              </a:rPr>
+              <a:t> tablet</a:t>
+            </a:r>
+            <a:r>
+              <a:rPr lang="en-US" dirty="0" smtClean="0">
+                <a:solidFill>
+                  <a:srgbClr val="989A9B"/>
+                </a:solidFill>
+                <a:cs typeface="+mn-cs"/>
+              </a:rPr>
+              <a:t>]</a:t>
+            </a:r>
+            <a:r>
+              <a:rPr lang="en-US" b="1" dirty="0" smtClean="0">
+                <a:solidFill>
+                  <a:srgbClr val="00A8DF"/>
+                </a:solidFill>
+                <a:cs typeface="+mn-cs"/>
+              </a:rPr>
               <a:t>.</a:t>
             </a:r>
             <a:r>
+              <a:rPr lang="en-US" b="1" dirty="0" err="1" smtClean="0">
+                <a:solidFill>
+                  <a:srgbClr val="00A8DF"/>
+                </a:solidFill>
+                <a:cs typeface="+mn-cs"/>
+              </a:rPr>
+              <a:t>ip</a:t>
+            </a:r>
+            <a:r>
+              <a:rPr lang="en-US" dirty="0" smtClean="0">
+                <a:cs typeface="+mn-cs"/>
+              </a:rPr>
+              <a:t> and/or </a:t>
+            </a:r>
+            <a:r>
+              <a:rPr lang="en-US" b="1" dirty="0" smtClean="0">
+                <a:solidFill>
+                  <a:srgbClr val="00A8DF"/>
+                </a:solidFill>
+                <a:cs typeface="+mn-cs"/>
+              </a:rPr>
+              <a:t>device.</a:t>
+            </a:r>
+            <a:r>
               <a:rPr lang="en-US" dirty="0" smtClean="0">
                 <a:solidFill>
                   <a:srgbClr val="989A9B"/>
@@ -6512,6 +4910,33 @@
                 </a:solidFill>
                 <a:cs typeface="+mn-cs"/>
               </a:rPr>
+              <a:t>,</a:t>
+            </a:r>
+            <a:r>
+              <a:rPr lang="en-US" b="1" dirty="0" smtClean="0">
+                <a:solidFill>
+                  <a:srgbClr val="00A8DF"/>
+                </a:solidFill>
+                <a:cs typeface="+mn-cs"/>
+              </a:rPr>
+              <a:t> </a:t>
+            </a:r>
+            <a:r>
+              <a:rPr lang="en-US" b="1" dirty="0" err="1" smtClean="0">
+                <a:solidFill>
+                  <a:srgbClr val="00A8DF"/>
+                </a:solidFill>
+                <a:cs typeface="+mn-cs"/>
+              </a:rPr>
+              <a:t>bbos</a:t>
+            </a:r>
+            <a:r>
+              <a:rPr lang="en-US" dirty="0" smtClean="0">
+                <a:solidFill>
+                  <a:srgbClr val="989A9B"/>
+                </a:solidFill>
+                <a:cs typeface="+mn-cs"/>
+              </a:rPr>
               <a:t>]</a:t>
             </a:r>
             <a:r>
@@ -6521,146 +4946,14 @@
                 </a:solidFill>
                 <a:cs typeface="+mn-cs"/>
               </a:rPr>
-              <a:t>.</a:t>
-            </a:r>
-            <a:r>
-              <a:rPr lang="en-US" b="1" dirty="0" err="1" smtClean="0">
-                <a:solidFill>
-                  <a:srgbClr val="00A8DF"/>
-                </a:solidFill>
-                <a:cs typeface="+mn-cs"/>
-              </a:rPr>
-              <a:t>ip</a:t>
-            </a:r>
-            <a:r>
-              <a:rPr lang="en-US" dirty="0" smtClean="0">
-                <a:cs typeface="+mn-cs"/>
-              </a:rPr>
-              <a:t> and/or </a:t>
-            </a:r>
-            <a:r>
-              <a:rPr lang="en-US" b="1" dirty="0" smtClean="0">
-                <a:solidFill>
-                  <a:srgbClr val="00A8DF"/>
-                </a:solidFill>
-                <a:cs typeface="+mn-cs"/>
-              </a:rPr>
-              <a:t>device</a:t>
-            </a:r>
-            <a:r>
-              <a:rPr lang="en-US" b="1" dirty="0" smtClean="0">
-                <a:solidFill>
-                  <a:srgbClr val="00A8DF"/>
-                </a:solidFill>
-                <a:cs typeface="+mn-cs"/>
-              </a:rPr>
-              <a:t>.</a:t>
-            </a:r>
-            <a:r>
-              <a:rPr lang="en-US" dirty="0" smtClean="0">
-                <a:solidFill>
-                  <a:srgbClr val="989A9B"/>
-                </a:solidFill>
-                <a:cs typeface="+mn-cs"/>
-              </a:rPr>
-              <a:t>[</a:t>
-            </a:r>
-            <a:r>
-              <a:rPr lang="en-US" b="1" dirty="0" smtClean="0">
-                <a:solidFill>
-                  <a:srgbClr val="00A8DF"/>
-                </a:solidFill>
-                <a:cs typeface="+mn-cs"/>
-              </a:rPr>
-              <a:t>bb10</a:t>
-            </a:r>
-            <a:r>
-              <a:rPr lang="en-US" dirty="0" smtClean="0">
-                <a:solidFill>
-                  <a:srgbClr val="989A9B"/>
-                </a:solidFill>
-                <a:cs typeface="+mn-cs"/>
-              </a:rPr>
-              <a:t>,</a:t>
-            </a:r>
-            <a:r>
-              <a:rPr lang="en-US" b="1" dirty="0" smtClean="0">
-                <a:solidFill>
-                  <a:srgbClr val="00A8DF"/>
-                </a:solidFill>
-                <a:cs typeface="+mn-cs"/>
-              </a:rPr>
-              <a:t> tablet</a:t>
-            </a:r>
-            <a:r>
-              <a:rPr lang="en-US" dirty="0" smtClean="0">
-                <a:solidFill>
-                  <a:srgbClr val="989A9B"/>
-                </a:solidFill>
-                <a:cs typeface="+mn-cs"/>
-              </a:rPr>
-              <a:t>,</a:t>
-            </a:r>
-            <a:r>
-              <a:rPr lang="en-US" b="1" dirty="0" smtClean="0">
-                <a:solidFill>
-                  <a:srgbClr val="00A8DF"/>
-                </a:solidFill>
-                <a:cs typeface="+mn-cs"/>
-              </a:rPr>
-              <a:t> </a:t>
-            </a:r>
-            <a:r>
-              <a:rPr lang="en-US" b="1" dirty="0" err="1" smtClean="0">
-                <a:solidFill>
-                  <a:srgbClr val="00A8DF"/>
-                </a:solidFill>
-                <a:cs typeface="+mn-cs"/>
-              </a:rPr>
-              <a:t>bbos</a:t>
-            </a:r>
-            <a:r>
-              <a:rPr lang="en-US" dirty="0" smtClean="0">
-                <a:solidFill>
-                  <a:srgbClr val="989A9B"/>
-                </a:solidFill>
-                <a:cs typeface="+mn-cs"/>
-              </a:rPr>
-              <a:t>]</a:t>
-            </a:r>
-            <a:r>
-              <a:rPr lang="en-US" b="1" dirty="0" smtClean="0">
-                <a:solidFill>
-                  <a:srgbClr val="00A8DF"/>
-                </a:solidFill>
-                <a:cs typeface="+mn-cs"/>
-              </a:rPr>
-              <a:t>.</a:t>
-            </a:r>
-            <a:r>
-              <a:rPr lang="en-US" b="1" dirty="0" smtClean="0">
-                <a:solidFill>
-                  <a:srgbClr val="00A8DF"/>
-                </a:solidFill>
-                <a:cs typeface="+mn-cs"/>
-              </a:rPr>
-              <a:t>pw</a:t>
-            </a:r>
-            <a:r>
-              <a:rPr lang="en-US" dirty="0" smtClean="0">
-                <a:cs typeface="+mn-cs"/>
-              </a:rPr>
-              <a:t> </a:t>
-            </a:r>
-            <a:r>
-              <a:rPr lang="en-US" dirty="0" smtClean="0">
-                <a:cs typeface="+mn-cs"/>
-              </a:rPr>
-              <a:t>properties</a:t>
-            </a:r>
-            <a:endParaRPr lang="en-US" dirty="0" smtClean="0">
-              <a:cs typeface="+mn-cs"/>
-            </a:endParaRPr>
+              <a:t>.pw</a:t>
+            </a:r>
+            <a:r>
+              <a:rPr lang="en-US" dirty="0" smtClean="0">
+                <a:cs typeface="+mn-cs"/>
+              </a:rPr>
+              <a:t> properties</a:t>
+            </a:r>
           </a:p>
           <a:p>
             <a:pPr eaLnBrk="1" hangingPunct="1">
@@ -6670,29 +4963,8 @@
               <a:rPr lang="en-US" dirty="0" smtClean="0">
                 <a:cs typeface="+mn-cs"/>
               </a:rPr>
-              <a:t>	&lt;property name="</a:t>
-            </a:r>
-            <a:r>
-              <a:rPr lang="en-US" dirty="0" smtClean="0">
-                <a:cs typeface="+mn-cs"/>
-              </a:rPr>
-              <a:t>device.bb10.ip</a:t>
-            </a:r>
-            <a:r>
-              <a:rPr lang="en-US" dirty="0" smtClean="0">
-                <a:cs typeface="+mn-cs"/>
-              </a:rPr>
-              <a:t>" value</a:t>
-            </a:r>
-            <a:r>
-              <a:rPr lang="en-US" dirty="0" smtClean="0">
-                <a:cs typeface="+mn-cs"/>
-              </a:rPr>
-              <a:t>=“169.254.0.1"/&gt;</a:t>
-            </a:r>
-            <a:endParaRPr lang="en-US" dirty="0" smtClean="0">
-              <a:cs typeface="+mn-cs"/>
-            </a:endParaRPr>
+              <a:t>	&lt;property name="device.bb10.ip" value=“169.254.0.1"/&gt;</a:t>
+            </a:r>
           </a:p>
           <a:p>
             <a:pPr eaLnBrk="1" hangingPunct="1">
@@ -6702,31 +4974,7 @@
               <a:rPr lang="en-US" dirty="0" smtClean="0">
                 <a:cs typeface="+mn-cs"/>
               </a:rPr>
-              <a:t>	&lt;property name="</a:t>
-            </a:r>
-            <a:r>
-              <a:rPr lang="en-US" dirty="0" smtClean="0">
-                <a:cs typeface="+mn-cs"/>
-              </a:rPr>
-              <a:t>device.bb10.pw</a:t>
-            </a:r>
-            <a:r>
-              <a:rPr lang="en-US" dirty="0" smtClean="0">
-                <a:cs typeface="+mn-cs"/>
-              </a:rPr>
-              <a:t>" value</a:t>
-            </a:r>
-            <a:r>
-              <a:rPr lang="en-US" dirty="0" smtClean="0">
-                <a:cs typeface="+mn-cs"/>
-              </a:rPr>
-              <a:t>=“******" </a:t>
-            </a:r>
-            <a:r>
-              <a:rPr lang="en-US" dirty="0" smtClean="0">
-                <a:cs typeface="+mn-cs"/>
-              </a:rPr>
-              <a:t>/&gt;</a:t>
+              <a:t>	&lt;property name="device.bb10.pw" value=“******" /&gt;</a:t>
             </a:r>
           </a:p>
           <a:p>
@@ -6762,10 +5010,17 @@
             <a:spLocks noGrp="1"/>
           </p:cNvSpPr>
           <p:nvPr>
-            <p:ph type="dt" sz="quarter" idx="14"/>
+            <p:ph type="dt" sz="quarter" idx="4294967295"/>
           </p:nvPr>
         </p:nvSpPr>
         <p:spPr>
+          <a:xfrm>
+            <a:off x="10972800" y="371475"/>
+            <a:ext cx="2743200" cy="228600"/>
+          </a:xfrm>
+          <a:prstGeom prst="rect">
+            <a:avLst/>
+          </a:prstGeom>
           <a:noFill/>
         </p:spPr>
         <p:txBody>
@@ -6778,7 +5033,7 @@
                 <a:ea typeface="ＭＳ Ｐゴシック" pitchFamily="34" charset="-128"/>
               </a:rPr>
               <a:pPr/>
-              <a:t>January 24, 2013</a:t>
+              <a:t>April 17, 2013</a:t>
             </a:fld>
             <a:endParaRPr lang="en-US" smtClean="0">
               <a:latin typeface="Trade Gothic Next LT Pro Lt" pitchFamily="34" charset="0"/>
@@ -6794,10 +5049,17 @@
             <a:spLocks noGrp="1"/>
           </p:cNvSpPr>
           <p:nvPr>
-            <p:ph type="sldNum" sz="quarter" idx="15"/>
+            <p:ph type="sldNum" sz="quarter" idx="4294967295"/>
           </p:nvPr>
         </p:nvSpPr>
         <p:spPr>
+          <a:xfrm>
+            <a:off x="13716000" y="369888"/>
+            <a:ext cx="430213" cy="228600"/>
+          </a:xfrm>
+          <a:prstGeom prst="rect">
+            <a:avLst/>
+          </a:prstGeom>
           <a:noFill/>
         </p:spPr>
         <p:txBody>
@@ -6856,6 +5118,546 @@
       </p:grpSpPr>
       <p:sp>
         <p:nvSpPr>
+          <p:cNvPr id="21506" name="Title 9"/>
+          <p:cNvSpPr>
+            <a:spLocks noGrp="1"/>
+          </p:cNvSpPr>
+          <p:nvPr>
+            <p:ph type="title"/>
+          </p:nvPr>
+        </p:nvSpPr>
+        <p:spPr/>
+        <p:txBody>
+          <a:bodyPr/>
+          <a:lstStyle/>
+          <a:p>
+            <a:pPr eaLnBrk="1" hangingPunct="1"/>
+            <a:r>
+              <a:rPr lang="en-US" dirty="0" smtClean="0"/>
+              <a:t>Debug Token </a:t>
+            </a:r>
+            <a:r>
+              <a:rPr lang="en-US" dirty="0" smtClean="0"/>
+              <a:t>Targets</a:t>
+            </a:r>
+          </a:p>
+        </p:txBody>
+      </p:sp>
+      <p:sp>
+        <p:nvSpPr>
+          <p:cNvPr id="11" name="Text Placeholder 10"/>
+          <p:cNvSpPr>
+            <a:spLocks noGrp="1"/>
+          </p:cNvSpPr>
+          <p:nvPr>
+            <p:ph type="body" sz="quarter" idx="13"/>
+          </p:nvPr>
+        </p:nvSpPr>
+        <p:spPr>
+          <a:xfrm>
+            <a:off x="457200" y="2150346"/>
+            <a:ext cx="13716000" cy="5869933"/>
+          </a:xfrm>
+        </p:spPr>
+        <p:txBody>
+          <a:bodyPr numCol="1">
+            <a:normAutofit fontScale="92500"/>
+          </a:bodyPr>
+          <a:lstStyle/>
+          <a:p>
+            <a:pPr eaLnBrk="1" hangingPunct="1">
+              <a:defRPr/>
+            </a:pPr>
+            <a:r>
+              <a:rPr lang="en-US" dirty="0" smtClean="0">
+                <a:cs typeface="+mn-cs"/>
+              </a:rPr>
+              <a:t>Creation and Deployment of Debug Tokens are supplied by these commands</a:t>
+            </a:r>
+            <a:endParaRPr lang="en-US" dirty="0" smtClean="0">
+              <a:cs typeface="+mn-cs"/>
+            </a:endParaRPr>
+          </a:p>
+          <a:p>
+            <a:pPr eaLnBrk="1" hangingPunct="1">
+              <a:defRPr/>
+            </a:pPr>
+            <a:endParaRPr lang="en-US" dirty="0" smtClean="0">
+              <a:cs typeface="+mn-cs"/>
+            </a:endParaRPr>
+          </a:p>
+          <a:p>
+            <a:pPr eaLnBrk="1" hangingPunct="1">
+              <a:defRPr/>
+            </a:pPr>
+            <a:r>
+              <a:rPr lang="en-US" b="1" dirty="0" smtClean="0">
+                <a:solidFill>
+                  <a:srgbClr val="00A8DF"/>
+                </a:solidFill>
+                <a:cs typeface="+mn-cs"/>
+              </a:rPr>
+              <a:t>build</a:t>
+            </a:r>
+            <a:r>
+              <a:rPr lang="en-US" b="1" dirty="0" smtClean="0">
+                <a:solidFill>
+                  <a:schemeClr val="accent1">
+                    <a:lumMod val="60000"/>
+                    <a:lumOff val="40000"/>
+                  </a:schemeClr>
+                </a:solidFill>
+                <a:cs typeface="+mn-cs"/>
+              </a:rPr>
+              <a:t>.</a:t>
+            </a:r>
+            <a:r>
+              <a:rPr lang="en-US" dirty="0" smtClean="0">
+                <a:solidFill>
+                  <a:srgbClr val="989A9B"/>
+                </a:solidFill>
+                <a:cs typeface="+mn-cs"/>
+              </a:rPr>
+              <a:t>[</a:t>
+            </a:r>
+            <a:r>
+              <a:rPr lang="en-US" b="1" dirty="0" err="1" smtClean="0">
+                <a:solidFill>
+                  <a:srgbClr val="00B0F0"/>
+                </a:solidFill>
+                <a:cs typeface="+mn-cs"/>
+              </a:rPr>
+              <a:t>createDebugToken</a:t>
+            </a:r>
+            <a:r>
+              <a:rPr lang="en-US" dirty="0" smtClean="0">
+                <a:solidFill>
+                  <a:srgbClr val="989A9B"/>
+                </a:solidFill>
+                <a:cs typeface="+mn-cs"/>
+              </a:rPr>
+              <a:t>, </a:t>
+            </a:r>
+            <a:r>
+              <a:rPr lang="en-US" b="1" dirty="0" err="1" smtClean="0">
+                <a:solidFill>
+                  <a:srgbClr val="00B0F0"/>
+                </a:solidFill>
+                <a:cs typeface="+mn-cs"/>
+              </a:rPr>
+              <a:t>deployDebugToken</a:t>
+            </a:r>
+            <a:r>
+              <a:rPr lang="en-US" dirty="0" smtClean="0">
+                <a:solidFill>
+                  <a:srgbClr val="989A9B"/>
+                </a:solidFill>
+                <a:cs typeface="+mn-cs"/>
+              </a:rPr>
+              <a:t>]</a:t>
+            </a:r>
+            <a:r>
+              <a:rPr lang="en-US" b="1" dirty="0" smtClean="0">
+                <a:solidFill>
+                  <a:srgbClr val="00A8DF"/>
+                </a:solidFill>
+                <a:cs typeface="+mn-cs"/>
+              </a:rPr>
+              <a:t>.</a:t>
+            </a:r>
+            <a:r>
+              <a:rPr lang="en-US" dirty="0" smtClean="0">
+                <a:solidFill>
+                  <a:srgbClr val="989A9B"/>
+                </a:solidFill>
+                <a:cs typeface="+mn-cs"/>
+              </a:rPr>
+              <a:t>[</a:t>
+            </a:r>
+            <a:r>
+              <a:rPr lang="en-US" b="1" dirty="0" smtClean="0">
+                <a:solidFill>
+                  <a:srgbClr val="00B0F0"/>
+                </a:solidFill>
+                <a:cs typeface="+mn-cs"/>
+              </a:rPr>
+              <a:t>bb10</a:t>
+            </a:r>
+            <a:r>
+              <a:rPr lang="en-US" dirty="0" smtClean="0">
+                <a:solidFill>
+                  <a:srgbClr val="989A9B"/>
+                </a:solidFill>
+                <a:cs typeface="+mn-cs"/>
+              </a:rPr>
+              <a:t>, </a:t>
+            </a:r>
+            <a:r>
+              <a:rPr lang="en-US" b="1" dirty="0" smtClean="0">
+                <a:solidFill>
+                  <a:srgbClr val="00A8DF"/>
+                </a:solidFill>
+                <a:cs typeface="+mn-cs"/>
+              </a:rPr>
+              <a:t>tablet</a:t>
+            </a:r>
+            <a:r>
+              <a:rPr lang="en-US" dirty="0" smtClean="0">
+                <a:solidFill>
+                  <a:srgbClr val="989A9B"/>
+                </a:solidFill>
+                <a:cs typeface="+mn-cs"/>
+              </a:rPr>
+              <a:t>]</a:t>
+            </a:r>
+            <a:endParaRPr lang="en-US" dirty="0" smtClean="0">
+              <a:solidFill>
+                <a:srgbClr val="989A9B"/>
+              </a:solidFill>
+              <a:cs typeface="+mn-cs"/>
+            </a:endParaRPr>
+          </a:p>
+          <a:p>
+            <a:pPr eaLnBrk="1" hangingPunct="1">
+              <a:defRPr/>
+            </a:pPr>
+            <a:r>
+              <a:rPr lang="en-US" dirty="0" smtClean="0">
+                <a:cs typeface="+mn-cs"/>
+              </a:rPr>
+              <a:t>	- </a:t>
+            </a:r>
+            <a:r>
+              <a:rPr lang="en-US" dirty="0" err="1" smtClean="0">
+                <a:cs typeface="+mn-cs"/>
+              </a:rPr>
+              <a:t>bbos</a:t>
+            </a:r>
+            <a:r>
+              <a:rPr lang="en-US" dirty="0" smtClean="0">
+                <a:cs typeface="+mn-cs"/>
+              </a:rPr>
+              <a:t> for BlackBerry 5 through 7.x </a:t>
+            </a:r>
+            <a:r>
+              <a:rPr lang="en-US" dirty="0" err="1" smtClean="0">
+                <a:cs typeface="+mn-cs"/>
+              </a:rPr>
+              <a:t>smartphones</a:t>
+            </a:r>
+            <a:endParaRPr lang="en-US" dirty="0" smtClean="0">
+              <a:cs typeface="+mn-cs"/>
+            </a:endParaRPr>
+          </a:p>
+          <a:p>
+            <a:pPr eaLnBrk="1" hangingPunct="1">
+              <a:defRPr/>
+            </a:pPr>
+            <a:r>
+              <a:rPr lang="en-US" dirty="0" smtClean="0">
+                <a:cs typeface="+mn-cs"/>
+              </a:rPr>
+              <a:t>	- tablet for </a:t>
+            </a:r>
+            <a:r>
+              <a:rPr lang="en-US" dirty="0" err="1" smtClean="0">
+                <a:cs typeface="+mn-cs"/>
+              </a:rPr>
+              <a:t>PlayBook</a:t>
+            </a:r>
+            <a:r>
+              <a:rPr lang="en-US" dirty="0" smtClean="0">
+                <a:cs typeface="+mn-cs"/>
+              </a:rPr>
+              <a:t> 1.x through 2.x</a:t>
+            </a:r>
+          </a:p>
+          <a:p>
+            <a:pPr eaLnBrk="1" hangingPunct="1">
+              <a:defRPr/>
+            </a:pPr>
+            <a:r>
+              <a:rPr lang="en-US" dirty="0" smtClean="0">
+                <a:cs typeface="+mn-cs"/>
+              </a:rPr>
+              <a:t>	- bb10 for BlackBerry 10 also requires defining simulator build or device</a:t>
+            </a:r>
+          </a:p>
+          <a:p>
+            <a:pPr eaLnBrk="1" hangingPunct="1">
+              <a:defRPr/>
+            </a:pPr>
+            <a:r>
+              <a:rPr lang="en-US" dirty="0" smtClean="0">
+                <a:cs typeface="+mn-cs"/>
+              </a:rPr>
+              <a:t>	- test, prod, beta to load the matched build (from the build commands)</a:t>
+            </a:r>
+          </a:p>
+          <a:p>
+            <a:pPr eaLnBrk="1" hangingPunct="1">
+              <a:defRPr/>
+            </a:pPr>
+            <a:endParaRPr lang="en-US" dirty="0" smtClean="0">
+              <a:cs typeface="+mn-cs"/>
+            </a:endParaRPr>
+          </a:p>
+          <a:p>
+            <a:pPr eaLnBrk="1" hangingPunct="1">
+              <a:defRPr/>
+            </a:pPr>
+            <a:r>
+              <a:rPr lang="en-US" dirty="0" smtClean="0">
+                <a:cs typeface="+mn-cs"/>
+              </a:rPr>
+              <a:t>Set </a:t>
+            </a:r>
+            <a:r>
+              <a:rPr lang="en-US" b="1" dirty="0" smtClean="0">
+                <a:solidFill>
+                  <a:srgbClr val="00A8DF"/>
+                </a:solidFill>
+                <a:cs typeface="+mn-cs"/>
+              </a:rPr>
+              <a:t>device.</a:t>
+            </a:r>
+            <a:r>
+              <a:rPr lang="en-US" dirty="0" smtClean="0">
+                <a:solidFill>
+                  <a:srgbClr val="989A9B"/>
+                </a:solidFill>
+                <a:cs typeface="+mn-cs"/>
+              </a:rPr>
+              <a:t>[</a:t>
+            </a:r>
+            <a:r>
+              <a:rPr lang="en-US" b="1" dirty="0" smtClean="0">
+                <a:solidFill>
+                  <a:srgbClr val="00A8DF"/>
+                </a:solidFill>
+                <a:cs typeface="+mn-cs"/>
+              </a:rPr>
+              <a:t>bb10</a:t>
+            </a:r>
+            <a:r>
+              <a:rPr lang="en-US" dirty="0" smtClean="0">
+                <a:solidFill>
+                  <a:srgbClr val="989A9B"/>
+                </a:solidFill>
+                <a:cs typeface="+mn-cs"/>
+              </a:rPr>
+              <a:t>,</a:t>
+            </a:r>
+            <a:r>
+              <a:rPr lang="en-US" b="1" dirty="0" smtClean="0">
+                <a:solidFill>
+                  <a:srgbClr val="00A8DF"/>
+                </a:solidFill>
+                <a:cs typeface="+mn-cs"/>
+              </a:rPr>
+              <a:t> tablet</a:t>
+            </a:r>
+            <a:r>
+              <a:rPr lang="en-US" dirty="0" smtClean="0">
+                <a:solidFill>
+                  <a:srgbClr val="989A9B"/>
+                </a:solidFill>
+                <a:cs typeface="+mn-cs"/>
+              </a:rPr>
+              <a:t>]</a:t>
+            </a:r>
+            <a:r>
+              <a:rPr lang="en-US" b="1" dirty="0" smtClean="0">
+                <a:solidFill>
+                  <a:srgbClr val="00A8DF"/>
+                </a:solidFill>
+                <a:cs typeface="+mn-cs"/>
+              </a:rPr>
+              <a:t>.pin </a:t>
+            </a:r>
+            <a:r>
+              <a:rPr lang="en-US" dirty="0" smtClean="0">
+                <a:cs typeface="+mn-cs"/>
+              </a:rPr>
+              <a:t>properties</a:t>
+            </a:r>
+            <a:endParaRPr lang="en-US" dirty="0" smtClean="0">
+              <a:cs typeface="+mn-cs"/>
+            </a:endParaRPr>
+          </a:p>
+          <a:p>
+            <a:pPr eaLnBrk="1" hangingPunct="1">
+              <a:defRPr/>
+            </a:pPr>
+            <a:r>
+              <a:rPr lang="en-US" dirty="0" smtClean="0">
+                <a:cs typeface="+mn-cs"/>
+              </a:rPr>
+              <a:t>	&lt;property name="</a:t>
+            </a:r>
+            <a:r>
+              <a:rPr lang="en-US" dirty="0" smtClean="0">
+                <a:cs typeface="+mn-cs"/>
+              </a:rPr>
+              <a:t>device.bb10.pin" </a:t>
+            </a:r>
+            <a:r>
+              <a:rPr lang="en-US" dirty="0" smtClean="0">
+                <a:cs typeface="+mn-cs"/>
+              </a:rPr>
+              <a:t>value</a:t>
+            </a:r>
+            <a:r>
+              <a:rPr lang="en-US" dirty="0" smtClean="0">
+                <a:cs typeface="+mn-cs"/>
+              </a:rPr>
+              <a:t>=“2AB00001"/&gt;</a:t>
+            </a:r>
+            <a:endParaRPr lang="en-US" dirty="0" smtClean="0">
+              <a:cs typeface="+mn-cs"/>
+            </a:endParaRPr>
+          </a:p>
+          <a:p>
+            <a:pPr eaLnBrk="1" hangingPunct="1">
+              <a:defRPr/>
+            </a:pPr>
+            <a:endParaRPr lang="en-US" dirty="0" smtClean="0">
+              <a:cs typeface="+mn-cs"/>
+            </a:endParaRPr>
+          </a:p>
+          <a:p>
+            <a:pPr eaLnBrk="1" hangingPunct="1">
+              <a:defRPr/>
+            </a:pPr>
+            <a:endParaRPr lang="en-US" dirty="0" smtClean="0">
+              <a:cs typeface="+mn-cs"/>
+            </a:endParaRPr>
+          </a:p>
+          <a:p>
+            <a:pPr eaLnBrk="1" hangingPunct="1">
+              <a:defRPr/>
+            </a:pPr>
+            <a:endParaRPr lang="en-US" dirty="0" smtClean="0">
+              <a:cs typeface="+mn-cs"/>
+            </a:endParaRPr>
+          </a:p>
+        </p:txBody>
+      </p:sp>
+      <p:sp>
+        <p:nvSpPr>
+          <p:cNvPr id="21508" name="Date Placeholder 7"/>
+          <p:cNvSpPr>
+            <a:spLocks noGrp="1"/>
+          </p:cNvSpPr>
+          <p:nvPr>
+            <p:ph type="dt" sz="quarter" idx="4294967295"/>
+          </p:nvPr>
+        </p:nvSpPr>
+        <p:spPr>
+          <a:xfrm>
+            <a:off x="10972800" y="371475"/>
+            <a:ext cx="2743200" cy="228600"/>
+          </a:xfrm>
+          <a:prstGeom prst="rect">
+            <a:avLst/>
+          </a:prstGeom>
+          <a:noFill/>
+        </p:spPr>
+        <p:txBody>
+          <a:bodyPr/>
+          <a:lstStyle/>
+          <a:p>
+            <a:fld id="{7DA9DD18-9796-4D82-B0BB-B4D77B8A07AA}" type="datetime4">
+              <a:rPr lang="en-US" smtClean="0">
+                <a:latin typeface="Trade Gothic Next LT Pro Lt" pitchFamily="34" charset="0"/>
+                <a:ea typeface="ＭＳ Ｐゴシック" pitchFamily="34" charset="-128"/>
+              </a:rPr>
+              <a:pPr/>
+              <a:t>April 17, 2013</a:t>
+            </a:fld>
+            <a:endParaRPr lang="en-US" smtClean="0">
+              <a:latin typeface="Trade Gothic Next LT Pro Lt" pitchFamily="34" charset="0"/>
+              <a:ea typeface="ＭＳ Ｐゴシック" pitchFamily="34" charset="-128"/>
+            </a:endParaRPr>
+          </a:p>
+        </p:txBody>
+      </p:sp>
+      <p:sp>
+        <p:nvSpPr>
+          <p:cNvPr id="21509" name="Slide Number Placeholder 8"/>
+          <p:cNvSpPr>
+            <a:spLocks noGrp="1"/>
+          </p:cNvSpPr>
+          <p:nvPr>
+            <p:ph type="sldNum" sz="quarter" idx="4294967295"/>
+          </p:nvPr>
+        </p:nvSpPr>
+        <p:spPr>
+          <a:xfrm>
+            <a:off x="13716000" y="369888"/>
+            <a:ext cx="430213" cy="228600"/>
+          </a:xfrm>
+          <a:prstGeom prst="rect">
+            <a:avLst/>
+          </a:prstGeom>
+          <a:noFill/>
+        </p:spPr>
+        <p:txBody>
+          <a:bodyPr/>
+          <a:lstStyle/>
+          <a:p>
+            <a:fld id="{BC02FE94-EFEA-4D79-A58F-C2F0F7B486E2}" type="slidenum">
+              <a:rPr lang="en-US" smtClean="0">
+                <a:latin typeface="Trade Gothic Next LT Pro Lt" pitchFamily="34" charset="0"/>
+                <a:ea typeface="ＭＳ Ｐゴシック" pitchFamily="34" charset="-128"/>
+              </a:rPr>
+              <a:pPr/>
+              <a:t>6</a:t>
+            </a:fld>
+            <a:endParaRPr lang="en-US" smtClean="0">
+              <a:latin typeface="Trade Gothic Next LT Pro Lt" pitchFamily="34" charset="0"/>
+              <a:ea typeface="ＭＳ Ｐゴシック" pitchFamily="34" charset="-128"/>
+            </a:endParaRPr>
+          </a:p>
+        </p:txBody>
+      </p:sp>
+    </p:spTree>
+  </p:cSld>
+  <p:clrMapOvr>
+    <a:masterClrMapping/>
+  </p:clrMapOvr>
+  <p:transition spd="slow">
+    <p:fade thruBlk="1"/>
+  </p:transition>
+  <p:timing>
+    <p:tnLst>
+      <p:par>
+        <p:cTn id="1" dur="indefinite" restart="never" nodeType="tmRoot"/>
+      </p:par>
+    </p:tnLst>
+  </p:timing>
+</p:sld>
+</file>
+
+<file path=ppt/slides/slide7.xml><?xml version="1.0" encoding="utf-8"?>
+<p:sld xmlns:a="http://schemas.openxmlformats.org/drawingml/2006/main" xmlns:r="http://schemas.openxmlformats.org/officeDocument/2006/relationships" xmlns:p="http://schemas.openxmlformats.org/presentationml/2006/main">
+  <p:cSld>
+    <p:spTree>
+      <p:nvGrpSpPr>
+        <p:cNvPr id="1" name=""/>
+        <p:cNvGrpSpPr/>
+        <p:nvPr/>
+      </p:nvGrpSpPr>
+      <p:grpSpPr>
+        <a:xfrm>
+          <a:off x="0" y="0"/>
+          <a:ext cx="0" cy="0"/>
+          <a:chOff x="0" y="0"/>
+          <a:chExt cx="0" cy="0"/>
+        </a:xfrm>
+      </p:grpSpPr>
+      <p:sp>
+        <p:nvSpPr>
           <p:cNvPr id="20482" name="Title 11"/>
           <p:cNvSpPr>
             <a:spLocks noGrp="1"/>
@@ -6889,10 +5691,17 @@
             <a:spLocks noGrp="1"/>
           </p:cNvSpPr>
           <p:nvPr>
-            <p:ph type="dt" sz="quarter" idx="14"/>
+            <p:ph type="dt" sz="quarter" idx="4294967295"/>
           </p:nvPr>
         </p:nvSpPr>
         <p:spPr>
+          <a:xfrm>
+            <a:off x="10972800" y="371475"/>
+            <a:ext cx="2743200" cy="228600"/>
+          </a:xfrm>
+          <a:prstGeom prst="rect">
+            <a:avLst/>
+          </a:prstGeom>
           <a:noFill/>
         </p:spPr>
         <p:txBody>
@@ -6905,7 +5714,7 @@
                 <a:ea typeface="ＭＳ Ｐゴシック" pitchFamily="34" charset="-128"/>
               </a:rPr>
               <a:pPr/>
-              <a:t>January 24, 2013</a:t>
+              <a:t>April 17, 2013</a:t>
             </a:fld>
             <a:endParaRPr lang="en-US" smtClean="0">
               <a:latin typeface="Trade Gothic Next LT Pro Lt" pitchFamily="34" charset="0"/>
@@ -6921,10 +5730,17 @@
             <a:spLocks noGrp="1"/>
           </p:cNvSpPr>
           <p:nvPr>
-            <p:ph type="sldNum" sz="quarter" idx="15"/>
+            <p:ph type="sldNum" sz="quarter" idx="4294967295"/>
           </p:nvPr>
         </p:nvSpPr>
         <p:spPr>
+          <a:xfrm>
+            <a:off x="13716000" y="369888"/>
+            <a:ext cx="430213" cy="228600"/>
+          </a:xfrm>
+          <a:prstGeom prst="rect">
+            <a:avLst/>
+          </a:prstGeom>
           <a:noFill/>
         </p:spPr>
         <p:txBody>
@@ -6937,7 +5753,7 @@
                 <a:ea typeface="ＭＳ Ｐゴシック" pitchFamily="34" charset="-128"/>
               </a:rPr>
               <a:pPr/>
-              <a:t>6</a:t>
+              <a:t>7</a:t>
             </a:fld>
             <a:endParaRPr lang="en-US" smtClean="0">
               <a:latin typeface="Trade Gothic Next LT Pro Lt" pitchFamily="34" charset="0"/>
@@ -6963,7 +5779,7 @@
           </a:xfrm>
         </p:spPr>
         <p:txBody>
-          <a:bodyPr/>
+          <a:bodyPr numCol="1"/>
           <a:lstStyle/>
           <a:p>
             <a:pPr eaLnBrk="1" hangingPunct="1">
@@ -7019,15 +5835,68 @@
             <a:pPr eaLnBrk="1" hangingPunct="1">
               <a:defRPr/>
             </a:pPr>
-            <a:r>
-              <a:rPr lang="en-US" dirty="0" smtClean="0">
-                <a:cs typeface="+mn-cs"/>
-              </a:rPr>
-              <a:t>Copy build.xml to your project and edit project name</a:t>
-            </a:r>
-            <a:endParaRPr lang="en-US" dirty="0">
+            <a:endParaRPr lang="en-US" dirty="0" smtClean="0">
               <a:cs typeface="+mn-cs"/>
             </a:endParaRPr>
+          </a:p>
+          <a:p>
+            <a:pPr eaLnBrk="1" hangingPunct="1">
+              <a:defRPr/>
+            </a:pPr>
+            <a:r>
+              <a:rPr lang="en-US" dirty="0" smtClean="0">
+                <a:cs typeface="+mn-cs"/>
+              </a:rPr>
+              <a:t>Copy </a:t>
+            </a:r>
+            <a:r>
+              <a:rPr lang="en-US" dirty="0" smtClean="0">
+                <a:cs typeface="+mn-cs"/>
+              </a:rPr>
+              <a:t>build.xml to your project </a:t>
+            </a:r>
+            <a:r>
+              <a:rPr lang="en-US" dirty="0" smtClean="0">
+                <a:cs typeface="+mn-cs"/>
+              </a:rPr>
+              <a:t>and </a:t>
+            </a:r>
+            <a:r>
+              <a:rPr lang="en-US" dirty="0" smtClean="0">
+                <a:cs typeface="+mn-cs"/>
+              </a:rPr>
+              <a:t>edit project </a:t>
+            </a:r>
+            <a:r>
+              <a:rPr lang="en-US" dirty="0" smtClean="0">
+                <a:cs typeface="+mn-cs"/>
+              </a:rPr>
+              <a:t>name</a:t>
+            </a:r>
+          </a:p>
+          <a:p>
+            <a:pPr eaLnBrk="1" hangingPunct="1">
+              <a:defRPr/>
+            </a:pPr>
+            <a:r>
+              <a:rPr lang="en-US" dirty="0" smtClean="0">
+                <a:cs typeface="+mn-cs"/>
+              </a:rPr>
+              <a:t>View </a:t>
+            </a:r>
+            <a:r>
+              <a:rPr lang="en-US" dirty="0" smtClean="0">
+                <a:cs typeface="+mn-cs"/>
+                <a:hlinkClick r:id="rId2"/>
+              </a:rPr>
+              <a:t>Video</a:t>
+            </a:r>
+            <a:r>
+              <a:rPr lang="en-US" dirty="0" smtClean="0">
+                <a:cs typeface="+mn-cs"/>
+              </a:rPr>
+              <a:t> on setup with Command Line and Sublime</a:t>
+            </a:r>
           </a:p>
         </p:txBody>
       </p:sp>
@@ -7039,7 +5908,7 @@
         </p:nvSpPr>
         <p:spPr>
           <a:xfrm>
-            <a:off x="6362282" y="5397639"/>
+            <a:off x="6409174" y="5057670"/>
             <a:ext cx="7397731" cy="830997"/>
           </a:xfrm>
           <a:prstGeom prst="rect">
@@ -7147,7 +6016,7 @@
 </file>
 
 <file path=ppt/theme/theme1.xml><?xml version="1.0" encoding="utf-8"?>
-<a:theme xmlns:a="http://schemas.openxmlformats.org/drawingml/2006/main" name="BlackBerry Brand PPT template_final_16X9">
+<a:theme xmlns:a="http://schemas.openxmlformats.org/drawingml/2006/main" name="BlackBerry_Brand_PPT_template_final_16X9">
   <a:themeElements>
     <a:clrScheme name="BB Brand Template">
       <a:dk1>

</xml_diff>